<commit_message>
added stuff on rects ellipse
</commit_message>
<xml_diff>
--- a/images/pygame_rect_window.pptx
+++ b/images/pygame_rect_window.pptx
@@ -6,6 +6,7 @@
   </p:sldMasterIdLst>
   <p:sldIdLst>
     <p:sldId id="257" r:id="rId2"/>
+    <p:sldId id="258" r:id="rId3"/>
   </p:sldIdLst>
   <p:sldSz cx="12192000" cy="6858000"/>
   <p:notesSz cx="6858000" cy="9144000"/>
@@ -245,7 +246,7 @@
           <a:p>
             <a:fld id="{856FFBE8-0159-4FDA-8D70-04C5D85E84A4}" type="datetimeFigureOut">
               <a:rPr lang="en-US" smtClean="0"/>
-              <a:t>5/26/2017</a:t>
+              <a:t>5/27/2017</a:t>
             </a:fld>
             <a:endParaRPr lang="en-US"/>
           </a:p>
@@ -413,7 +414,7 @@
           <a:p>
             <a:fld id="{856FFBE8-0159-4FDA-8D70-04C5D85E84A4}" type="datetimeFigureOut">
               <a:rPr lang="en-US" smtClean="0"/>
-              <a:t>5/26/2017</a:t>
+              <a:t>5/27/2017</a:t>
             </a:fld>
             <a:endParaRPr lang="en-US"/>
           </a:p>
@@ -591,7 +592,7 @@
           <a:p>
             <a:fld id="{856FFBE8-0159-4FDA-8D70-04C5D85E84A4}" type="datetimeFigureOut">
               <a:rPr lang="en-US" smtClean="0"/>
-              <a:t>5/26/2017</a:t>
+              <a:t>5/27/2017</a:t>
             </a:fld>
             <a:endParaRPr lang="en-US"/>
           </a:p>
@@ -759,7 +760,7 @@
           <a:p>
             <a:fld id="{856FFBE8-0159-4FDA-8D70-04C5D85E84A4}" type="datetimeFigureOut">
               <a:rPr lang="en-US" smtClean="0"/>
-              <a:t>5/26/2017</a:t>
+              <a:t>5/27/2017</a:t>
             </a:fld>
             <a:endParaRPr lang="en-US"/>
           </a:p>
@@ -1004,7 +1005,7 @@
           <a:p>
             <a:fld id="{856FFBE8-0159-4FDA-8D70-04C5D85E84A4}" type="datetimeFigureOut">
               <a:rPr lang="en-US" smtClean="0"/>
-              <a:t>5/26/2017</a:t>
+              <a:t>5/27/2017</a:t>
             </a:fld>
             <a:endParaRPr lang="en-US"/>
           </a:p>
@@ -1233,7 +1234,7 @@
           <a:p>
             <a:fld id="{856FFBE8-0159-4FDA-8D70-04C5D85E84A4}" type="datetimeFigureOut">
               <a:rPr lang="en-US" smtClean="0"/>
-              <a:t>5/26/2017</a:t>
+              <a:t>5/27/2017</a:t>
             </a:fld>
             <a:endParaRPr lang="en-US"/>
           </a:p>
@@ -1597,7 +1598,7 @@
           <a:p>
             <a:fld id="{856FFBE8-0159-4FDA-8D70-04C5D85E84A4}" type="datetimeFigureOut">
               <a:rPr lang="en-US" smtClean="0"/>
-              <a:t>5/26/2017</a:t>
+              <a:t>5/27/2017</a:t>
             </a:fld>
             <a:endParaRPr lang="en-US"/>
           </a:p>
@@ -1714,7 +1715,7 @@
           <a:p>
             <a:fld id="{856FFBE8-0159-4FDA-8D70-04C5D85E84A4}" type="datetimeFigureOut">
               <a:rPr lang="en-US" smtClean="0"/>
-              <a:t>5/26/2017</a:t>
+              <a:t>5/27/2017</a:t>
             </a:fld>
             <a:endParaRPr lang="en-US"/>
           </a:p>
@@ -1809,7 +1810,7 @@
           <a:p>
             <a:fld id="{856FFBE8-0159-4FDA-8D70-04C5D85E84A4}" type="datetimeFigureOut">
               <a:rPr lang="en-US" smtClean="0"/>
-              <a:t>5/26/2017</a:t>
+              <a:t>5/27/2017</a:t>
             </a:fld>
             <a:endParaRPr lang="en-US"/>
           </a:p>
@@ -2084,7 +2085,7 @@
           <a:p>
             <a:fld id="{856FFBE8-0159-4FDA-8D70-04C5D85E84A4}" type="datetimeFigureOut">
               <a:rPr lang="en-US" smtClean="0"/>
-              <a:t>5/26/2017</a:t>
+              <a:t>5/27/2017</a:t>
             </a:fld>
             <a:endParaRPr lang="en-US"/>
           </a:p>
@@ -2336,7 +2337,7 @@
           <a:p>
             <a:fld id="{856FFBE8-0159-4FDA-8D70-04C5D85E84A4}" type="datetimeFigureOut">
               <a:rPr lang="en-US" smtClean="0"/>
-              <a:t>5/26/2017</a:t>
+              <a:t>5/27/2017</a:t>
             </a:fld>
             <a:endParaRPr lang="en-US"/>
           </a:p>
@@ -2547,7 +2548,7 @@
           <a:p>
             <a:fld id="{856FFBE8-0159-4FDA-8D70-04C5D85E84A4}" type="datetimeFigureOut">
               <a:rPr lang="en-US" smtClean="0"/>
-              <a:t>5/26/2017</a:t>
+              <a:t>5/27/2017</a:t>
             </a:fld>
             <a:endParaRPr lang="en-US"/>
           </a:p>
@@ -3563,6 +3564,651 @@
 </p:sld>
 </file>
 
+<file path=ppt/slides/slide2.xml><?xml version="1.0" encoding="utf-8"?>
+<p:sld xmlns:a="http://schemas.openxmlformats.org/drawingml/2006/main" xmlns:r="http://schemas.openxmlformats.org/officeDocument/2006/relationships" xmlns:p="http://schemas.openxmlformats.org/presentationml/2006/main">
+  <p:cSld>
+    <p:spTree>
+      <p:nvGrpSpPr>
+        <p:cNvPr id="1" name=""/>
+        <p:cNvGrpSpPr/>
+        <p:nvPr/>
+      </p:nvGrpSpPr>
+      <p:grpSpPr>
+        <a:xfrm>
+          <a:off x="0" y="0"/>
+          <a:ext cx="0" cy="0"/>
+          <a:chOff x="0" y="0"/>
+          <a:chExt cx="0" cy="0"/>
+        </a:xfrm>
+      </p:grpSpPr>
+      <p:sp>
+        <p:nvSpPr>
+          <p:cNvPr id="5" name="Rectangle 4"/>
+          <p:cNvSpPr/>
+          <p:nvPr/>
+        </p:nvSpPr>
+        <p:spPr>
+          <a:xfrm>
+            <a:off x="3075140" y="1678488"/>
+            <a:ext cx="3331923" cy="1465545"/>
+          </a:xfrm>
+          <a:prstGeom prst="rect">
+            <a:avLst/>
+          </a:prstGeom>
+          <a:solidFill>
+            <a:schemeClr val="accent1">
+              <a:lumMod val="40000"/>
+              <a:lumOff val="60000"/>
+            </a:schemeClr>
+          </a:solidFill>
+          <a:ln>
+            <a:solidFill>
+              <a:schemeClr val="accent1">
+                <a:lumMod val="40000"/>
+                <a:lumOff val="60000"/>
+              </a:schemeClr>
+            </a:solidFill>
+          </a:ln>
+        </p:spPr>
+        <p:style>
+          <a:lnRef idx="2">
+            <a:schemeClr val="accent1">
+              <a:shade val="50000"/>
+            </a:schemeClr>
+          </a:lnRef>
+          <a:fillRef idx="1">
+            <a:schemeClr val="accent1"/>
+          </a:fillRef>
+          <a:effectRef idx="0">
+            <a:schemeClr val="accent1"/>
+          </a:effectRef>
+          <a:fontRef idx="minor">
+            <a:schemeClr val="lt1"/>
+          </a:fontRef>
+        </p:style>
+        <p:txBody>
+          <a:bodyPr rtlCol="0" anchor="ctr"/>
+          <a:lstStyle/>
+          <a:p>
+            <a:pPr algn="ctr"/>
+            <a:endParaRPr lang="en-US"/>
+          </a:p>
+        </p:txBody>
+      </p:sp>
+      <p:sp>
+        <p:nvSpPr>
+          <p:cNvPr id="4" name="Oval 3"/>
+          <p:cNvSpPr/>
+          <p:nvPr/>
+        </p:nvSpPr>
+        <p:spPr>
+          <a:xfrm>
+            <a:off x="3075140" y="1691014"/>
+            <a:ext cx="3313134" cy="1434230"/>
+          </a:xfrm>
+          <a:prstGeom prst="ellipse">
+            <a:avLst/>
+          </a:prstGeom>
+          <a:solidFill>
+            <a:schemeClr val="accent1">
+              <a:lumMod val="75000"/>
+            </a:schemeClr>
+          </a:solidFill>
+          <a:ln>
+            <a:solidFill>
+              <a:schemeClr val="accent1">
+                <a:lumMod val="75000"/>
+              </a:schemeClr>
+            </a:solidFill>
+          </a:ln>
+        </p:spPr>
+        <p:style>
+          <a:lnRef idx="2">
+            <a:schemeClr val="accent1">
+              <a:shade val="50000"/>
+            </a:schemeClr>
+          </a:lnRef>
+          <a:fillRef idx="1">
+            <a:schemeClr val="accent1"/>
+          </a:fillRef>
+          <a:effectRef idx="0">
+            <a:schemeClr val="accent1"/>
+          </a:effectRef>
+          <a:fontRef idx="minor">
+            <a:schemeClr val="lt1"/>
+          </a:fontRef>
+        </p:style>
+        <p:txBody>
+          <a:bodyPr rtlCol="0" anchor="ctr"/>
+          <a:lstStyle/>
+          <a:p>
+            <a:pPr algn="ctr"/>
+            <a:endParaRPr lang="en-US"/>
+          </a:p>
+        </p:txBody>
+      </p:sp>
+      <p:sp>
+        <p:nvSpPr>
+          <p:cNvPr id="6" name="Right Brace 5"/>
+          <p:cNvSpPr/>
+          <p:nvPr/>
+        </p:nvSpPr>
+        <p:spPr>
+          <a:xfrm rot="5400000">
+            <a:off x="4622448" y="1596724"/>
+            <a:ext cx="237305" cy="3331923"/>
+          </a:xfrm>
+          <a:prstGeom prst="rightBrace">
+            <a:avLst/>
+          </a:prstGeom>
+        </p:spPr>
+        <p:style>
+          <a:lnRef idx="1">
+            <a:schemeClr val="accent1"/>
+          </a:lnRef>
+          <a:fillRef idx="0">
+            <a:schemeClr val="accent1"/>
+          </a:fillRef>
+          <a:effectRef idx="0">
+            <a:schemeClr val="accent1"/>
+          </a:effectRef>
+          <a:fontRef idx="minor">
+            <a:schemeClr val="tx1"/>
+          </a:fontRef>
+        </p:style>
+        <p:txBody>
+          <a:bodyPr rtlCol="0" anchor="ctr"/>
+          <a:lstStyle/>
+          <a:p>
+            <a:pPr algn="ctr"/>
+            <a:endParaRPr lang="en-US"/>
+          </a:p>
+        </p:txBody>
+      </p:sp>
+      <p:sp>
+        <p:nvSpPr>
+          <p:cNvPr id="7" name="TextBox 6"/>
+          <p:cNvSpPr txBox="1"/>
+          <p:nvPr/>
+        </p:nvSpPr>
+        <p:spPr>
+          <a:xfrm>
+            <a:off x="4503107" y="3338187"/>
+            <a:ext cx="542136" cy="276999"/>
+          </a:xfrm>
+          <a:prstGeom prst="rect">
+            <a:avLst/>
+          </a:prstGeom>
+          <a:noFill/>
+        </p:spPr>
+        <p:txBody>
+          <a:bodyPr wrap="none" rtlCol="0">
+            <a:spAutoFit/>
+          </a:bodyPr>
+          <a:lstStyle/>
+          <a:p>
+            <a:r>
+              <a:rPr lang="en-US" sz="1200" dirty="0"/>
+              <a:t>width</a:t>
+            </a:r>
+          </a:p>
+        </p:txBody>
+      </p:sp>
+      <p:sp>
+        <p:nvSpPr>
+          <p:cNvPr id="8" name="Right Brace 7"/>
+          <p:cNvSpPr/>
+          <p:nvPr/>
+        </p:nvSpPr>
+        <p:spPr>
+          <a:xfrm>
+            <a:off x="6407062" y="1691014"/>
+            <a:ext cx="312024" cy="1453019"/>
+          </a:xfrm>
+          <a:prstGeom prst="rightBrace">
+            <a:avLst/>
+          </a:prstGeom>
+        </p:spPr>
+        <p:style>
+          <a:lnRef idx="1">
+            <a:schemeClr val="accent1"/>
+          </a:lnRef>
+          <a:fillRef idx="0">
+            <a:schemeClr val="accent1"/>
+          </a:fillRef>
+          <a:effectRef idx="0">
+            <a:schemeClr val="accent1"/>
+          </a:effectRef>
+          <a:fontRef idx="minor">
+            <a:schemeClr val="tx1"/>
+          </a:fontRef>
+        </p:style>
+        <p:txBody>
+          <a:bodyPr rtlCol="0" anchor="ctr"/>
+          <a:lstStyle/>
+          <a:p>
+            <a:pPr algn="ctr"/>
+            <a:endParaRPr lang="en-US"/>
+          </a:p>
+        </p:txBody>
+      </p:sp>
+      <p:sp>
+        <p:nvSpPr>
+          <p:cNvPr id="9" name="TextBox 8"/>
+          <p:cNvSpPr txBox="1"/>
+          <p:nvPr/>
+        </p:nvSpPr>
+        <p:spPr>
+          <a:xfrm rot="5400000">
+            <a:off x="6567986" y="2279024"/>
+            <a:ext cx="579198" cy="276999"/>
+          </a:xfrm>
+          <a:prstGeom prst="rect">
+            <a:avLst/>
+          </a:prstGeom>
+          <a:noFill/>
+        </p:spPr>
+        <p:txBody>
+          <a:bodyPr wrap="none" rtlCol="0">
+            <a:spAutoFit/>
+          </a:bodyPr>
+          <a:lstStyle/>
+          <a:p>
+            <a:r>
+              <a:rPr lang="en-US" sz="1200" dirty="0"/>
+              <a:t>height</a:t>
+            </a:r>
+          </a:p>
+        </p:txBody>
+      </p:sp>
+      <p:sp>
+        <p:nvSpPr>
+          <p:cNvPr id="10" name="Freeform: Shape 9"/>
+          <p:cNvSpPr/>
+          <p:nvPr/>
+        </p:nvSpPr>
+        <p:spPr>
+          <a:xfrm rot="11160472">
+            <a:off x="2392471" y="1885167"/>
+            <a:ext cx="801666" cy="200417"/>
+          </a:xfrm>
+          <a:custGeom>
+            <a:avLst/>
+            <a:gdLst>
+              <a:gd name="connsiteX0" fmla="*/ 801666 w 801666"/>
+              <a:gd name="connsiteY0" fmla="*/ 0 h 200417"/>
+              <a:gd name="connsiteX1" fmla="*/ 457200 w 801666"/>
+              <a:gd name="connsiteY1" fmla="*/ 125260 h 200417"/>
+              <a:gd name="connsiteX2" fmla="*/ 256784 w 801666"/>
+              <a:gd name="connsiteY2" fmla="*/ 6263 h 200417"/>
+              <a:gd name="connsiteX3" fmla="*/ 0 w 801666"/>
+              <a:gd name="connsiteY3" fmla="*/ 200417 h 200417"/>
+              <a:gd name="connsiteX4" fmla="*/ 0 w 801666"/>
+              <a:gd name="connsiteY4" fmla="*/ 200417 h 200417"/>
+            </a:gdLst>
+            <a:ahLst/>
+            <a:cxnLst>
+              <a:cxn ang="0">
+                <a:pos x="connsiteX0" y="connsiteY0"/>
+              </a:cxn>
+              <a:cxn ang="0">
+                <a:pos x="connsiteX1" y="connsiteY1"/>
+              </a:cxn>
+              <a:cxn ang="0">
+                <a:pos x="connsiteX2" y="connsiteY2"/>
+              </a:cxn>
+              <a:cxn ang="0">
+                <a:pos x="connsiteX3" y="connsiteY3"/>
+              </a:cxn>
+              <a:cxn ang="0">
+                <a:pos x="connsiteX4" y="connsiteY4"/>
+              </a:cxn>
+            </a:cxnLst>
+            <a:rect l="l" t="t" r="r" b="b"/>
+            <a:pathLst>
+              <a:path w="801666" h="200417">
+                <a:moveTo>
+                  <a:pt x="801666" y="0"/>
+                </a:moveTo>
+                <a:cubicBezTo>
+                  <a:pt x="674840" y="62108"/>
+                  <a:pt x="548014" y="124216"/>
+                  <a:pt x="457200" y="125260"/>
+                </a:cubicBezTo>
+                <a:cubicBezTo>
+                  <a:pt x="366386" y="126304"/>
+                  <a:pt x="332984" y="-6263"/>
+                  <a:pt x="256784" y="6263"/>
+                </a:cubicBezTo>
+                <a:cubicBezTo>
+                  <a:pt x="180584" y="18789"/>
+                  <a:pt x="0" y="200417"/>
+                  <a:pt x="0" y="200417"/>
+                </a:cubicBezTo>
+                <a:lnTo>
+                  <a:pt x="0" y="200417"/>
+                </a:lnTo>
+              </a:path>
+            </a:pathLst>
+          </a:custGeom>
+          <a:ln w="9525" cap="flat" cmpd="sng" algn="ctr">
+            <a:solidFill>
+              <a:schemeClr val="accent1"/>
+            </a:solidFill>
+            <a:prstDash val="solid"/>
+            <a:round/>
+            <a:headEnd type="none" w="med" len="med"/>
+            <a:tailEnd type="arrow" w="med" len="med"/>
+          </a:ln>
+        </p:spPr>
+        <p:style>
+          <a:lnRef idx="0">
+            <a:scrgbClr r="0" g="0" b="0"/>
+          </a:lnRef>
+          <a:fillRef idx="0">
+            <a:scrgbClr r="0" g="0" b="0"/>
+          </a:fillRef>
+          <a:effectRef idx="0">
+            <a:scrgbClr r="0" g="0" b="0"/>
+          </a:effectRef>
+          <a:fontRef idx="minor">
+            <a:schemeClr val="tx1"/>
+          </a:fontRef>
+        </p:style>
+        <p:txBody>
+          <a:bodyPr rtlCol="0" anchor="ctr"/>
+          <a:lstStyle/>
+          <a:p>
+            <a:pPr algn="ctr"/>
+            <a:endParaRPr lang="en-US"/>
+          </a:p>
+        </p:txBody>
+      </p:sp>
+      <p:sp>
+        <p:nvSpPr>
+          <p:cNvPr id="11" name="TextBox 10"/>
+          <p:cNvSpPr txBox="1"/>
+          <p:nvPr/>
+        </p:nvSpPr>
+        <p:spPr>
+          <a:xfrm>
+            <a:off x="1429056" y="1895255"/>
+            <a:ext cx="1036053" cy="276999"/>
+          </a:xfrm>
+          <a:prstGeom prst="rect">
+            <a:avLst/>
+          </a:prstGeom>
+          <a:noFill/>
+        </p:spPr>
+        <p:txBody>
+          <a:bodyPr wrap="none" rtlCol="0">
+            <a:spAutoFit/>
+          </a:bodyPr>
+          <a:lstStyle/>
+          <a:p>
+            <a:r>
+              <a:rPr lang="en-US" sz="1200" dirty="0"/>
+              <a:t>bounding box</a:t>
+            </a:r>
+          </a:p>
+        </p:txBody>
+      </p:sp>
+      <p:sp>
+        <p:nvSpPr>
+          <p:cNvPr id="12" name="Freeform: Shape 11"/>
+          <p:cNvSpPr/>
+          <p:nvPr/>
+        </p:nvSpPr>
+        <p:spPr>
+          <a:xfrm>
+            <a:off x="2367419" y="2110636"/>
+            <a:ext cx="832981" cy="891961"/>
+          </a:xfrm>
+          <a:custGeom>
+            <a:avLst/>
+            <a:gdLst>
+              <a:gd name="connsiteX0" fmla="*/ 0 w 832981"/>
+              <a:gd name="connsiteY0" fmla="*/ 0 h 891961"/>
+              <a:gd name="connsiteX1" fmla="*/ 388307 w 832981"/>
+              <a:gd name="connsiteY1" fmla="*/ 851769 h 891961"/>
+              <a:gd name="connsiteX2" fmla="*/ 601249 w 832981"/>
+              <a:gd name="connsiteY2" fmla="*/ 764087 h 891961"/>
+              <a:gd name="connsiteX3" fmla="*/ 832981 w 832981"/>
+              <a:gd name="connsiteY3" fmla="*/ 858032 h 891961"/>
+              <a:gd name="connsiteX4" fmla="*/ 832981 w 832981"/>
+              <a:gd name="connsiteY4" fmla="*/ 858032 h 891961"/>
+            </a:gdLst>
+            <a:ahLst/>
+            <a:cxnLst>
+              <a:cxn ang="0">
+                <a:pos x="connsiteX0" y="connsiteY0"/>
+              </a:cxn>
+              <a:cxn ang="0">
+                <a:pos x="connsiteX1" y="connsiteY1"/>
+              </a:cxn>
+              <a:cxn ang="0">
+                <a:pos x="connsiteX2" y="connsiteY2"/>
+              </a:cxn>
+              <a:cxn ang="0">
+                <a:pos x="connsiteX3" y="connsiteY3"/>
+              </a:cxn>
+              <a:cxn ang="0">
+                <a:pos x="connsiteX4" y="connsiteY4"/>
+              </a:cxn>
+            </a:cxnLst>
+            <a:rect l="l" t="t" r="r" b="b"/>
+            <a:pathLst>
+              <a:path w="832981" h="891961">
+                <a:moveTo>
+                  <a:pt x="0" y="0"/>
+                </a:moveTo>
+                <a:cubicBezTo>
+                  <a:pt x="144049" y="362210"/>
+                  <a:pt x="288099" y="724421"/>
+                  <a:pt x="388307" y="851769"/>
+                </a:cubicBezTo>
+                <a:cubicBezTo>
+                  <a:pt x="488515" y="979117"/>
+                  <a:pt x="527137" y="763043"/>
+                  <a:pt x="601249" y="764087"/>
+                </a:cubicBezTo>
+                <a:cubicBezTo>
+                  <a:pt x="675361" y="765131"/>
+                  <a:pt x="832981" y="858032"/>
+                  <a:pt x="832981" y="858032"/>
+                </a:cubicBezTo>
+                <a:lnTo>
+                  <a:pt x="832981" y="858032"/>
+                </a:lnTo>
+              </a:path>
+            </a:pathLst>
+          </a:custGeom>
+          <a:ln w="9525" cap="flat" cmpd="sng" algn="ctr">
+            <a:solidFill>
+              <a:schemeClr val="accent1"/>
+            </a:solidFill>
+            <a:prstDash val="solid"/>
+            <a:round/>
+            <a:headEnd type="none" w="med" len="med"/>
+            <a:tailEnd type="arrow" w="med" len="med"/>
+          </a:ln>
+        </p:spPr>
+        <p:style>
+          <a:lnRef idx="0">
+            <a:scrgbClr r="0" g="0" b="0"/>
+          </a:lnRef>
+          <a:fillRef idx="0">
+            <a:scrgbClr r="0" g="0" b="0"/>
+          </a:fillRef>
+          <a:effectRef idx="0">
+            <a:scrgbClr r="0" g="0" b="0"/>
+          </a:effectRef>
+          <a:fontRef idx="minor">
+            <a:schemeClr val="tx1"/>
+          </a:fontRef>
+        </p:style>
+        <p:txBody>
+          <a:bodyPr rtlCol="0" anchor="ctr"/>
+          <a:lstStyle/>
+          <a:p>
+            <a:pPr algn="ctr"/>
+            <a:endParaRPr lang="en-US"/>
+          </a:p>
+        </p:txBody>
+      </p:sp>
+      <p:sp>
+        <p:nvSpPr>
+          <p:cNvPr id="13" name="TextBox 12"/>
+          <p:cNvSpPr txBox="1"/>
+          <p:nvPr/>
+        </p:nvSpPr>
+        <p:spPr>
+          <a:xfrm>
+            <a:off x="2238925" y="1329180"/>
+            <a:ext cx="452368" cy="276999"/>
+          </a:xfrm>
+          <a:prstGeom prst="rect">
+            <a:avLst/>
+          </a:prstGeom>
+          <a:noFill/>
+        </p:spPr>
+        <p:txBody>
+          <a:bodyPr wrap="none" rtlCol="0">
+            <a:spAutoFit/>
+          </a:bodyPr>
+          <a:lstStyle/>
+          <a:p>
+            <a:r>
+              <a:rPr lang="en-US" sz="1200" dirty="0"/>
+              <a:t>(</a:t>
+            </a:r>
+            <a:r>
+              <a:rPr lang="en-US" sz="1200" dirty="0" err="1"/>
+              <a:t>x,y</a:t>
+            </a:r>
+            <a:r>
+              <a:rPr lang="en-US" sz="1200" dirty="0"/>
+              <a:t>)</a:t>
+            </a:r>
+          </a:p>
+        </p:txBody>
+      </p:sp>
+      <p:sp>
+        <p:nvSpPr>
+          <p:cNvPr id="14" name="Freeform: Shape 13"/>
+          <p:cNvSpPr/>
+          <p:nvPr/>
+        </p:nvSpPr>
+        <p:spPr>
+          <a:xfrm>
+            <a:off x="2630466" y="1336364"/>
+            <a:ext cx="438411" cy="357913"/>
+          </a:xfrm>
+          <a:custGeom>
+            <a:avLst/>
+            <a:gdLst>
+              <a:gd name="connsiteX0" fmla="*/ 0 w 438411"/>
+              <a:gd name="connsiteY0" fmla="*/ 110392 h 357913"/>
+              <a:gd name="connsiteX1" fmla="*/ 319413 w 438411"/>
+              <a:gd name="connsiteY1" fmla="*/ 10184 h 357913"/>
+              <a:gd name="connsiteX2" fmla="*/ 269309 w 438411"/>
+              <a:gd name="connsiteY2" fmla="*/ 329598 h 357913"/>
+              <a:gd name="connsiteX3" fmla="*/ 438411 w 438411"/>
+              <a:gd name="connsiteY3" fmla="*/ 342124 h 357913"/>
+              <a:gd name="connsiteX4" fmla="*/ 438411 w 438411"/>
+              <a:gd name="connsiteY4" fmla="*/ 342124 h 357913"/>
+            </a:gdLst>
+            <a:ahLst/>
+            <a:cxnLst>
+              <a:cxn ang="0">
+                <a:pos x="connsiteX0" y="connsiteY0"/>
+              </a:cxn>
+              <a:cxn ang="0">
+                <a:pos x="connsiteX1" y="connsiteY1"/>
+              </a:cxn>
+              <a:cxn ang="0">
+                <a:pos x="connsiteX2" y="connsiteY2"/>
+              </a:cxn>
+              <a:cxn ang="0">
+                <a:pos x="connsiteX3" y="connsiteY3"/>
+              </a:cxn>
+              <a:cxn ang="0">
+                <a:pos x="connsiteX4" y="connsiteY4"/>
+              </a:cxn>
+            </a:cxnLst>
+            <a:rect l="l" t="t" r="r" b="b"/>
+            <a:pathLst>
+              <a:path w="438411" h="357913">
+                <a:moveTo>
+                  <a:pt x="0" y="110392"/>
+                </a:moveTo>
+                <a:cubicBezTo>
+                  <a:pt x="137264" y="42021"/>
+                  <a:pt x="274528" y="-26350"/>
+                  <a:pt x="319413" y="10184"/>
+                </a:cubicBezTo>
+                <a:cubicBezTo>
+                  <a:pt x="364298" y="46718"/>
+                  <a:pt x="249476" y="274275"/>
+                  <a:pt x="269309" y="329598"/>
+                </a:cubicBezTo>
+                <a:cubicBezTo>
+                  <a:pt x="289142" y="384921"/>
+                  <a:pt x="438411" y="342124"/>
+                  <a:pt x="438411" y="342124"/>
+                </a:cubicBezTo>
+                <a:lnTo>
+                  <a:pt x="438411" y="342124"/>
+                </a:lnTo>
+              </a:path>
+            </a:pathLst>
+          </a:custGeom>
+          <a:ln w="9525" cap="flat" cmpd="sng" algn="ctr">
+            <a:solidFill>
+              <a:schemeClr val="accent1"/>
+            </a:solidFill>
+            <a:prstDash val="solid"/>
+            <a:round/>
+            <a:headEnd type="none" w="med" len="med"/>
+            <a:tailEnd type="arrow" w="med" len="med"/>
+          </a:ln>
+        </p:spPr>
+        <p:style>
+          <a:lnRef idx="0">
+            <a:scrgbClr r="0" g="0" b="0"/>
+          </a:lnRef>
+          <a:fillRef idx="0">
+            <a:scrgbClr r="0" g="0" b="0"/>
+          </a:fillRef>
+          <a:effectRef idx="0">
+            <a:scrgbClr r="0" g="0" b="0"/>
+          </a:effectRef>
+          <a:fontRef idx="minor">
+            <a:schemeClr val="tx1"/>
+          </a:fontRef>
+        </p:style>
+        <p:txBody>
+          <a:bodyPr rtlCol="0" anchor="ctr"/>
+          <a:lstStyle/>
+          <a:p>
+            <a:pPr algn="ctr"/>
+            <a:endParaRPr lang="en-US"/>
+          </a:p>
+        </p:txBody>
+      </p:sp>
+    </p:spTree>
+    <p:extLst>
+      <p:ext uri="{BB962C8B-B14F-4D97-AF65-F5344CB8AC3E}">
+        <p14:creationId xmlns:p14="http://schemas.microsoft.com/office/powerpoint/2010/main" val="3362309811"/>
+      </p:ext>
+    </p:extLst>
+  </p:cSld>
+  <p:clrMapOvr>
+    <a:masterClrMapping/>
+  </p:clrMapOvr>
+</p:sld>
+</file>
+
 <file path=ppt/theme/theme1.xml><?xml version="1.0" encoding="utf-8"?>
 <a:theme xmlns:a="http://schemas.openxmlformats.org/drawingml/2006/main" name="Office Theme">
   <a:themeElements>

</xml_diff>

<commit_message>
lots of new stuff on functions
</commit_message>
<xml_diff>
--- a/images/pygame_rect_window.pptx
+++ b/images/pygame_rect_window.pptx
@@ -7,6 +7,10 @@
   <p:sldIdLst>
     <p:sldId id="257" r:id="rId2"/>
     <p:sldId id="258" r:id="rId3"/>
+    <p:sldId id="259" r:id="rId4"/>
+    <p:sldId id="260" r:id="rId5"/>
+    <p:sldId id="261" r:id="rId6"/>
+    <p:sldId id="262" r:id="rId7"/>
   </p:sldIdLst>
   <p:sldSz cx="12192000" cy="6858000"/>
   <p:notesSz cx="6858000" cy="9144000"/>
@@ -246,7 +250,7 @@
           <a:p>
             <a:fld id="{856FFBE8-0159-4FDA-8D70-04C5D85E84A4}" type="datetimeFigureOut">
               <a:rPr lang="en-US" smtClean="0"/>
-              <a:t>5/27/2017</a:t>
+              <a:t>5/29/2017</a:t>
             </a:fld>
             <a:endParaRPr lang="en-US"/>
           </a:p>
@@ -414,7 +418,7 @@
           <a:p>
             <a:fld id="{856FFBE8-0159-4FDA-8D70-04C5D85E84A4}" type="datetimeFigureOut">
               <a:rPr lang="en-US" smtClean="0"/>
-              <a:t>5/27/2017</a:t>
+              <a:t>5/29/2017</a:t>
             </a:fld>
             <a:endParaRPr lang="en-US"/>
           </a:p>
@@ -592,7 +596,7 @@
           <a:p>
             <a:fld id="{856FFBE8-0159-4FDA-8D70-04C5D85E84A4}" type="datetimeFigureOut">
               <a:rPr lang="en-US" smtClean="0"/>
-              <a:t>5/27/2017</a:t>
+              <a:t>5/29/2017</a:t>
             </a:fld>
             <a:endParaRPr lang="en-US"/>
           </a:p>
@@ -760,7 +764,7 @@
           <a:p>
             <a:fld id="{856FFBE8-0159-4FDA-8D70-04C5D85E84A4}" type="datetimeFigureOut">
               <a:rPr lang="en-US" smtClean="0"/>
-              <a:t>5/27/2017</a:t>
+              <a:t>5/29/2017</a:t>
             </a:fld>
             <a:endParaRPr lang="en-US"/>
           </a:p>
@@ -1005,7 +1009,7 @@
           <a:p>
             <a:fld id="{856FFBE8-0159-4FDA-8D70-04C5D85E84A4}" type="datetimeFigureOut">
               <a:rPr lang="en-US" smtClean="0"/>
-              <a:t>5/27/2017</a:t>
+              <a:t>5/29/2017</a:t>
             </a:fld>
             <a:endParaRPr lang="en-US"/>
           </a:p>
@@ -1234,7 +1238,7 @@
           <a:p>
             <a:fld id="{856FFBE8-0159-4FDA-8D70-04C5D85E84A4}" type="datetimeFigureOut">
               <a:rPr lang="en-US" smtClean="0"/>
-              <a:t>5/27/2017</a:t>
+              <a:t>5/29/2017</a:t>
             </a:fld>
             <a:endParaRPr lang="en-US"/>
           </a:p>
@@ -1598,7 +1602,7 @@
           <a:p>
             <a:fld id="{856FFBE8-0159-4FDA-8D70-04C5D85E84A4}" type="datetimeFigureOut">
               <a:rPr lang="en-US" smtClean="0"/>
-              <a:t>5/27/2017</a:t>
+              <a:t>5/29/2017</a:t>
             </a:fld>
             <a:endParaRPr lang="en-US"/>
           </a:p>
@@ -1715,7 +1719,7 @@
           <a:p>
             <a:fld id="{856FFBE8-0159-4FDA-8D70-04C5D85E84A4}" type="datetimeFigureOut">
               <a:rPr lang="en-US" smtClean="0"/>
-              <a:t>5/27/2017</a:t>
+              <a:t>5/29/2017</a:t>
             </a:fld>
             <a:endParaRPr lang="en-US"/>
           </a:p>
@@ -1810,7 +1814,7 @@
           <a:p>
             <a:fld id="{856FFBE8-0159-4FDA-8D70-04C5D85E84A4}" type="datetimeFigureOut">
               <a:rPr lang="en-US" smtClean="0"/>
-              <a:t>5/27/2017</a:t>
+              <a:t>5/29/2017</a:t>
             </a:fld>
             <a:endParaRPr lang="en-US"/>
           </a:p>
@@ -2085,7 +2089,7 @@
           <a:p>
             <a:fld id="{856FFBE8-0159-4FDA-8D70-04C5D85E84A4}" type="datetimeFigureOut">
               <a:rPr lang="en-US" smtClean="0"/>
-              <a:t>5/27/2017</a:t>
+              <a:t>5/29/2017</a:t>
             </a:fld>
             <a:endParaRPr lang="en-US"/>
           </a:p>
@@ -2337,7 +2341,7 @@
           <a:p>
             <a:fld id="{856FFBE8-0159-4FDA-8D70-04C5D85E84A4}" type="datetimeFigureOut">
               <a:rPr lang="en-US" smtClean="0"/>
-              <a:t>5/27/2017</a:t>
+              <a:t>5/29/2017</a:t>
             </a:fld>
             <a:endParaRPr lang="en-US"/>
           </a:p>
@@ -2548,7 +2552,7 @@
           <a:p>
             <a:fld id="{856FFBE8-0159-4FDA-8D70-04C5D85E84A4}" type="datetimeFigureOut">
               <a:rPr lang="en-US" smtClean="0"/>
-              <a:t>5/27/2017</a:t>
+              <a:t>5/29/2017</a:t>
             </a:fld>
             <a:endParaRPr lang="en-US"/>
           </a:p>
@@ -4209,6 +4213,1491 @@
 </p:sld>
 </file>
 
+<file path=ppt/slides/slide3.xml><?xml version="1.0" encoding="utf-8"?>
+<p:sld xmlns:a="http://schemas.openxmlformats.org/drawingml/2006/main" xmlns:r="http://schemas.openxmlformats.org/officeDocument/2006/relationships" xmlns:p="http://schemas.openxmlformats.org/presentationml/2006/main">
+  <p:cSld>
+    <p:spTree>
+      <p:nvGrpSpPr>
+        <p:cNvPr id="1" name=""/>
+        <p:cNvGrpSpPr/>
+        <p:nvPr/>
+      </p:nvGrpSpPr>
+      <p:grpSpPr>
+        <a:xfrm>
+          <a:off x="0" y="0"/>
+          <a:ext cx="0" cy="0"/>
+          <a:chOff x="0" y="0"/>
+          <a:chExt cx="0" cy="0"/>
+        </a:xfrm>
+      </p:grpSpPr>
+      <p:sp>
+        <p:nvSpPr>
+          <p:cNvPr id="4" name="Rectangle 3"/>
+          <p:cNvSpPr/>
+          <p:nvPr/>
+        </p:nvSpPr>
+        <p:spPr>
+          <a:xfrm>
+            <a:off x="1893209" y="1542128"/>
+            <a:ext cx="682668" cy="601249"/>
+          </a:xfrm>
+          <a:prstGeom prst="rect">
+            <a:avLst/>
+          </a:prstGeom>
+          <a:solidFill>
+            <a:schemeClr val="bg1"/>
+          </a:solidFill>
+        </p:spPr>
+        <p:style>
+          <a:lnRef idx="2">
+            <a:schemeClr val="accent1">
+              <a:shade val="50000"/>
+            </a:schemeClr>
+          </a:lnRef>
+          <a:fillRef idx="1">
+            <a:schemeClr val="accent1"/>
+          </a:fillRef>
+          <a:effectRef idx="0">
+            <a:schemeClr val="accent1"/>
+          </a:effectRef>
+          <a:fontRef idx="minor">
+            <a:schemeClr val="lt1"/>
+          </a:fontRef>
+        </p:style>
+        <p:txBody>
+          <a:bodyPr rtlCol="0" anchor="ctr"/>
+          <a:lstStyle/>
+          <a:p>
+            <a:pPr algn="ctr"/>
+            <a:r>
+              <a:rPr lang="en-US" sz="1200" dirty="0">
+                <a:solidFill>
+                  <a:schemeClr val="tx1">
+                    <a:lumMod val="95000"/>
+                    <a:lumOff val="5000"/>
+                  </a:schemeClr>
+                </a:solidFill>
+                <a:latin typeface="Consolas" panose="020B0609020204030204" pitchFamily="49" charset="0"/>
+              </a:rPr>
+              <a:t>73</a:t>
+            </a:r>
+          </a:p>
+        </p:txBody>
+      </p:sp>
+      <p:sp>
+        <p:nvSpPr>
+          <p:cNvPr id="5" name="TextBox 4"/>
+          <p:cNvSpPr txBox="1"/>
+          <p:nvPr/>
+        </p:nvSpPr>
+        <p:spPr>
+          <a:xfrm>
+            <a:off x="1824316" y="1260292"/>
+            <a:ext cx="269626" cy="276999"/>
+          </a:xfrm>
+          <a:prstGeom prst="rect">
+            <a:avLst/>
+          </a:prstGeom>
+          <a:noFill/>
+        </p:spPr>
+        <p:txBody>
+          <a:bodyPr wrap="none" rtlCol="0">
+            <a:spAutoFit/>
+          </a:bodyPr>
+          <a:lstStyle/>
+          <a:p>
+            <a:r>
+              <a:rPr lang="en-US" sz="1200" dirty="0">
+                <a:latin typeface="Consolas" panose="020B0609020204030204" pitchFamily="49" charset="0"/>
+              </a:rPr>
+              <a:t>x</a:t>
+            </a:r>
+          </a:p>
+        </p:txBody>
+      </p:sp>
+      <p:pic>
+        <p:nvPicPr>
+          <p:cNvPr id="6" name="Picture 5"/>
+          <p:cNvPicPr>
+            <a:picLocks noChangeAspect="1"/>
+          </p:cNvPicPr>
+          <p:nvPr/>
+        </p:nvPicPr>
+        <p:blipFill>
+          <a:blip r:embed="rId2"/>
+          <a:stretch>
+            <a:fillRect/>
+          </a:stretch>
+        </p:blipFill>
+        <p:spPr>
+          <a:xfrm>
+            <a:off x="4068219" y="1260292"/>
+            <a:ext cx="2013167" cy="1444665"/>
+          </a:xfrm>
+          <a:prstGeom prst="rect">
+            <a:avLst/>
+          </a:prstGeom>
+        </p:spPr>
+      </p:pic>
+      <p:sp>
+        <p:nvSpPr>
+          <p:cNvPr id="7" name="TextBox 6"/>
+          <p:cNvSpPr txBox="1"/>
+          <p:nvPr/>
+        </p:nvSpPr>
+        <p:spPr>
+          <a:xfrm>
+            <a:off x="3102276" y="1774518"/>
+            <a:ext cx="439544" cy="276999"/>
+          </a:xfrm>
+          <a:prstGeom prst="rect">
+            <a:avLst/>
+          </a:prstGeom>
+          <a:noFill/>
+        </p:spPr>
+        <p:txBody>
+          <a:bodyPr wrap="none" rtlCol="0">
+            <a:spAutoFit/>
+          </a:bodyPr>
+          <a:lstStyle/>
+          <a:p>
+            <a:r>
+              <a:rPr lang="en-US" sz="1200" dirty="0">
+                <a:latin typeface="Consolas" panose="020B0609020204030204" pitchFamily="49" charset="0"/>
+              </a:rPr>
+              <a:t>win</a:t>
+            </a:r>
+          </a:p>
+        </p:txBody>
+      </p:sp>
+      <p:sp>
+        <p:nvSpPr>
+          <p:cNvPr id="8" name="Freeform: Shape 7"/>
+          <p:cNvSpPr/>
+          <p:nvPr/>
+        </p:nvSpPr>
+        <p:spPr>
+          <a:xfrm>
+            <a:off x="3356975" y="1653251"/>
+            <a:ext cx="707721" cy="238238"/>
+          </a:xfrm>
+          <a:custGeom>
+            <a:avLst/>
+            <a:gdLst>
+              <a:gd name="connsiteX0" fmla="*/ 0 w 707721"/>
+              <a:gd name="connsiteY0" fmla="*/ 206864 h 238238"/>
+              <a:gd name="connsiteX1" fmla="*/ 225469 w 707721"/>
+              <a:gd name="connsiteY1" fmla="*/ 185 h 238238"/>
+              <a:gd name="connsiteX2" fmla="*/ 457200 w 707721"/>
+              <a:gd name="connsiteY2" fmla="*/ 238179 h 238238"/>
+              <a:gd name="connsiteX3" fmla="*/ 707721 w 707721"/>
+              <a:gd name="connsiteY3" fmla="*/ 25237 h 238238"/>
+              <a:gd name="connsiteX4" fmla="*/ 707721 w 707721"/>
+              <a:gd name="connsiteY4" fmla="*/ 25237 h 238238"/>
+            </a:gdLst>
+            <a:ahLst/>
+            <a:cxnLst>
+              <a:cxn ang="0">
+                <a:pos x="connsiteX0" y="connsiteY0"/>
+              </a:cxn>
+              <a:cxn ang="0">
+                <a:pos x="connsiteX1" y="connsiteY1"/>
+              </a:cxn>
+              <a:cxn ang="0">
+                <a:pos x="connsiteX2" y="connsiteY2"/>
+              </a:cxn>
+              <a:cxn ang="0">
+                <a:pos x="connsiteX3" y="connsiteY3"/>
+              </a:cxn>
+              <a:cxn ang="0">
+                <a:pos x="connsiteX4" y="connsiteY4"/>
+              </a:cxn>
+            </a:cxnLst>
+            <a:rect l="l" t="t" r="r" b="b"/>
+            <a:pathLst>
+              <a:path w="707721" h="238238">
+                <a:moveTo>
+                  <a:pt x="0" y="206864"/>
+                </a:moveTo>
+                <a:cubicBezTo>
+                  <a:pt x="74634" y="100915"/>
+                  <a:pt x="149269" y="-5034"/>
+                  <a:pt x="225469" y="185"/>
+                </a:cubicBezTo>
+                <a:cubicBezTo>
+                  <a:pt x="301669" y="5404"/>
+                  <a:pt x="376825" y="234004"/>
+                  <a:pt x="457200" y="238179"/>
+                </a:cubicBezTo>
+                <a:cubicBezTo>
+                  <a:pt x="537575" y="242354"/>
+                  <a:pt x="707721" y="25237"/>
+                  <a:pt x="707721" y="25237"/>
+                </a:cubicBezTo>
+                <a:lnTo>
+                  <a:pt x="707721" y="25237"/>
+                </a:lnTo>
+              </a:path>
+            </a:pathLst>
+          </a:custGeom>
+          <a:noFill/>
+          <a:ln>
+            <a:headEnd type="none" w="med" len="med"/>
+            <a:tailEnd type="arrow" w="med" len="med"/>
+          </a:ln>
+        </p:spPr>
+        <p:style>
+          <a:lnRef idx="2">
+            <a:schemeClr val="accent1">
+              <a:shade val="50000"/>
+            </a:schemeClr>
+          </a:lnRef>
+          <a:fillRef idx="1">
+            <a:schemeClr val="accent1"/>
+          </a:fillRef>
+          <a:effectRef idx="0">
+            <a:schemeClr val="accent1"/>
+          </a:effectRef>
+          <a:fontRef idx="minor">
+            <a:schemeClr val="lt1"/>
+          </a:fontRef>
+        </p:style>
+        <p:txBody>
+          <a:bodyPr rtlCol="0" anchor="ctr"/>
+          <a:lstStyle/>
+          <a:p>
+            <a:pPr algn="ctr"/>
+            <a:endParaRPr lang="en-US"/>
+          </a:p>
+        </p:txBody>
+      </p:sp>
+    </p:spTree>
+    <p:extLst>
+      <p:ext uri="{BB962C8B-B14F-4D97-AF65-F5344CB8AC3E}">
+        <p14:creationId xmlns:p14="http://schemas.microsoft.com/office/powerpoint/2010/main" val="1211234367"/>
+      </p:ext>
+    </p:extLst>
+  </p:cSld>
+  <p:clrMapOvr>
+    <a:masterClrMapping/>
+  </p:clrMapOvr>
+</p:sld>
+</file>
+
+<file path=ppt/slides/slide4.xml><?xml version="1.0" encoding="utf-8"?>
+<p:sld xmlns:a="http://schemas.openxmlformats.org/drawingml/2006/main" xmlns:r="http://schemas.openxmlformats.org/officeDocument/2006/relationships" xmlns:p="http://schemas.openxmlformats.org/presentationml/2006/main">
+  <p:cSld>
+    <p:spTree>
+      <p:nvGrpSpPr>
+        <p:cNvPr id="1" name=""/>
+        <p:cNvGrpSpPr/>
+        <p:nvPr/>
+      </p:nvGrpSpPr>
+      <p:grpSpPr>
+        <a:xfrm>
+          <a:off x="0" y="0"/>
+          <a:ext cx="0" cy="0"/>
+          <a:chOff x="0" y="0"/>
+          <a:chExt cx="0" cy="0"/>
+        </a:xfrm>
+      </p:grpSpPr>
+      <p:sp>
+        <p:nvSpPr>
+          <p:cNvPr id="4" name="Cloud 3"/>
+          <p:cNvSpPr/>
+          <p:nvPr/>
+        </p:nvSpPr>
+        <p:spPr>
+          <a:xfrm>
+            <a:off x="1202499" y="791225"/>
+            <a:ext cx="2198317" cy="1653435"/>
+          </a:xfrm>
+          <a:prstGeom prst="cloud">
+            <a:avLst/>
+          </a:prstGeom>
+          <a:solidFill>
+            <a:schemeClr val="bg1"/>
+          </a:solidFill>
+        </p:spPr>
+        <p:style>
+          <a:lnRef idx="2">
+            <a:schemeClr val="accent1">
+              <a:shade val="50000"/>
+            </a:schemeClr>
+          </a:lnRef>
+          <a:fillRef idx="1">
+            <a:schemeClr val="accent1"/>
+          </a:fillRef>
+          <a:effectRef idx="0">
+            <a:schemeClr val="accent1"/>
+          </a:effectRef>
+          <a:fontRef idx="minor">
+            <a:schemeClr val="lt1"/>
+          </a:fontRef>
+        </p:style>
+        <p:txBody>
+          <a:bodyPr rtlCol="0" anchor="ctr"/>
+          <a:lstStyle/>
+          <a:p>
+            <a:pPr algn="ctr"/>
+            <a:endParaRPr lang="en-US" dirty="0"/>
+          </a:p>
+        </p:txBody>
+      </p:sp>
+      <p:sp>
+        <p:nvSpPr>
+          <p:cNvPr id="5" name="Cloud 4"/>
+          <p:cNvSpPr/>
+          <p:nvPr/>
+        </p:nvSpPr>
+        <p:spPr>
+          <a:xfrm>
+            <a:off x="4354883" y="791225"/>
+            <a:ext cx="2198317" cy="1653435"/>
+          </a:xfrm>
+          <a:prstGeom prst="cloud">
+            <a:avLst/>
+          </a:prstGeom>
+          <a:solidFill>
+            <a:schemeClr val="bg1"/>
+          </a:solidFill>
+        </p:spPr>
+        <p:style>
+          <a:lnRef idx="2">
+            <a:schemeClr val="accent1">
+              <a:shade val="50000"/>
+            </a:schemeClr>
+          </a:lnRef>
+          <a:fillRef idx="1">
+            <a:schemeClr val="accent1"/>
+          </a:fillRef>
+          <a:effectRef idx="0">
+            <a:schemeClr val="accent1"/>
+          </a:effectRef>
+          <a:fontRef idx="minor">
+            <a:schemeClr val="lt1"/>
+          </a:fontRef>
+        </p:style>
+        <p:txBody>
+          <a:bodyPr rtlCol="0" anchor="ctr"/>
+          <a:lstStyle/>
+          <a:p>
+            <a:pPr algn="ctr"/>
+            <a:endParaRPr lang="en-US"/>
+          </a:p>
+        </p:txBody>
+      </p:sp>
+      <p:sp>
+        <p:nvSpPr>
+          <p:cNvPr id="6" name="TextBox 5"/>
+          <p:cNvSpPr txBox="1"/>
+          <p:nvPr/>
+        </p:nvSpPr>
+        <p:spPr>
+          <a:xfrm>
+            <a:off x="1680407" y="1133606"/>
+            <a:ext cx="263214" cy="276999"/>
+          </a:xfrm>
+          <a:prstGeom prst="rect">
+            <a:avLst/>
+          </a:prstGeom>
+          <a:noFill/>
+        </p:spPr>
+        <p:txBody>
+          <a:bodyPr wrap="none" rtlCol="0">
+            <a:spAutoFit/>
+          </a:bodyPr>
+          <a:lstStyle/>
+          <a:p>
+            <a:r>
+              <a:rPr lang="en-US" sz="1200" dirty="0"/>
+              <a:t>4</a:t>
+            </a:r>
+          </a:p>
+        </p:txBody>
+      </p:sp>
+      <p:sp>
+        <p:nvSpPr>
+          <p:cNvPr id="8" name="TextBox 7"/>
+          <p:cNvSpPr txBox="1"/>
+          <p:nvPr/>
+        </p:nvSpPr>
+        <p:spPr>
+          <a:xfrm>
+            <a:off x="4680558" y="1734855"/>
+            <a:ext cx="263214" cy="276999"/>
+          </a:xfrm>
+          <a:prstGeom prst="rect">
+            <a:avLst/>
+          </a:prstGeom>
+          <a:noFill/>
+        </p:spPr>
+        <p:txBody>
+          <a:bodyPr wrap="none" rtlCol="0">
+            <a:spAutoFit/>
+          </a:bodyPr>
+          <a:lstStyle/>
+          <a:p>
+            <a:r>
+              <a:rPr lang="en-US" sz="1200" dirty="0"/>
+              <a:t>2</a:t>
+            </a:r>
+          </a:p>
+        </p:txBody>
+      </p:sp>
+      <p:sp>
+        <p:nvSpPr>
+          <p:cNvPr id="9" name="TextBox 8"/>
+          <p:cNvSpPr txBox="1"/>
+          <p:nvPr/>
+        </p:nvSpPr>
+        <p:spPr>
+          <a:xfrm>
+            <a:off x="1548800" y="1487848"/>
+            <a:ext cx="263214" cy="276999"/>
+          </a:xfrm>
+          <a:prstGeom prst="rect">
+            <a:avLst/>
+          </a:prstGeom>
+          <a:noFill/>
+        </p:spPr>
+        <p:txBody>
+          <a:bodyPr wrap="none" rtlCol="0">
+            <a:spAutoFit/>
+          </a:bodyPr>
+          <a:lstStyle/>
+          <a:p>
+            <a:r>
+              <a:rPr lang="en-US" sz="1200" dirty="0"/>
+              <a:t>9</a:t>
+            </a:r>
+          </a:p>
+        </p:txBody>
+      </p:sp>
+      <p:sp>
+        <p:nvSpPr>
+          <p:cNvPr id="10" name="TextBox 9"/>
+          <p:cNvSpPr txBox="1"/>
+          <p:nvPr/>
+        </p:nvSpPr>
+        <p:spPr>
+          <a:xfrm>
+            <a:off x="5164812" y="1123167"/>
+            <a:ext cx="263214" cy="276999"/>
+          </a:xfrm>
+          <a:prstGeom prst="rect">
+            <a:avLst/>
+          </a:prstGeom>
+          <a:noFill/>
+        </p:spPr>
+        <p:txBody>
+          <a:bodyPr wrap="none" rtlCol="0">
+            <a:spAutoFit/>
+          </a:bodyPr>
+          <a:lstStyle/>
+          <a:p>
+            <a:r>
+              <a:rPr lang="en-US" sz="1200" dirty="0"/>
+              <a:t>3</a:t>
+            </a:r>
+          </a:p>
+        </p:txBody>
+      </p:sp>
+      <p:sp>
+        <p:nvSpPr>
+          <p:cNvPr id="11" name="TextBox 10"/>
+          <p:cNvSpPr txBox="1"/>
+          <p:nvPr/>
+        </p:nvSpPr>
+        <p:spPr>
+          <a:xfrm>
+            <a:off x="2327544" y="1719859"/>
+            <a:ext cx="263214" cy="276999"/>
+          </a:xfrm>
+          <a:prstGeom prst="rect">
+            <a:avLst/>
+          </a:prstGeom>
+          <a:noFill/>
+        </p:spPr>
+        <p:txBody>
+          <a:bodyPr wrap="none" rtlCol="0">
+            <a:spAutoFit/>
+          </a:bodyPr>
+          <a:lstStyle/>
+          <a:p>
+            <a:r>
+              <a:rPr lang="en-US" sz="1200" dirty="0"/>
+              <a:t>2</a:t>
+            </a:r>
+          </a:p>
+        </p:txBody>
+      </p:sp>
+      <p:sp>
+        <p:nvSpPr>
+          <p:cNvPr id="12" name="TextBox 11"/>
+          <p:cNvSpPr txBox="1"/>
+          <p:nvPr/>
+        </p:nvSpPr>
+        <p:spPr>
+          <a:xfrm>
+            <a:off x="5158797" y="1410605"/>
+            <a:ext cx="721672" cy="276999"/>
+          </a:xfrm>
+          <a:prstGeom prst="rect">
+            <a:avLst/>
+          </a:prstGeom>
+          <a:noFill/>
+        </p:spPr>
+        <p:txBody>
+          <a:bodyPr wrap="none" rtlCol="0">
+            <a:spAutoFit/>
+          </a:bodyPr>
+          <a:lstStyle/>
+          <a:p>
+            <a:r>
+              <a:rPr lang="en-US" sz="1200" dirty="0"/>
+              <a:t>1.4142…</a:t>
+            </a:r>
+          </a:p>
+        </p:txBody>
+      </p:sp>
+      <p:cxnSp>
+        <p:nvCxnSpPr>
+          <p:cNvPr id="16" name="Straight Arrow Connector 15"/>
+          <p:cNvCxnSpPr>
+            <a:endCxn id="8" idx="1"/>
+          </p:cNvCxnSpPr>
+          <p:nvPr/>
+        </p:nvCxnSpPr>
+        <p:spPr>
+          <a:xfrm>
+            <a:off x="1943621" y="1272105"/>
+            <a:ext cx="2736937" cy="601250"/>
+          </a:xfrm>
+          <a:prstGeom prst="straightConnector1">
+            <a:avLst/>
+          </a:prstGeom>
+          <a:ln>
+            <a:tailEnd type="triangle"/>
+          </a:ln>
+        </p:spPr>
+        <p:style>
+          <a:lnRef idx="1">
+            <a:schemeClr val="accent1"/>
+          </a:lnRef>
+          <a:fillRef idx="0">
+            <a:schemeClr val="accent1"/>
+          </a:fillRef>
+          <a:effectRef idx="0">
+            <a:schemeClr val="accent1"/>
+          </a:effectRef>
+          <a:fontRef idx="minor">
+            <a:schemeClr val="tx1"/>
+          </a:fontRef>
+        </p:style>
+      </p:cxnSp>
+      <p:cxnSp>
+        <p:nvCxnSpPr>
+          <p:cNvPr id="18" name="Straight Arrow Connector 17"/>
+          <p:cNvCxnSpPr>
+            <a:stCxn id="9" idx="3"/>
+            <a:endCxn id="10" idx="1"/>
+          </p:cNvCxnSpPr>
+          <p:nvPr/>
+        </p:nvCxnSpPr>
+        <p:spPr>
+          <a:xfrm flipV="1">
+            <a:off x="1812014" y="1261667"/>
+            <a:ext cx="3352798" cy="364681"/>
+          </a:xfrm>
+          <a:prstGeom prst="straightConnector1">
+            <a:avLst/>
+          </a:prstGeom>
+          <a:ln>
+            <a:tailEnd type="triangle"/>
+          </a:ln>
+        </p:spPr>
+        <p:style>
+          <a:lnRef idx="1">
+            <a:schemeClr val="accent1"/>
+          </a:lnRef>
+          <a:fillRef idx="0">
+            <a:schemeClr val="accent1"/>
+          </a:fillRef>
+          <a:effectRef idx="0">
+            <a:schemeClr val="accent1"/>
+          </a:effectRef>
+          <a:fontRef idx="minor">
+            <a:schemeClr val="tx1"/>
+          </a:fontRef>
+        </p:style>
+      </p:cxnSp>
+      <p:cxnSp>
+        <p:nvCxnSpPr>
+          <p:cNvPr id="20" name="Straight Arrow Connector 19"/>
+          <p:cNvCxnSpPr>
+            <a:stCxn id="11" idx="3"/>
+            <a:endCxn id="12" idx="1"/>
+          </p:cNvCxnSpPr>
+          <p:nvPr/>
+        </p:nvCxnSpPr>
+        <p:spPr>
+          <a:xfrm flipV="1">
+            <a:off x="2590758" y="1549105"/>
+            <a:ext cx="2568039" cy="309254"/>
+          </a:xfrm>
+          <a:prstGeom prst="straightConnector1">
+            <a:avLst/>
+          </a:prstGeom>
+          <a:ln>
+            <a:tailEnd type="triangle"/>
+          </a:ln>
+        </p:spPr>
+        <p:style>
+          <a:lnRef idx="1">
+            <a:schemeClr val="accent1"/>
+          </a:lnRef>
+          <a:fillRef idx="0">
+            <a:schemeClr val="accent1"/>
+          </a:fillRef>
+          <a:effectRef idx="0">
+            <a:schemeClr val="accent1"/>
+          </a:effectRef>
+          <a:fontRef idx="minor">
+            <a:schemeClr val="tx1"/>
+          </a:fontRef>
+        </p:style>
+      </p:cxnSp>
+      <p:sp>
+        <p:nvSpPr>
+          <p:cNvPr id="21" name="TextBox 20"/>
+          <p:cNvSpPr txBox="1"/>
+          <p:nvPr/>
+        </p:nvSpPr>
+        <p:spPr>
+          <a:xfrm>
+            <a:off x="5234779" y="2484483"/>
+            <a:ext cx="569708" cy="276999"/>
+          </a:xfrm>
+          <a:prstGeom prst="rect">
+            <a:avLst/>
+          </a:prstGeom>
+          <a:noFill/>
+        </p:spPr>
+        <p:txBody>
+          <a:bodyPr wrap="none" rtlCol="0">
+            <a:spAutoFit/>
+          </a:bodyPr>
+          <a:lstStyle/>
+          <a:p>
+            <a:r>
+              <a:rPr lang="en-US" sz="1200" dirty="0"/>
+              <a:t>Range</a:t>
+            </a:r>
+          </a:p>
+        </p:txBody>
+      </p:sp>
+      <p:sp>
+        <p:nvSpPr>
+          <p:cNvPr id="22" name="TextBox 21"/>
+          <p:cNvSpPr txBox="1"/>
+          <p:nvPr/>
+        </p:nvSpPr>
+        <p:spPr>
+          <a:xfrm>
+            <a:off x="1812014" y="2484484"/>
+            <a:ext cx="673582" cy="276999"/>
+          </a:xfrm>
+          <a:prstGeom prst="rect">
+            <a:avLst/>
+          </a:prstGeom>
+          <a:noFill/>
+        </p:spPr>
+        <p:txBody>
+          <a:bodyPr wrap="none" rtlCol="0">
+            <a:spAutoFit/>
+          </a:bodyPr>
+          <a:lstStyle/>
+          <a:p>
+            <a:r>
+              <a:rPr lang="en-US" sz="1200" dirty="0"/>
+              <a:t>Domain</a:t>
+            </a:r>
+          </a:p>
+        </p:txBody>
+      </p:sp>
+    </p:spTree>
+    <p:extLst>
+      <p:ext uri="{BB962C8B-B14F-4D97-AF65-F5344CB8AC3E}">
+        <p14:creationId xmlns:p14="http://schemas.microsoft.com/office/powerpoint/2010/main" val="3190081374"/>
+      </p:ext>
+    </p:extLst>
+  </p:cSld>
+  <p:clrMapOvr>
+    <a:masterClrMapping/>
+  </p:clrMapOvr>
+</p:sld>
+</file>
+
+<file path=ppt/slides/slide5.xml><?xml version="1.0" encoding="utf-8"?>
+<p:sld xmlns:a="http://schemas.openxmlformats.org/drawingml/2006/main" xmlns:r="http://schemas.openxmlformats.org/officeDocument/2006/relationships" xmlns:p="http://schemas.openxmlformats.org/presentationml/2006/main">
+  <p:cSld>
+    <p:spTree>
+      <p:nvGrpSpPr>
+        <p:cNvPr id="1" name=""/>
+        <p:cNvGrpSpPr/>
+        <p:nvPr/>
+      </p:nvGrpSpPr>
+      <p:grpSpPr>
+        <a:xfrm>
+          <a:off x="0" y="0"/>
+          <a:ext cx="0" cy="0"/>
+          <a:chOff x="0" y="0"/>
+          <a:chExt cx="0" cy="0"/>
+        </a:xfrm>
+      </p:grpSpPr>
+      <p:sp>
+        <p:nvSpPr>
+          <p:cNvPr id="4" name="Cloud 3"/>
+          <p:cNvSpPr/>
+          <p:nvPr/>
+        </p:nvSpPr>
+        <p:spPr>
+          <a:xfrm>
+            <a:off x="1202499" y="791225"/>
+            <a:ext cx="2198317" cy="1653435"/>
+          </a:xfrm>
+          <a:prstGeom prst="cloud">
+            <a:avLst/>
+          </a:prstGeom>
+          <a:solidFill>
+            <a:schemeClr val="bg1"/>
+          </a:solidFill>
+        </p:spPr>
+        <p:style>
+          <a:lnRef idx="2">
+            <a:schemeClr val="accent1">
+              <a:shade val="50000"/>
+            </a:schemeClr>
+          </a:lnRef>
+          <a:fillRef idx="1">
+            <a:schemeClr val="accent1"/>
+          </a:fillRef>
+          <a:effectRef idx="0">
+            <a:schemeClr val="accent1"/>
+          </a:effectRef>
+          <a:fontRef idx="minor">
+            <a:schemeClr val="lt1"/>
+          </a:fontRef>
+        </p:style>
+        <p:txBody>
+          <a:bodyPr rtlCol="0" anchor="ctr"/>
+          <a:lstStyle/>
+          <a:p>
+            <a:pPr algn="ctr"/>
+            <a:endParaRPr lang="en-US" dirty="0"/>
+          </a:p>
+        </p:txBody>
+      </p:sp>
+      <p:sp>
+        <p:nvSpPr>
+          <p:cNvPr id="5" name="Cloud 4"/>
+          <p:cNvSpPr/>
+          <p:nvPr/>
+        </p:nvSpPr>
+        <p:spPr>
+          <a:xfrm>
+            <a:off x="4354883" y="791225"/>
+            <a:ext cx="2198317" cy="1653435"/>
+          </a:xfrm>
+          <a:prstGeom prst="cloud">
+            <a:avLst/>
+          </a:prstGeom>
+          <a:solidFill>
+            <a:schemeClr val="bg1"/>
+          </a:solidFill>
+        </p:spPr>
+        <p:style>
+          <a:lnRef idx="2">
+            <a:schemeClr val="accent1">
+              <a:shade val="50000"/>
+            </a:schemeClr>
+          </a:lnRef>
+          <a:fillRef idx="1">
+            <a:schemeClr val="accent1"/>
+          </a:fillRef>
+          <a:effectRef idx="0">
+            <a:schemeClr val="accent1"/>
+          </a:effectRef>
+          <a:fontRef idx="minor">
+            <a:schemeClr val="lt1"/>
+          </a:fontRef>
+        </p:style>
+        <p:txBody>
+          <a:bodyPr rtlCol="0" anchor="ctr"/>
+          <a:lstStyle/>
+          <a:p>
+            <a:pPr algn="ctr"/>
+            <a:r>
+              <a:rPr lang="en-US" sz="1200" dirty="0">
+                <a:solidFill>
+                  <a:schemeClr val="tx1">
+                    <a:lumMod val="95000"/>
+                    <a:lumOff val="5000"/>
+                  </a:schemeClr>
+                </a:solidFill>
+                <a:latin typeface="Consolas" panose="020B0609020204030204" pitchFamily="49" charset="0"/>
+              </a:rPr>
+              <a:t>None</a:t>
+            </a:r>
+          </a:p>
+        </p:txBody>
+      </p:sp>
+      <p:sp>
+        <p:nvSpPr>
+          <p:cNvPr id="6" name="TextBox 5"/>
+          <p:cNvSpPr txBox="1"/>
+          <p:nvPr/>
+        </p:nvSpPr>
+        <p:spPr>
+          <a:xfrm>
+            <a:off x="1680407" y="1033398"/>
+            <a:ext cx="1289135" cy="276999"/>
+          </a:xfrm>
+          <a:prstGeom prst="rect">
+            <a:avLst/>
+          </a:prstGeom>
+          <a:noFill/>
+        </p:spPr>
+        <p:txBody>
+          <a:bodyPr wrap="none" rtlCol="0">
+            <a:spAutoFit/>
+          </a:bodyPr>
+          <a:lstStyle/>
+          <a:p>
+            <a:r>
+              <a:rPr lang="en-US" sz="1200" dirty="0">
+                <a:latin typeface="Consolas" panose="020B0609020204030204" pitchFamily="49" charset="0"/>
+              </a:rPr>
+              <a:t>“Hello World”</a:t>
+            </a:r>
+          </a:p>
+        </p:txBody>
+      </p:sp>
+      <p:sp>
+        <p:nvSpPr>
+          <p:cNvPr id="9" name="TextBox 8"/>
+          <p:cNvSpPr txBox="1"/>
+          <p:nvPr/>
+        </p:nvSpPr>
+        <p:spPr>
+          <a:xfrm>
+            <a:off x="1548800" y="1487848"/>
+            <a:ext cx="269626" cy="276999"/>
+          </a:xfrm>
+          <a:prstGeom prst="rect">
+            <a:avLst/>
+          </a:prstGeom>
+          <a:noFill/>
+        </p:spPr>
+        <p:txBody>
+          <a:bodyPr wrap="none" rtlCol="0">
+            <a:spAutoFit/>
+          </a:bodyPr>
+          <a:lstStyle/>
+          <a:p>
+            <a:r>
+              <a:rPr lang="en-US" sz="1200" dirty="0">
+                <a:latin typeface="Consolas" panose="020B0609020204030204" pitchFamily="49" charset="0"/>
+              </a:rPr>
+              <a:t>7</a:t>
+            </a:r>
+          </a:p>
+        </p:txBody>
+      </p:sp>
+      <p:sp>
+        <p:nvSpPr>
+          <p:cNvPr id="11" name="TextBox 10"/>
+          <p:cNvSpPr txBox="1"/>
+          <p:nvPr/>
+        </p:nvSpPr>
+        <p:spPr>
+          <a:xfrm>
+            <a:off x="1882871" y="1870171"/>
+            <a:ext cx="779381" cy="276999"/>
+          </a:xfrm>
+          <a:prstGeom prst="rect">
+            <a:avLst/>
+          </a:prstGeom>
+          <a:noFill/>
+        </p:spPr>
+        <p:txBody>
+          <a:bodyPr wrap="none" rtlCol="0">
+            <a:spAutoFit/>
+          </a:bodyPr>
+          <a:lstStyle/>
+          <a:p>
+            <a:r>
+              <a:rPr lang="en-US" sz="1200" dirty="0">
+                <a:latin typeface="Consolas" panose="020B0609020204030204" pitchFamily="49" charset="0"/>
+              </a:rPr>
+              <a:t>3.14159</a:t>
+            </a:r>
+          </a:p>
+        </p:txBody>
+      </p:sp>
+      <p:cxnSp>
+        <p:nvCxnSpPr>
+          <p:cNvPr id="16" name="Straight Arrow Connector 15"/>
+          <p:cNvCxnSpPr>
+            <a:cxnSpLocks/>
+            <a:stCxn id="6" idx="3"/>
+          </p:cNvCxnSpPr>
+          <p:nvPr/>
+        </p:nvCxnSpPr>
+        <p:spPr>
+          <a:xfrm>
+            <a:off x="2969542" y="1171898"/>
+            <a:ext cx="2195270" cy="362540"/>
+          </a:xfrm>
+          <a:prstGeom prst="straightConnector1">
+            <a:avLst/>
+          </a:prstGeom>
+          <a:ln>
+            <a:tailEnd type="triangle"/>
+          </a:ln>
+        </p:spPr>
+        <p:style>
+          <a:lnRef idx="1">
+            <a:schemeClr val="accent1"/>
+          </a:lnRef>
+          <a:fillRef idx="0">
+            <a:schemeClr val="accent1"/>
+          </a:fillRef>
+          <a:effectRef idx="0">
+            <a:schemeClr val="accent1"/>
+          </a:effectRef>
+          <a:fontRef idx="minor">
+            <a:schemeClr val="tx1"/>
+          </a:fontRef>
+        </p:style>
+      </p:cxnSp>
+      <p:cxnSp>
+        <p:nvCxnSpPr>
+          <p:cNvPr id="18" name="Straight Arrow Connector 17"/>
+          <p:cNvCxnSpPr>
+            <a:cxnSpLocks/>
+            <a:stCxn id="9" idx="3"/>
+          </p:cNvCxnSpPr>
+          <p:nvPr/>
+        </p:nvCxnSpPr>
+        <p:spPr>
+          <a:xfrm>
+            <a:off x="1818426" y="1626348"/>
+            <a:ext cx="3346386" cy="45877"/>
+          </a:xfrm>
+          <a:prstGeom prst="straightConnector1">
+            <a:avLst/>
+          </a:prstGeom>
+          <a:ln>
+            <a:tailEnd type="triangle"/>
+          </a:ln>
+        </p:spPr>
+        <p:style>
+          <a:lnRef idx="1">
+            <a:schemeClr val="accent1"/>
+          </a:lnRef>
+          <a:fillRef idx="0">
+            <a:schemeClr val="accent1"/>
+          </a:fillRef>
+          <a:effectRef idx="0">
+            <a:schemeClr val="accent1"/>
+          </a:effectRef>
+          <a:fontRef idx="minor">
+            <a:schemeClr val="tx1"/>
+          </a:fontRef>
+        </p:style>
+      </p:cxnSp>
+      <p:cxnSp>
+        <p:nvCxnSpPr>
+          <p:cNvPr id="20" name="Straight Arrow Connector 19"/>
+          <p:cNvCxnSpPr>
+            <a:cxnSpLocks/>
+            <a:stCxn id="11" idx="3"/>
+          </p:cNvCxnSpPr>
+          <p:nvPr/>
+        </p:nvCxnSpPr>
+        <p:spPr>
+          <a:xfrm flipV="1">
+            <a:off x="2662252" y="1578279"/>
+            <a:ext cx="2502560" cy="430392"/>
+          </a:xfrm>
+          <a:prstGeom prst="straightConnector1">
+            <a:avLst/>
+          </a:prstGeom>
+          <a:ln>
+            <a:tailEnd type="triangle"/>
+          </a:ln>
+        </p:spPr>
+        <p:style>
+          <a:lnRef idx="1">
+            <a:schemeClr val="accent1"/>
+          </a:lnRef>
+          <a:fillRef idx="0">
+            <a:schemeClr val="accent1"/>
+          </a:fillRef>
+          <a:effectRef idx="0">
+            <a:schemeClr val="accent1"/>
+          </a:effectRef>
+          <a:fontRef idx="minor">
+            <a:schemeClr val="tx1"/>
+          </a:fontRef>
+        </p:style>
+      </p:cxnSp>
+      <p:sp>
+        <p:nvSpPr>
+          <p:cNvPr id="21" name="TextBox 20"/>
+          <p:cNvSpPr txBox="1"/>
+          <p:nvPr/>
+        </p:nvSpPr>
+        <p:spPr>
+          <a:xfrm>
+            <a:off x="5234779" y="2484483"/>
+            <a:ext cx="569708" cy="276999"/>
+          </a:xfrm>
+          <a:prstGeom prst="rect">
+            <a:avLst/>
+          </a:prstGeom>
+          <a:noFill/>
+        </p:spPr>
+        <p:txBody>
+          <a:bodyPr wrap="none" rtlCol="0">
+            <a:spAutoFit/>
+          </a:bodyPr>
+          <a:lstStyle/>
+          <a:p>
+            <a:r>
+              <a:rPr lang="en-US" sz="1200" dirty="0"/>
+              <a:t>Range</a:t>
+            </a:r>
+          </a:p>
+        </p:txBody>
+      </p:sp>
+      <p:sp>
+        <p:nvSpPr>
+          <p:cNvPr id="22" name="TextBox 21"/>
+          <p:cNvSpPr txBox="1"/>
+          <p:nvPr/>
+        </p:nvSpPr>
+        <p:spPr>
+          <a:xfrm>
+            <a:off x="1812014" y="2484484"/>
+            <a:ext cx="694421" cy="276999"/>
+          </a:xfrm>
+          <a:prstGeom prst="rect">
+            <a:avLst/>
+          </a:prstGeom>
+          <a:noFill/>
+        </p:spPr>
+        <p:txBody>
+          <a:bodyPr wrap="none" rtlCol="0">
+            <a:spAutoFit/>
+          </a:bodyPr>
+          <a:lstStyle/>
+          <a:p>
+            <a:r>
+              <a:rPr lang="en-US" sz="1200" dirty="0">
+                <a:latin typeface="Consolas" panose="020B0609020204030204" pitchFamily="49" charset="0"/>
+              </a:rPr>
+              <a:t>Domain</a:t>
+            </a:r>
+          </a:p>
+        </p:txBody>
+      </p:sp>
+      <p:grpSp>
+        <p:nvGrpSpPr>
+          <p:cNvPr id="24" name="Group 23"/>
+          <p:cNvGrpSpPr/>
+          <p:nvPr/>
+        </p:nvGrpSpPr>
+        <p:grpSpPr>
+          <a:xfrm>
+            <a:off x="3076013" y="2712542"/>
+            <a:ext cx="1833963" cy="1744250"/>
+            <a:chOff x="3400816" y="2871591"/>
+            <a:chExt cx="2852804" cy="2852804"/>
+          </a:xfrm>
+        </p:grpSpPr>
+        <p:pic>
+          <p:nvPicPr>
+            <p:cNvPr id="19" name="Graphic 18" descr="Laptop"/>
+            <p:cNvPicPr>
+              <a:picLocks noChangeAspect="1"/>
+            </p:cNvPicPr>
+            <p:nvPr/>
+          </p:nvPicPr>
+          <p:blipFill>
+            <a:blip r:embed="rId2">
+              <a:extLst>
+                <a:ext uri="{28A0092B-C50C-407E-A947-70E740481C1C}">
+                  <a14:useLocalDpi xmlns:a14="http://schemas.microsoft.com/office/drawing/2010/main" val="0"/>
+                </a:ext>
+                <a:ext uri="{96DAC541-7B7A-43D3-8B79-37D633B846F1}">
+                  <asvg:svgBlip xmlns:asvg="http://schemas.microsoft.com/office/drawing/2016/SVG/main" r:embed="rId3"/>
+                </a:ext>
+              </a:extLst>
+            </a:blip>
+            <a:stretch>
+              <a:fillRect/>
+            </a:stretch>
+          </p:blipFill>
+          <p:spPr>
+            <a:xfrm>
+              <a:off x="3400816" y="2871591"/>
+              <a:ext cx="2852804" cy="2852804"/>
+            </a:xfrm>
+            <a:prstGeom prst="rect">
+              <a:avLst/>
+            </a:prstGeom>
+          </p:spPr>
+        </p:pic>
+        <p:sp>
+          <p:nvSpPr>
+            <p:cNvPr id="23" name="TextBox 22"/>
+            <p:cNvSpPr txBox="1"/>
+            <p:nvPr/>
+          </p:nvSpPr>
+          <p:spPr>
+            <a:xfrm>
+              <a:off x="3977360" y="3651662"/>
+              <a:ext cx="1119217" cy="646331"/>
+            </a:xfrm>
+            <a:prstGeom prst="rect">
+              <a:avLst/>
+            </a:prstGeom>
+            <a:noFill/>
+          </p:spPr>
+          <p:txBody>
+            <a:bodyPr wrap="none" rtlCol="0">
+              <a:spAutoFit/>
+            </a:bodyPr>
+            <a:lstStyle/>
+            <a:p>
+              <a:r>
+                <a:rPr lang="en-US" sz="1200" dirty="0">
+                  <a:latin typeface="Consolas" panose="020B0609020204030204" pitchFamily="49" charset="0"/>
+                </a:rPr>
+                <a:t>Hello World</a:t>
+              </a:r>
+            </a:p>
+            <a:p>
+              <a:r>
+                <a:rPr lang="en-US" sz="1200" dirty="0">
+                  <a:latin typeface="Consolas" panose="020B0609020204030204" pitchFamily="49" charset="0"/>
+                </a:rPr>
+                <a:t>7</a:t>
+              </a:r>
+            </a:p>
+            <a:p>
+              <a:r>
+                <a:rPr lang="en-US" sz="1200" dirty="0">
+                  <a:latin typeface="Consolas" panose="020B0609020204030204" pitchFamily="49" charset="0"/>
+                </a:rPr>
+                <a:t>3.14159</a:t>
+              </a:r>
+            </a:p>
+          </p:txBody>
+        </p:sp>
+      </p:grpSp>
+      <p:sp>
+        <p:nvSpPr>
+          <p:cNvPr id="26" name="Freeform: Shape 25"/>
+          <p:cNvSpPr/>
+          <p:nvPr/>
+        </p:nvSpPr>
+        <p:spPr>
+          <a:xfrm>
+            <a:off x="3187874" y="2116899"/>
+            <a:ext cx="560151" cy="889348"/>
+          </a:xfrm>
+          <a:custGeom>
+            <a:avLst/>
+            <a:gdLst>
+              <a:gd name="connsiteX0" fmla="*/ 0 w 560151"/>
+              <a:gd name="connsiteY0" fmla="*/ 0 h 889348"/>
+              <a:gd name="connsiteX1" fmla="*/ 557408 w 560151"/>
+              <a:gd name="connsiteY1" fmla="*/ 369517 h 889348"/>
+              <a:gd name="connsiteX2" fmla="*/ 212942 w 560151"/>
+              <a:gd name="connsiteY2" fmla="*/ 601249 h 889348"/>
+              <a:gd name="connsiteX3" fmla="*/ 194153 w 560151"/>
+              <a:gd name="connsiteY3" fmla="*/ 889348 h 889348"/>
+              <a:gd name="connsiteX4" fmla="*/ 194153 w 560151"/>
+              <a:gd name="connsiteY4" fmla="*/ 889348 h 889348"/>
+            </a:gdLst>
+            <a:ahLst/>
+            <a:cxnLst>
+              <a:cxn ang="0">
+                <a:pos x="connsiteX0" y="connsiteY0"/>
+              </a:cxn>
+              <a:cxn ang="0">
+                <a:pos x="connsiteX1" y="connsiteY1"/>
+              </a:cxn>
+              <a:cxn ang="0">
+                <a:pos x="connsiteX2" y="connsiteY2"/>
+              </a:cxn>
+              <a:cxn ang="0">
+                <a:pos x="connsiteX3" y="connsiteY3"/>
+              </a:cxn>
+              <a:cxn ang="0">
+                <a:pos x="connsiteX4" y="connsiteY4"/>
+              </a:cxn>
+            </a:cxnLst>
+            <a:rect l="l" t="t" r="r" b="b"/>
+            <a:pathLst>
+              <a:path w="560151" h="889348">
+                <a:moveTo>
+                  <a:pt x="0" y="0"/>
+                </a:moveTo>
+                <a:cubicBezTo>
+                  <a:pt x="260959" y="134654"/>
+                  <a:pt x="521918" y="269309"/>
+                  <a:pt x="557408" y="369517"/>
+                </a:cubicBezTo>
+                <a:cubicBezTo>
+                  <a:pt x="592898" y="469725"/>
+                  <a:pt x="273484" y="514611"/>
+                  <a:pt x="212942" y="601249"/>
+                </a:cubicBezTo>
+                <a:cubicBezTo>
+                  <a:pt x="152400" y="687887"/>
+                  <a:pt x="194153" y="889348"/>
+                  <a:pt x="194153" y="889348"/>
+                </a:cubicBezTo>
+                <a:lnTo>
+                  <a:pt x="194153" y="889348"/>
+                </a:lnTo>
+              </a:path>
+            </a:pathLst>
+          </a:custGeom>
+          <a:ln w="9525" cap="flat" cmpd="sng" algn="ctr">
+            <a:solidFill>
+              <a:schemeClr val="accent1"/>
+            </a:solidFill>
+            <a:prstDash val="solid"/>
+            <a:round/>
+            <a:headEnd type="none" w="med" len="med"/>
+            <a:tailEnd type="arrow" w="med" len="med"/>
+          </a:ln>
+        </p:spPr>
+        <p:style>
+          <a:lnRef idx="0">
+            <a:scrgbClr r="0" g="0" b="0"/>
+          </a:lnRef>
+          <a:fillRef idx="0">
+            <a:scrgbClr r="0" g="0" b="0"/>
+          </a:fillRef>
+          <a:effectRef idx="0">
+            <a:scrgbClr r="0" g="0" b="0"/>
+          </a:effectRef>
+          <a:fontRef idx="minor">
+            <a:schemeClr val="tx1"/>
+          </a:fontRef>
+        </p:style>
+        <p:txBody>
+          <a:bodyPr rtlCol="0" anchor="ctr"/>
+          <a:lstStyle/>
+          <a:p>
+            <a:pPr algn="ctr"/>
+            <a:r>
+              <a:rPr lang="en-US" sz="1000" i="1" dirty="0"/>
+              <a:t>Side effect</a:t>
+            </a:r>
+            <a:br>
+              <a:rPr lang="en-US" sz="1000" i="1" dirty="0"/>
+            </a:br>
+            <a:endParaRPr lang="en-US" sz="1000" i="1" dirty="0"/>
+          </a:p>
+        </p:txBody>
+      </p:sp>
+    </p:spTree>
+    <p:extLst>
+      <p:ext uri="{BB962C8B-B14F-4D97-AF65-F5344CB8AC3E}">
+        <p14:creationId xmlns:p14="http://schemas.microsoft.com/office/powerpoint/2010/main" val="1457500400"/>
+      </p:ext>
+    </p:extLst>
+  </p:cSld>
+  <p:clrMapOvr>
+    <a:masterClrMapping/>
+  </p:clrMapOvr>
+</p:sld>
+</file>
+
+<file path=ppt/slides/slide6.xml><?xml version="1.0" encoding="utf-8"?>
+<p:sld xmlns:a="http://schemas.openxmlformats.org/drawingml/2006/main" xmlns:r="http://schemas.openxmlformats.org/officeDocument/2006/relationships" xmlns:p="http://schemas.openxmlformats.org/presentationml/2006/main">
+  <p:cSld>
+    <p:spTree>
+      <p:nvGrpSpPr>
+        <p:cNvPr id="1" name=""/>
+        <p:cNvGrpSpPr/>
+        <p:nvPr/>
+      </p:nvGrpSpPr>
+      <p:grpSpPr>
+        <a:xfrm>
+          <a:off x="0" y="0"/>
+          <a:ext cx="0" cy="0"/>
+          <a:chOff x="0" y="0"/>
+          <a:chExt cx="0" cy="0"/>
+        </a:xfrm>
+      </p:grpSpPr>
+      <p:sp>
+        <p:nvSpPr>
+          <p:cNvPr id="4" name="Rectangle 3"/>
+          <p:cNvSpPr/>
+          <p:nvPr/>
+        </p:nvSpPr>
+        <p:spPr>
+          <a:xfrm>
+            <a:off x="4089748" y="1684751"/>
+            <a:ext cx="1221288" cy="620038"/>
+          </a:xfrm>
+          <a:prstGeom prst="rect">
+            <a:avLst/>
+          </a:prstGeom>
+          <a:solidFill>
+            <a:schemeClr val="accent1">
+              <a:lumMod val="60000"/>
+              <a:lumOff val="40000"/>
+            </a:schemeClr>
+          </a:solidFill>
+          <a:ln>
+            <a:solidFill>
+              <a:schemeClr val="accent1">
+                <a:lumMod val="60000"/>
+                <a:lumOff val="40000"/>
+              </a:schemeClr>
+            </a:solidFill>
+          </a:ln>
+        </p:spPr>
+        <p:style>
+          <a:lnRef idx="2">
+            <a:schemeClr val="accent1">
+              <a:shade val="50000"/>
+            </a:schemeClr>
+          </a:lnRef>
+          <a:fillRef idx="1">
+            <a:schemeClr val="accent1"/>
+          </a:fillRef>
+          <a:effectRef idx="0">
+            <a:schemeClr val="accent1"/>
+          </a:effectRef>
+          <a:fontRef idx="minor">
+            <a:schemeClr val="lt1"/>
+          </a:fontRef>
+        </p:style>
+        <p:txBody>
+          <a:bodyPr rtlCol="0" anchor="ctr"/>
+          <a:lstStyle/>
+          <a:p>
+            <a:pPr algn="ctr"/>
+            <a:r>
+              <a:rPr lang="en-US" sz="1200" dirty="0">
+                <a:solidFill>
+                  <a:schemeClr val="tx1">
+                    <a:lumMod val="95000"/>
+                    <a:lumOff val="5000"/>
+                  </a:schemeClr>
+                </a:solidFill>
+              </a:rPr>
+              <a:t>f2c(f)</a:t>
+            </a:r>
+          </a:p>
+        </p:txBody>
+      </p:sp>
+      <p:cxnSp>
+        <p:nvCxnSpPr>
+          <p:cNvPr id="6" name="Straight Arrow Connector 5"/>
+          <p:cNvCxnSpPr>
+            <a:cxnSpLocks/>
+            <a:endCxn id="4" idx="1"/>
+          </p:cNvCxnSpPr>
+          <p:nvPr/>
+        </p:nvCxnSpPr>
+        <p:spPr>
+          <a:xfrm>
+            <a:off x="3569918" y="1994770"/>
+            <a:ext cx="519830" cy="0"/>
+          </a:xfrm>
+          <a:prstGeom prst="straightConnector1">
+            <a:avLst/>
+          </a:prstGeom>
+          <a:ln>
+            <a:tailEnd type="triangle"/>
+          </a:ln>
+        </p:spPr>
+        <p:style>
+          <a:lnRef idx="1">
+            <a:schemeClr val="accent1"/>
+          </a:lnRef>
+          <a:fillRef idx="0">
+            <a:schemeClr val="accent1"/>
+          </a:fillRef>
+          <a:effectRef idx="0">
+            <a:schemeClr val="accent1"/>
+          </a:effectRef>
+          <a:fontRef idx="minor">
+            <a:schemeClr val="tx1"/>
+          </a:fontRef>
+        </p:style>
+      </p:cxnSp>
+      <p:cxnSp>
+        <p:nvCxnSpPr>
+          <p:cNvPr id="8" name="Straight Arrow Connector 7"/>
+          <p:cNvCxnSpPr>
+            <a:cxnSpLocks/>
+            <a:stCxn id="4" idx="3"/>
+          </p:cNvCxnSpPr>
+          <p:nvPr/>
+        </p:nvCxnSpPr>
+        <p:spPr>
+          <a:xfrm>
+            <a:off x="5311036" y="1994770"/>
+            <a:ext cx="519830" cy="0"/>
+          </a:xfrm>
+          <a:prstGeom prst="straightConnector1">
+            <a:avLst/>
+          </a:prstGeom>
+          <a:ln>
+            <a:tailEnd type="triangle"/>
+          </a:ln>
+        </p:spPr>
+        <p:style>
+          <a:lnRef idx="1">
+            <a:schemeClr val="accent1"/>
+          </a:lnRef>
+          <a:fillRef idx="0">
+            <a:schemeClr val="accent1"/>
+          </a:fillRef>
+          <a:effectRef idx="0">
+            <a:schemeClr val="accent1"/>
+          </a:effectRef>
+          <a:fontRef idx="minor">
+            <a:schemeClr val="tx1"/>
+          </a:fontRef>
+        </p:style>
+      </p:cxnSp>
+    </p:spTree>
+    <p:extLst>
+      <p:ext uri="{BB962C8B-B14F-4D97-AF65-F5344CB8AC3E}">
+        <p14:creationId xmlns:p14="http://schemas.microsoft.com/office/powerpoint/2010/main" val="1624823119"/>
+      </p:ext>
+    </p:extLst>
+  </p:cSld>
+  <p:clrMapOvr>
+    <a:masterClrMapping/>
+  </p:clrMapOvr>
+</p:sld>
+</file>
+
 <file path=ppt/theme/theme1.xml><?xml version="1.0" encoding="utf-8"?>
 <a:theme xmlns:a="http://schemas.openxmlformats.org/drawingml/2006/main" name="Office Theme">
   <a:themeElements>

</xml_diff>

<commit_message>
more particle sim stuff
</commit_message>
<xml_diff>
--- a/images/pygame_rect_window.pptx
+++ b/images/pygame_rect_window.pptx
@@ -15,6 +15,8 @@
     <p:sldId id="264" r:id="rId9"/>
     <p:sldId id="265" r:id="rId10"/>
     <p:sldId id="266" r:id="rId11"/>
+    <p:sldId id="267" r:id="rId12"/>
+    <p:sldId id="268" r:id="rId13"/>
   </p:sldIdLst>
   <p:sldSz cx="12192000" cy="6858000"/>
   <p:notesSz cx="6858000" cy="9144000"/>
@@ -3629,6 +3631,1171 @@
     <p:extLst>
       <p:ext uri="{BB962C8B-B14F-4D97-AF65-F5344CB8AC3E}">
         <p14:creationId xmlns:p14="http://schemas.microsoft.com/office/powerpoint/2010/main" val="383468974"/>
+      </p:ext>
+    </p:extLst>
+  </p:cSld>
+  <p:clrMapOvr>
+    <a:masterClrMapping/>
+  </p:clrMapOvr>
+</p:sld>
+</file>
+
+<file path=ppt/slides/slide11.xml><?xml version="1.0" encoding="utf-8"?>
+<p:sld xmlns:a="http://schemas.openxmlformats.org/drawingml/2006/main" xmlns:r="http://schemas.openxmlformats.org/officeDocument/2006/relationships" xmlns:p="http://schemas.openxmlformats.org/presentationml/2006/main">
+  <p:cSld>
+    <p:bg>
+      <p:bgPr>
+        <a:solidFill>
+          <a:schemeClr val="bg1">
+            <a:alpha val="93000"/>
+          </a:schemeClr>
+        </a:solidFill>
+        <a:effectLst/>
+      </p:bgPr>
+    </p:bg>
+    <p:spTree>
+      <p:nvGrpSpPr>
+        <p:cNvPr id="1" name=""/>
+        <p:cNvGrpSpPr/>
+        <p:nvPr/>
+      </p:nvGrpSpPr>
+      <p:grpSpPr>
+        <a:xfrm>
+          <a:off x="0" y="0"/>
+          <a:ext cx="0" cy="0"/>
+          <a:chOff x="0" y="0"/>
+          <a:chExt cx="0" cy="0"/>
+        </a:xfrm>
+      </p:grpSpPr>
+      <p:grpSp>
+        <p:nvGrpSpPr>
+          <p:cNvPr id="15" name="Group 14">
+            <a:extLst>
+              <a:ext uri="{FF2B5EF4-FFF2-40B4-BE49-F238E27FC236}">
+                <a16:creationId xmlns:a16="http://schemas.microsoft.com/office/drawing/2014/main" id="{8528EEF3-246B-4EEC-BE6D-2F11F00EB2A0}"/>
+              </a:ext>
+            </a:extLst>
+          </p:cNvPr>
+          <p:cNvGrpSpPr/>
+          <p:nvPr/>
+        </p:nvGrpSpPr>
+        <p:grpSpPr>
+          <a:xfrm>
+            <a:off x="3517710" y="1875610"/>
+            <a:ext cx="3639137" cy="2098704"/>
+            <a:chOff x="3517710" y="1875610"/>
+            <a:chExt cx="3639137" cy="2098704"/>
+          </a:xfrm>
+        </p:grpSpPr>
+        <p:pic>
+          <p:nvPicPr>
+            <p:cNvPr id="3" name="Picture 2" descr="A picture containing dome&#10;&#10;Description generated with high confidence">
+              <a:extLst>
+                <a:ext uri="{FF2B5EF4-FFF2-40B4-BE49-F238E27FC236}">
+                  <a16:creationId xmlns:a16="http://schemas.microsoft.com/office/drawing/2014/main" id="{714E1ED5-E1C2-4C93-94B9-63BBBCE57F2C}"/>
+                </a:ext>
+              </a:extLst>
+            </p:cNvPr>
+            <p:cNvPicPr>
+              <a:picLocks noChangeAspect="1"/>
+            </p:cNvPicPr>
+            <p:nvPr/>
+          </p:nvPicPr>
+          <p:blipFill>
+            <a:blip r:embed="rId2">
+              <a:extLst>
+                <a:ext uri="{28A0092B-C50C-407E-A947-70E740481C1C}">
+                  <a14:useLocalDpi xmlns:a14="http://schemas.microsoft.com/office/drawing/2010/main" val="0"/>
+                </a:ext>
+              </a:extLst>
+            </a:blip>
+            <a:stretch>
+              <a:fillRect/>
+            </a:stretch>
+          </p:blipFill>
+          <p:spPr>
+            <a:xfrm>
+              <a:off x="5074828" y="2508284"/>
+              <a:ext cx="1495949" cy="1466030"/>
+            </a:xfrm>
+            <a:prstGeom prst="rect">
+              <a:avLst/>
+            </a:prstGeom>
+            <a:ln>
+              <a:solidFill>
+                <a:schemeClr val="bg2">
+                  <a:lumMod val="50000"/>
+                </a:schemeClr>
+              </a:solidFill>
+            </a:ln>
+          </p:spPr>
+        </p:pic>
+        <p:sp>
+          <p:nvSpPr>
+            <p:cNvPr id="2" name="Freeform: Shape 1">
+              <a:extLst>
+                <a:ext uri="{FF2B5EF4-FFF2-40B4-BE49-F238E27FC236}">
+                  <a16:creationId xmlns:a16="http://schemas.microsoft.com/office/drawing/2014/main" id="{886D9163-0A13-4A17-9D10-A8AA8DDFC01E}"/>
+                </a:ext>
+              </a:extLst>
+            </p:cNvPr>
+            <p:cNvSpPr/>
+            <p:nvPr/>
+          </p:nvSpPr>
+          <p:spPr>
+            <a:xfrm>
+              <a:off x="3839227" y="1997250"/>
+              <a:ext cx="1235601" cy="511033"/>
+            </a:xfrm>
+            <a:custGeom>
+              <a:avLst/>
+              <a:gdLst>
+                <a:gd name="connsiteX0" fmla="*/ 0 w 1227551"/>
+                <a:gd name="connsiteY0" fmla="*/ 388957 h 470376"/>
+                <a:gd name="connsiteX1" fmla="*/ 977031 w 1227551"/>
+                <a:gd name="connsiteY1" fmla="*/ 650 h 470376"/>
+                <a:gd name="connsiteX2" fmla="*/ 1227551 w 1227551"/>
+                <a:gd name="connsiteY2" fmla="*/ 470376 h 470376"/>
+              </a:gdLst>
+              <a:ahLst/>
+              <a:cxnLst>
+                <a:cxn ang="0">
+                  <a:pos x="connsiteX0" y="connsiteY0"/>
+                </a:cxn>
+                <a:cxn ang="0">
+                  <a:pos x="connsiteX1" y="connsiteY1"/>
+                </a:cxn>
+                <a:cxn ang="0">
+                  <a:pos x="connsiteX2" y="connsiteY2"/>
+                </a:cxn>
+              </a:cxnLst>
+              <a:rect l="l" t="t" r="r" b="b"/>
+              <a:pathLst>
+                <a:path w="1227551" h="470376">
+                  <a:moveTo>
+                    <a:pt x="0" y="388957"/>
+                  </a:moveTo>
+                  <a:cubicBezTo>
+                    <a:pt x="386219" y="188018"/>
+                    <a:pt x="772439" y="-12920"/>
+                    <a:pt x="977031" y="650"/>
+                  </a:cubicBezTo>
+                  <a:cubicBezTo>
+                    <a:pt x="1181623" y="14220"/>
+                    <a:pt x="1223376" y="380606"/>
+                    <a:pt x="1227551" y="470376"/>
+                  </a:cubicBezTo>
+                </a:path>
+              </a:pathLst>
+            </a:custGeom>
+            <a:ln w="9525" cap="flat" cmpd="sng" algn="ctr">
+              <a:solidFill>
+                <a:schemeClr val="dk1"/>
+              </a:solidFill>
+              <a:prstDash val="solid"/>
+              <a:round/>
+              <a:headEnd type="none" w="med" len="med"/>
+              <a:tailEnd type="arrow" w="med" len="med"/>
+            </a:ln>
+          </p:spPr>
+          <p:style>
+            <a:lnRef idx="0">
+              <a:scrgbClr r="0" g="0" b="0"/>
+            </a:lnRef>
+            <a:fillRef idx="0">
+              <a:scrgbClr r="0" g="0" b="0"/>
+            </a:fillRef>
+            <a:effectRef idx="0">
+              <a:scrgbClr r="0" g="0" b="0"/>
+            </a:effectRef>
+            <a:fontRef idx="minor">
+              <a:schemeClr val="tx1"/>
+            </a:fontRef>
+          </p:style>
+          <p:txBody>
+            <a:bodyPr rtlCol="0" anchor="ctr"/>
+            <a:lstStyle/>
+            <a:p>
+              <a:pPr algn="ctr"/>
+              <a:endParaRPr lang="en-US"/>
+            </a:p>
+          </p:txBody>
+        </p:sp>
+        <p:sp>
+          <p:nvSpPr>
+            <p:cNvPr id="6" name="TextBox 5">
+              <a:extLst>
+                <a:ext uri="{FF2B5EF4-FFF2-40B4-BE49-F238E27FC236}">
+                  <a16:creationId xmlns:a16="http://schemas.microsoft.com/office/drawing/2014/main" id="{F6D80F55-0356-4CD0-8354-A8E2BB960D52}"/>
+                </a:ext>
+              </a:extLst>
+            </p:cNvPr>
+            <p:cNvSpPr txBox="1"/>
+            <p:nvPr/>
+          </p:nvSpPr>
+          <p:spPr>
+            <a:xfrm>
+              <a:off x="3517710" y="2350827"/>
+              <a:ext cx="542136" cy="338554"/>
+            </a:xfrm>
+            <a:prstGeom prst="rect">
+              <a:avLst/>
+            </a:prstGeom>
+            <a:noFill/>
+          </p:spPr>
+          <p:txBody>
+            <a:bodyPr wrap="none" rtlCol="0">
+              <a:spAutoFit/>
+            </a:bodyPr>
+            <a:lstStyle/>
+            <a:p>
+              <a:r>
+                <a:rPr lang="en-US" sz="1600" dirty="0"/>
+                <a:t>(</a:t>
+              </a:r>
+              <a:r>
+                <a:rPr lang="en-US" sz="1600" dirty="0" err="1"/>
+                <a:t>x,y</a:t>
+              </a:r>
+              <a:r>
+                <a:rPr lang="en-US" sz="1600" dirty="0"/>
+                <a:t>)</a:t>
+              </a:r>
+            </a:p>
+          </p:txBody>
+        </p:sp>
+        <p:cxnSp>
+          <p:nvCxnSpPr>
+            <p:cNvPr id="8" name="Straight Arrow Connector 7">
+              <a:extLst>
+                <a:ext uri="{FF2B5EF4-FFF2-40B4-BE49-F238E27FC236}">
+                  <a16:creationId xmlns:a16="http://schemas.microsoft.com/office/drawing/2014/main" id="{CF14C5B8-77B2-4ACF-983C-471C21A79081}"/>
+                </a:ext>
+              </a:extLst>
+            </p:cNvPr>
+            <p:cNvCxnSpPr/>
+            <p:nvPr/>
+          </p:nvCxnSpPr>
+          <p:spPr>
+            <a:xfrm flipV="1">
+              <a:off x="5822802" y="2136860"/>
+              <a:ext cx="0" cy="1104439"/>
+            </a:xfrm>
+            <a:prstGeom prst="straightConnector1">
+              <a:avLst/>
+            </a:prstGeom>
+            <a:ln>
+              <a:tailEnd type="triangle"/>
+            </a:ln>
+          </p:spPr>
+          <p:style>
+            <a:lnRef idx="1">
+              <a:schemeClr val="accent1"/>
+            </a:lnRef>
+            <a:fillRef idx="0">
+              <a:schemeClr val="accent1"/>
+            </a:fillRef>
+            <a:effectRef idx="0">
+              <a:schemeClr val="accent1"/>
+            </a:effectRef>
+            <a:fontRef idx="minor">
+              <a:schemeClr val="tx1"/>
+            </a:fontRef>
+          </p:style>
+        </p:cxnSp>
+        <p:cxnSp>
+          <p:nvCxnSpPr>
+            <p:cNvPr id="10" name="Straight Arrow Connector 9">
+              <a:extLst>
+                <a:ext uri="{FF2B5EF4-FFF2-40B4-BE49-F238E27FC236}">
+                  <a16:creationId xmlns:a16="http://schemas.microsoft.com/office/drawing/2014/main" id="{32FB4063-9E49-4A78-9A8B-F6B02FFCFBDD}"/>
+                </a:ext>
+              </a:extLst>
+            </p:cNvPr>
+            <p:cNvCxnSpPr>
+              <a:cxnSpLocks/>
+            </p:cNvCxnSpPr>
+            <p:nvPr/>
+          </p:nvCxnSpPr>
+          <p:spPr>
+            <a:xfrm>
+              <a:off x="5822802" y="3241299"/>
+              <a:ext cx="1014982" cy="0"/>
+            </a:xfrm>
+            <a:prstGeom prst="straightConnector1">
+              <a:avLst/>
+            </a:prstGeom>
+            <a:ln>
+              <a:tailEnd type="triangle"/>
+            </a:ln>
+          </p:spPr>
+          <p:style>
+            <a:lnRef idx="1">
+              <a:schemeClr val="accent1"/>
+            </a:lnRef>
+            <a:fillRef idx="0">
+              <a:schemeClr val="accent1"/>
+            </a:fillRef>
+            <a:effectRef idx="0">
+              <a:schemeClr val="accent1"/>
+            </a:effectRef>
+            <a:fontRef idx="minor">
+              <a:schemeClr val="tx1"/>
+            </a:fontRef>
+          </p:style>
+        </p:cxnSp>
+        <p:sp>
+          <p:nvSpPr>
+            <p:cNvPr id="13" name="TextBox 12">
+              <a:extLst>
+                <a:ext uri="{FF2B5EF4-FFF2-40B4-BE49-F238E27FC236}">
+                  <a16:creationId xmlns:a16="http://schemas.microsoft.com/office/drawing/2014/main" id="{A3E22DAE-8792-4F03-B0E3-FFDA0EB25302}"/>
+                </a:ext>
+              </a:extLst>
+            </p:cNvPr>
+            <p:cNvSpPr txBox="1"/>
+            <p:nvPr/>
+          </p:nvSpPr>
+          <p:spPr>
+            <a:xfrm>
+              <a:off x="6776615" y="3072022"/>
+              <a:ext cx="380232" cy="338554"/>
+            </a:xfrm>
+            <a:prstGeom prst="rect">
+              <a:avLst/>
+            </a:prstGeom>
+            <a:noFill/>
+          </p:spPr>
+          <p:txBody>
+            <a:bodyPr wrap="none" rtlCol="0">
+              <a:spAutoFit/>
+            </a:bodyPr>
+            <a:lstStyle/>
+            <a:p>
+              <a:r>
+                <a:rPr lang="en-US" sz="1600" i="1" dirty="0"/>
+                <a:t>dx</a:t>
+              </a:r>
+            </a:p>
+          </p:txBody>
+        </p:sp>
+        <p:sp>
+          <p:nvSpPr>
+            <p:cNvPr id="14" name="TextBox 13">
+              <a:extLst>
+                <a:ext uri="{FF2B5EF4-FFF2-40B4-BE49-F238E27FC236}">
+                  <a16:creationId xmlns:a16="http://schemas.microsoft.com/office/drawing/2014/main" id="{047C331B-0CD2-44B1-8CB9-A6704214ED72}"/>
+                </a:ext>
+              </a:extLst>
+            </p:cNvPr>
+            <p:cNvSpPr txBox="1"/>
+            <p:nvPr/>
+          </p:nvSpPr>
+          <p:spPr>
+            <a:xfrm>
+              <a:off x="5632686" y="1875610"/>
+              <a:ext cx="381836" cy="338554"/>
+            </a:xfrm>
+            <a:prstGeom prst="rect">
+              <a:avLst/>
+            </a:prstGeom>
+            <a:noFill/>
+          </p:spPr>
+          <p:txBody>
+            <a:bodyPr wrap="none" rtlCol="0">
+              <a:spAutoFit/>
+            </a:bodyPr>
+            <a:lstStyle/>
+            <a:p>
+              <a:r>
+                <a:rPr lang="en-US" sz="1600" i="1" dirty="0" err="1"/>
+                <a:t>dy</a:t>
+              </a:r>
+              <a:endParaRPr lang="en-US" sz="1600" i="1" dirty="0"/>
+            </a:p>
+          </p:txBody>
+        </p:sp>
+      </p:grpSp>
+    </p:spTree>
+    <p:extLst>
+      <p:ext uri="{BB962C8B-B14F-4D97-AF65-F5344CB8AC3E}">
+        <p14:creationId xmlns:p14="http://schemas.microsoft.com/office/powerpoint/2010/main" val="2316530541"/>
+      </p:ext>
+    </p:extLst>
+  </p:cSld>
+  <p:clrMapOvr>
+    <a:masterClrMapping/>
+  </p:clrMapOvr>
+</p:sld>
+</file>
+
+<file path=ppt/slides/slide12.xml><?xml version="1.0" encoding="utf-8"?>
+<p:sld xmlns:a="http://schemas.openxmlformats.org/drawingml/2006/main" xmlns:r="http://schemas.openxmlformats.org/officeDocument/2006/relationships" xmlns:p="http://schemas.openxmlformats.org/presentationml/2006/main">
+  <p:cSld>
+    <p:spTree>
+      <p:nvGrpSpPr>
+        <p:cNvPr id="1" name=""/>
+        <p:cNvGrpSpPr/>
+        <p:nvPr/>
+      </p:nvGrpSpPr>
+      <p:grpSpPr>
+        <a:xfrm>
+          <a:off x="0" y="0"/>
+          <a:ext cx="0" cy="0"/>
+          <a:chOff x="0" y="0"/>
+          <a:chExt cx="0" cy="0"/>
+        </a:xfrm>
+      </p:grpSpPr>
+      <p:grpSp>
+        <p:nvGrpSpPr>
+          <p:cNvPr id="2" name="Group 1">
+            <a:extLst>
+              <a:ext uri="{FF2B5EF4-FFF2-40B4-BE49-F238E27FC236}">
+                <a16:creationId xmlns:a16="http://schemas.microsoft.com/office/drawing/2014/main" id="{C2FA31CD-CD5D-449C-A22D-CE4044B4A339}"/>
+              </a:ext>
+            </a:extLst>
+          </p:cNvPr>
+          <p:cNvGrpSpPr/>
+          <p:nvPr/>
+        </p:nvGrpSpPr>
+        <p:grpSpPr>
+          <a:xfrm>
+            <a:off x="3470257" y="2530258"/>
+            <a:ext cx="3105735" cy="910482"/>
+            <a:chOff x="3470257" y="2530258"/>
+            <a:chExt cx="3105735" cy="910482"/>
+          </a:xfrm>
+        </p:grpSpPr>
+        <p:sp>
+          <p:nvSpPr>
+            <p:cNvPr id="5" name="Rectangle 4">
+              <a:extLst>
+                <a:ext uri="{FF2B5EF4-FFF2-40B4-BE49-F238E27FC236}">
+                  <a16:creationId xmlns:a16="http://schemas.microsoft.com/office/drawing/2014/main" id="{65250789-430D-470D-9A9F-007CFCB354FA}"/>
+                </a:ext>
+              </a:extLst>
+            </p:cNvPr>
+            <p:cNvSpPr/>
+            <p:nvPr/>
+          </p:nvSpPr>
+          <p:spPr>
+            <a:xfrm>
+              <a:off x="4252585" y="2530258"/>
+              <a:ext cx="1492745" cy="898742"/>
+            </a:xfrm>
+            <a:prstGeom prst="rect">
+              <a:avLst/>
+            </a:prstGeom>
+            <a:solidFill>
+              <a:schemeClr val="accent1">
+                <a:lumMod val="60000"/>
+                <a:lumOff val="40000"/>
+              </a:schemeClr>
+            </a:solidFill>
+            <a:ln>
+              <a:solidFill>
+                <a:schemeClr val="accent1">
+                  <a:lumMod val="60000"/>
+                  <a:lumOff val="40000"/>
+                </a:schemeClr>
+              </a:solidFill>
+            </a:ln>
+          </p:spPr>
+          <p:style>
+            <a:lnRef idx="2">
+              <a:schemeClr val="accent1">
+                <a:shade val="50000"/>
+              </a:schemeClr>
+            </a:lnRef>
+            <a:fillRef idx="1">
+              <a:schemeClr val="accent1"/>
+            </a:fillRef>
+            <a:effectRef idx="0">
+              <a:schemeClr val="accent1"/>
+            </a:effectRef>
+            <a:fontRef idx="minor">
+              <a:schemeClr val="lt1"/>
+            </a:fontRef>
+          </p:style>
+          <p:txBody>
+            <a:bodyPr rtlCol="0" anchor="ctr"/>
+            <a:lstStyle/>
+            <a:p>
+              <a:pPr algn="ctr"/>
+              <a:r>
+                <a:rPr lang="en-US" sz="1200" dirty="0">
+                  <a:solidFill>
+                    <a:schemeClr val="tx1">
+                      <a:lumMod val="95000"/>
+                      <a:lumOff val="5000"/>
+                    </a:schemeClr>
+                  </a:solidFill>
+                  <a:latin typeface="Consolas" panose="020B0609020204030204" pitchFamily="49" charset="0"/>
+                </a:rPr>
+                <a:t>move(</a:t>
+              </a:r>
+              <a:r>
+                <a:rPr lang="en-US" sz="1200" dirty="0" err="1">
+                  <a:solidFill>
+                    <a:schemeClr val="tx1">
+                      <a:lumMod val="95000"/>
+                      <a:lumOff val="5000"/>
+                    </a:schemeClr>
+                  </a:solidFill>
+                  <a:latin typeface="Consolas" panose="020B0609020204030204" pitchFamily="49" charset="0"/>
+                </a:rPr>
+                <a:t>x,y,dx,dy</a:t>
+              </a:r>
+              <a:r>
+                <a:rPr lang="en-US" sz="1200" dirty="0">
+                  <a:solidFill>
+                    <a:schemeClr val="tx1">
+                      <a:lumMod val="95000"/>
+                      <a:lumOff val="5000"/>
+                    </a:schemeClr>
+                  </a:solidFill>
+                  <a:latin typeface="Consolas" panose="020B0609020204030204" pitchFamily="49" charset="0"/>
+                </a:rPr>
+                <a:t>)</a:t>
+              </a:r>
+            </a:p>
+          </p:txBody>
+        </p:sp>
+        <p:cxnSp>
+          <p:nvCxnSpPr>
+            <p:cNvPr id="6" name="Straight Arrow Connector 5">
+              <a:extLst>
+                <a:ext uri="{FF2B5EF4-FFF2-40B4-BE49-F238E27FC236}">
+                  <a16:creationId xmlns:a16="http://schemas.microsoft.com/office/drawing/2014/main" id="{E5550398-B26B-4DCA-9B66-384E44861B2A}"/>
+                </a:ext>
+              </a:extLst>
+            </p:cNvPr>
+            <p:cNvCxnSpPr>
+              <a:cxnSpLocks/>
+            </p:cNvCxnSpPr>
+            <p:nvPr/>
+          </p:nvCxnSpPr>
+          <p:spPr>
+            <a:xfrm>
+              <a:off x="3732756" y="2687877"/>
+              <a:ext cx="519830" cy="0"/>
+            </a:xfrm>
+            <a:prstGeom prst="straightConnector1">
+              <a:avLst/>
+            </a:prstGeom>
+            <a:ln>
+              <a:tailEnd type="triangle"/>
+            </a:ln>
+          </p:spPr>
+          <p:style>
+            <a:lnRef idx="1">
+              <a:schemeClr val="accent1"/>
+            </a:lnRef>
+            <a:fillRef idx="0">
+              <a:schemeClr val="accent1"/>
+            </a:fillRef>
+            <a:effectRef idx="0">
+              <a:schemeClr val="accent1"/>
+            </a:effectRef>
+            <a:fontRef idx="minor">
+              <a:schemeClr val="tx1"/>
+            </a:fontRef>
+          </p:style>
+        </p:cxnSp>
+        <p:cxnSp>
+          <p:nvCxnSpPr>
+            <p:cNvPr id="7" name="Straight Arrow Connector 6">
+              <a:extLst>
+                <a:ext uri="{FF2B5EF4-FFF2-40B4-BE49-F238E27FC236}">
+                  <a16:creationId xmlns:a16="http://schemas.microsoft.com/office/drawing/2014/main" id="{77F32D70-E769-4059-A2BA-62007CAD475E}"/>
+                </a:ext>
+              </a:extLst>
+            </p:cNvPr>
+            <p:cNvCxnSpPr>
+              <a:cxnSpLocks/>
+            </p:cNvCxnSpPr>
+            <p:nvPr/>
+          </p:nvCxnSpPr>
+          <p:spPr>
+            <a:xfrm>
+              <a:off x="5750104" y="2710102"/>
+              <a:ext cx="519830" cy="0"/>
+            </a:xfrm>
+            <a:prstGeom prst="straightConnector1">
+              <a:avLst/>
+            </a:prstGeom>
+            <a:ln>
+              <a:tailEnd type="triangle"/>
+            </a:ln>
+          </p:spPr>
+          <p:style>
+            <a:lnRef idx="1">
+              <a:schemeClr val="accent1"/>
+            </a:lnRef>
+            <a:fillRef idx="0">
+              <a:schemeClr val="accent1"/>
+            </a:fillRef>
+            <a:effectRef idx="0">
+              <a:schemeClr val="accent1"/>
+            </a:effectRef>
+            <a:fontRef idx="minor">
+              <a:schemeClr val="tx1"/>
+            </a:fontRef>
+          </p:style>
+        </p:cxnSp>
+        <p:cxnSp>
+          <p:nvCxnSpPr>
+            <p:cNvPr id="8" name="Straight Arrow Connector 7">
+              <a:extLst>
+                <a:ext uri="{FF2B5EF4-FFF2-40B4-BE49-F238E27FC236}">
+                  <a16:creationId xmlns:a16="http://schemas.microsoft.com/office/drawing/2014/main" id="{D0E68AB3-47F8-44DA-AB26-6B4110CC160E}"/>
+                </a:ext>
+              </a:extLst>
+            </p:cNvPr>
+            <p:cNvCxnSpPr>
+              <a:cxnSpLocks/>
+            </p:cNvCxnSpPr>
+            <p:nvPr/>
+          </p:nvCxnSpPr>
+          <p:spPr>
+            <a:xfrm>
+              <a:off x="3732756" y="2887899"/>
+              <a:ext cx="519830" cy="0"/>
+            </a:xfrm>
+            <a:prstGeom prst="straightConnector1">
+              <a:avLst/>
+            </a:prstGeom>
+            <a:ln>
+              <a:tailEnd type="triangle"/>
+            </a:ln>
+          </p:spPr>
+          <p:style>
+            <a:lnRef idx="1">
+              <a:schemeClr val="accent1"/>
+            </a:lnRef>
+            <a:fillRef idx="0">
+              <a:schemeClr val="accent1"/>
+            </a:fillRef>
+            <a:effectRef idx="0">
+              <a:schemeClr val="accent1"/>
+            </a:effectRef>
+            <a:fontRef idx="minor">
+              <a:schemeClr val="tx1"/>
+            </a:fontRef>
+          </p:style>
+        </p:cxnSp>
+        <p:cxnSp>
+          <p:nvCxnSpPr>
+            <p:cNvPr id="9" name="Straight Arrow Connector 8">
+              <a:extLst>
+                <a:ext uri="{FF2B5EF4-FFF2-40B4-BE49-F238E27FC236}">
+                  <a16:creationId xmlns:a16="http://schemas.microsoft.com/office/drawing/2014/main" id="{136437DD-3429-4189-B3FE-0BEBB08DE0E8}"/>
+                </a:ext>
+              </a:extLst>
+            </p:cNvPr>
+            <p:cNvCxnSpPr>
+              <a:cxnSpLocks/>
+            </p:cNvCxnSpPr>
+            <p:nvPr/>
+          </p:nvCxnSpPr>
+          <p:spPr>
+            <a:xfrm>
+              <a:off x="5750104" y="2887899"/>
+              <a:ext cx="519830" cy="0"/>
+            </a:xfrm>
+            <a:prstGeom prst="straightConnector1">
+              <a:avLst/>
+            </a:prstGeom>
+            <a:ln>
+              <a:tailEnd type="triangle"/>
+            </a:ln>
+          </p:spPr>
+          <p:style>
+            <a:lnRef idx="1">
+              <a:schemeClr val="accent1"/>
+            </a:lnRef>
+            <a:fillRef idx="0">
+              <a:schemeClr val="accent1"/>
+            </a:fillRef>
+            <a:effectRef idx="0">
+              <a:schemeClr val="accent1"/>
+            </a:effectRef>
+            <a:fontRef idx="minor">
+              <a:schemeClr val="tx1"/>
+            </a:fontRef>
+          </p:style>
+        </p:cxnSp>
+        <p:sp>
+          <p:nvSpPr>
+            <p:cNvPr id="10" name="TextBox 9">
+              <a:extLst>
+                <a:ext uri="{FF2B5EF4-FFF2-40B4-BE49-F238E27FC236}">
+                  <a16:creationId xmlns:a16="http://schemas.microsoft.com/office/drawing/2014/main" id="{E2A6EDAE-8B6E-42B4-84E3-8F8A68572578}"/>
+                </a:ext>
+              </a:extLst>
+            </p:cNvPr>
+            <p:cNvSpPr txBox="1"/>
+            <p:nvPr/>
+          </p:nvSpPr>
+          <p:spPr>
+            <a:xfrm>
+              <a:off x="3546475" y="2549377"/>
+              <a:ext cx="269626" cy="276999"/>
+            </a:xfrm>
+            <a:prstGeom prst="rect">
+              <a:avLst/>
+            </a:prstGeom>
+            <a:noFill/>
+          </p:spPr>
+          <p:txBody>
+            <a:bodyPr wrap="none" rtlCol="0">
+              <a:spAutoFit/>
+            </a:bodyPr>
+            <a:lstStyle/>
+            <a:p>
+              <a:r>
+                <a:rPr lang="en-US" sz="1200" dirty="0">
+                  <a:latin typeface="Consolas" panose="020B0609020204030204" pitchFamily="49" charset="0"/>
+                </a:rPr>
+                <a:t>x</a:t>
+              </a:r>
+            </a:p>
+          </p:txBody>
+        </p:sp>
+        <p:sp>
+          <p:nvSpPr>
+            <p:cNvPr id="11" name="TextBox 10">
+              <a:extLst>
+                <a:ext uri="{FF2B5EF4-FFF2-40B4-BE49-F238E27FC236}">
+                  <a16:creationId xmlns:a16="http://schemas.microsoft.com/office/drawing/2014/main" id="{E350ADD5-D522-43A1-B8A8-B1A4A6FF269A}"/>
+                </a:ext>
+              </a:extLst>
+            </p:cNvPr>
+            <p:cNvSpPr txBox="1"/>
+            <p:nvPr/>
+          </p:nvSpPr>
+          <p:spPr>
+            <a:xfrm>
+              <a:off x="3546475" y="2739874"/>
+              <a:ext cx="269626" cy="276999"/>
+            </a:xfrm>
+            <a:prstGeom prst="rect">
+              <a:avLst/>
+            </a:prstGeom>
+            <a:noFill/>
+          </p:spPr>
+          <p:txBody>
+            <a:bodyPr wrap="none" rtlCol="0">
+              <a:spAutoFit/>
+            </a:bodyPr>
+            <a:lstStyle/>
+            <a:p>
+              <a:r>
+                <a:rPr lang="en-US" sz="1200" dirty="0">
+                  <a:latin typeface="Consolas" panose="020B0609020204030204" pitchFamily="49" charset="0"/>
+                </a:rPr>
+                <a:t>y</a:t>
+              </a:r>
+            </a:p>
+          </p:txBody>
+        </p:sp>
+        <p:sp>
+          <p:nvSpPr>
+            <p:cNvPr id="12" name="TextBox 11">
+              <a:extLst>
+                <a:ext uri="{FF2B5EF4-FFF2-40B4-BE49-F238E27FC236}">
+                  <a16:creationId xmlns:a16="http://schemas.microsoft.com/office/drawing/2014/main" id="{A11A4EEA-B16C-408E-A3A2-DDFA887507B5}"/>
+                </a:ext>
+              </a:extLst>
+            </p:cNvPr>
+            <p:cNvSpPr txBox="1"/>
+            <p:nvPr/>
+          </p:nvSpPr>
+          <p:spPr>
+            <a:xfrm>
+              <a:off x="6216655" y="2565252"/>
+              <a:ext cx="269626" cy="276999"/>
+            </a:xfrm>
+            <a:prstGeom prst="rect">
+              <a:avLst/>
+            </a:prstGeom>
+            <a:noFill/>
+          </p:spPr>
+          <p:txBody>
+            <a:bodyPr wrap="none" rtlCol="0">
+              <a:spAutoFit/>
+            </a:bodyPr>
+            <a:lstStyle/>
+            <a:p>
+              <a:r>
+                <a:rPr lang="en-US" sz="1200" dirty="0">
+                  <a:latin typeface="Consolas" panose="020B0609020204030204" pitchFamily="49" charset="0"/>
+                </a:rPr>
+                <a:t>x</a:t>
+              </a:r>
+            </a:p>
+          </p:txBody>
+        </p:sp>
+        <p:sp>
+          <p:nvSpPr>
+            <p:cNvPr id="13" name="TextBox 12">
+              <a:extLst>
+                <a:ext uri="{FF2B5EF4-FFF2-40B4-BE49-F238E27FC236}">
+                  <a16:creationId xmlns:a16="http://schemas.microsoft.com/office/drawing/2014/main" id="{2A21E6E8-2CF0-4629-AFC5-E0C431D756D5}"/>
+                </a:ext>
+              </a:extLst>
+            </p:cNvPr>
+            <p:cNvSpPr txBox="1"/>
+            <p:nvPr/>
+          </p:nvSpPr>
+          <p:spPr>
+            <a:xfrm>
+              <a:off x="6216655" y="2717645"/>
+              <a:ext cx="269626" cy="276999"/>
+            </a:xfrm>
+            <a:prstGeom prst="rect">
+              <a:avLst/>
+            </a:prstGeom>
+            <a:noFill/>
+          </p:spPr>
+          <p:txBody>
+            <a:bodyPr wrap="none" rtlCol="0">
+              <a:spAutoFit/>
+            </a:bodyPr>
+            <a:lstStyle/>
+            <a:p>
+              <a:r>
+                <a:rPr lang="en-US" sz="1200" dirty="0">
+                  <a:latin typeface="Consolas" panose="020B0609020204030204" pitchFamily="49" charset="0"/>
+                </a:rPr>
+                <a:t>y</a:t>
+              </a:r>
+            </a:p>
+          </p:txBody>
+        </p:sp>
+        <p:cxnSp>
+          <p:nvCxnSpPr>
+            <p:cNvPr id="14" name="Straight Arrow Connector 13">
+              <a:extLst>
+                <a:ext uri="{FF2B5EF4-FFF2-40B4-BE49-F238E27FC236}">
+                  <a16:creationId xmlns:a16="http://schemas.microsoft.com/office/drawing/2014/main" id="{73980695-46EA-4278-86B9-7B435B1717DC}"/>
+                </a:ext>
+              </a:extLst>
+            </p:cNvPr>
+            <p:cNvCxnSpPr>
+              <a:cxnSpLocks/>
+            </p:cNvCxnSpPr>
+            <p:nvPr/>
+          </p:nvCxnSpPr>
+          <p:spPr>
+            <a:xfrm>
+              <a:off x="3732746" y="3111744"/>
+              <a:ext cx="519830" cy="0"/>
+            </a:xfrm>
+            <a:prstGeom prst="straightConnector1">
+              <a:avLst/>
+            </a:prstGeom>
+            <a:ln>
+              <a:tailEnd type="triangle"/>
+            </a:ln>
+          </p:spPr>
+          <p:style>
+            <a:lnRef idx="1">
+              <a:schemeClr val="accent1"/>
+            </a:lnRef>
+            <a:fillRef idx="0">
+              <a:schemeClr val="accent1"/>
+            </a:fillRef>
+            <a:effectRef idx="0">
+              <a:schemeClr val="accent1"/>
+            </a:effectRef>
+            <a:fontRef idx="minor">
+              <a:schemeClr val="tx1"/>
+            </a:fontRef>
+          </p:style>
+        </p:cxnSp>
+        <p:cxnSp>
+          <p:nvCxnSpPr>
+            <p:cNvPr id="15" name="Straight Arrow Connector 14">
+              <a:extLst>
+                <a:ext uri="{FF2B5EF4-FFF2-40B4-BE49-F238E27FC236}">
+                  <a16:creationId xmlns:a16="http://schemas.microsoft.com/office/drawing/2014/main" id="{4E2CAFA5-CBBD-4C4D-B680-C7878CCBE4B2}"/>
+                </a:ext>
+              </a:extLst>
+            </p:cNvPr>
+            <p:cNvCxnSpPr>
+              <a:cxnSpLocks/>
+            </p:cNvCxnSpPr>
+            <p:nvPr/>
+          </p:nvCxnSpPr>
+          <p:spPr>
+            <a:xfrm>
+              <a:off x="5750094" y="3133969"/>
+              <a:ext cx="519830" cy="0"/>
+            </a:xfrm>
+            <a:prstGeom prst="straightConnector1">
+              <a:avLst/>
+            </a:prstGeom>
+            <a:ln>
+              <a:tailEnd type="triangle"/>
+            </a:ln>
+          </p:spPr>
+          <p:style>
+            <a:lnRef idx="1">
+              <a:schemeClr val="accent1"/>
+            </a:lnRef>
+            <a:fillRef idx="0">
+              <a:schemeClr val="accent1"/>
+            </a:fillRef>
+            <a:effectRef idx="0">
+              <a:schemeClr val="accent1"/>
+            </a:effectRef>
+            <a:fontRef idx="minor">
+              <a:schemeClr val="tx1"/>
+            </a:fontRef>
+          </p:style>
+        </p:cxnSp>
+        <p:cxnSp>
+          <p:nvCxnSpPr>
+            <p:cNvPr id="16" name="Straight Arrow Connector 15">
+              <a:extLst>
+                <a:ext uri="{FF2B5EF4-FFF2-40B4-BE49-F238E27FC236}">
+                  <a16:creationId xmlns:a16="http://schemas.microsoft.com/office/drawing/2014/main" id="{BDB36A6B-2601-486E-BD15-8FE7F2E7255B}"/>
+                </a:ext>
+              </a:extLst>
+            </p:cNvPr>
+            <p:cNvCxnSpPr>
+              <a:cxnSpLocks/>
+            </p:cNvCxnSpPr>
+            <p:nvPr/>
+          </p:nvCxnSpPr>
+          <p:spPr>
+            <a:xfrm>
+              <a:off x="3732746" y="3311766"/>
+              <a:ext cx="519830" cy="0"/>
+            </a:xfrm>
+            <a:prstGeom prst="straightConnector1">
+              <a:avLst/>
+            </a:prstGeom>
+            <a:ln>
+              <a:tailEnd type="triangle"/>
+            </a:ln>
+          </p:spPr>
+          <p:style>
+            <a:lnRef idx="1">
+              <a:schemeClr val="accent1"/>
+            </a:lnRef>
+            <a:fillRef idx="0">
+              <a:schemeClr val="accent1"/>
+            </a:fillRef>
+            <a:effectRef idx="0">
+              <a:schemeClr val="accent1"/>
+            </a:effectRef>
+            <a:fontRef idx="minor">
+              <a:schemeClr val="tx1"/>
+            </a:fontRef>
+          </p:style>
+        </p:cxnSp>
+        <p:cxnSp>
+          <p:nvCxnSpPr>
+            <p:cNvPr id="17" name="Straight Arrow Connector 16">
+              <a:extLst>
+                <a:ext uri="{FF2B5EF4-FFF2-40B4-BE49-F238E27FC236}">
+                  <a16:creationId xmlns:a16="http://schemas.microsoft.com/office/drawing/2014/main" id="{9E155820-A09B-4B62-93DB-1AC0D7840D7A}"/>
+                </a:ext>
+              </a:extLst>
+            </p:cNvPr>
+            <p:cNvCxnSpPr>
+              <a:cxnSpLocks/>
+            </p:cNvCxnSpPr>
+            <p:nvPr/>
+          </p:nvCxnSpPr>
+          <p:spPr>
+            <a:xfrm>
+              <a:off x="5750094" y="3311766"/>
+              <a:ext cx="519830" cy="0"/>
+            </a:xfrm>
+            <a:prstGeom prst="straightConnector1">
+              <a:avLst/>
+            </a:prstGeom>
+            <a:ln>
+              <a:tailEnd type="triangle"/>
+            </a:ln>
+          </p:spPr>
+          <p:style>
+            <a:lnRef idx="1">
+              <a:schemeClr val="accent1"/>
+            </a:lnRef>
+            <a:fillRef idx="0">
+              <a:schemeClr val="accent1"/>
+            </a:fillRef>
+            <a:effectRef idx="0">
+              <a:schemeClr val="accent1"/>
+            </a:effectRef>
+            <a:fontRef idx="minor">
+              <a:schemeClr val="tx1"/>
+            </a:fontRef>
+          </p:style>
+        </p:cxnSp>
+        <p:sp>
+          <p:nvSpPr>
+            <p:cNvPr id="18" name="TextBox 17">
+              <a:extLst>
+                <a:ext uri="{FF2B5EF4-FFF2-40B4-BE49-F238E27FC236}">
+                  <a16:creationId xmlns:a16="http://schemas.microsoft.com/office/drawing/2014/main" id="{0526D222-06DD-4931-A7DB-4F077E3B8393}"/>
+                </a:ext>
+              </a:extLst>
+            </p:cNvPr>
+            <p:cNvSpPr txBox="1"/>
+            <p:nvPr/>
+          </p:nvSpPr>
+          <p:spPr>
+            <a:xfrm>
+              <a:off x="3475020" y="2973244"/>
+              <a:ext cx="354584" cy="276999"/>
+            </a:xfrm>
+            <a:prstGeom prst="rect">
+              <a:avLst/>
+            </a:prstGeom>
+            <a:noFill/>
+          </p:spPr>
+          <p:txBody>
+            <a:bodyPr wrap="none" rtlCol="0">
+              <a:spAutoFit/>
+            </a:bodyPr>
+            <a:lstStyle/>
+            <a:p>
+              <a:r>
+                <a:rPr lang="en-US" sz="1200" dirty="0">
+                  <a:latin typeface="Consolas" panose="020B0609020204030204" pitchFamily="49" charset="0"/>
+                </a:rPr>
+                <a:t>dx</a:t>
+              </a:r>
+            </a:p>
+          </p:txBody>
+        </p:sp>
+        <p:sp>
+          <p:nvSpPr>
+            <p:cNvPr id="19" name="TextBox 18">
+              <a:extLst>
+                <a:ext uri="{FF2B5EF4-FFF2-40B4-BE49-F238E27FC236}">
+                  <a16:creationId xmlns:a16="http://schemas.microsoft.com/office/drawing/2014/main" id="{F45677CC-01F6-4E9C-97AF-4E215DE7FF6F}"/>
+                </a:ext>
+              </a:extLst>
+            </p:cNvPr>
+            <p:cNvSpPr txBox="1"/>
+            <p:nvPr/>
+          </p:nvSpPr>
+          <p:spPr>
+            <a:xfrm>
+              <a:off x="3470257" y="3163741"/>
+              <a:ext cx="354584" cy="276999"/>
+            </a:xfrm>
+            <a:prstGeom prst="rect">
+              <a:avLst/>
+            </a:prstGeom>
+            <a:noFill/>
+          </p:spPr>
+          <p:txBody>
+            <a:bodyPr wrap="none" rtlCol="0">
+              <a:spAutoFit/>
+            </a:bodyPr>
+            <a:lstStyle/>
+            <a:p>
+              <a:r>
+                <a:rPr lang="en-US" sz="1200" dirty="0" err="1">
+                  <a:latin typeface="Consolas" panose="020B0609020204030204" pitchFamily="49" charset="0"/>
+                </a:rPr>
+                <a:t>dy</a:t>
+              </a:r>
+              <a:endParaRPr lang="en-US" sz="1200" dirty="0">
+                <a:latin typeface="Consolas" panose="020B0609020204030204" pitchFamily="49" charset="0"/>
+              </a:endParaRPr>
+            </a:p>
+          </p:txBody>
+        </p:sp>
+        <p:sp>
+          <p:nvSpPr>
+            <p:cNvPr id="20" name="TextBox 19">
+              <a:extLst>
+                <a:ext uri="{FF2B5EF4-FFF2-40B4-BE49-F238E27FC236}">
+                  <a16:creationId xmlns:a16="http://schemas.microsoft.com/office/drawing/2014/main" id="{BEBF56BD-85D0-471F-9780-69B31A502713}"/>
+                </a:ext>
+              </a:extLst>
+            </p:cNvPr>
+            <p:cNvSpPr txBox="1"/>
+            <p:nvPr/>
+          </p:nvSpPr>
+          <p:spPr>
+            <a:xfrm>
+              <a:off x="6221408" y="2989119"/>
+              <a:ext cx="354584" cy="276999"/>
+            </a:xfrm>
+            <a:prstGeom prst="rect">
+              <a:avLst/>
+            </a:prstGeom>
+            <a:noFill/>
+          </p:spPr>
+          <p:txBody>
+            <a:bodyPr wrap="none" rtlCol="0">
+              <a:spAutoFit/>
+            </a:bodyPr>
+            <a:lstStyle/>
+            <a:p>
+              <a:r>
+                <a:rPr lang="en-US" sz="1200" dirty="0">
+                  <a:latin typeface="Consolas" panose="020B0609020204030204" pitchFamily="49" charset="0"/>
+                </a:rPr>
+                <a:t>dx</a:t>
+              </a:r>
+            </a:p>
+          </p:txBody>
+        </p:sp>
+        <p:sp>
+          <p:nvSpPr>
+            <p:cNvPr id="21" name="TextBox 20">
+              <a:extLst>
+                <a:ext uri="{FF2B5EF4-FFF2-40B4-BE49-F238E27FC236}">
+                  <a16:creationId xmlns:a16="http://schemas.microsoft.com/office/drawing/2014/main" id="{6F6F7C36-2C5B-4767-BB96-877434F4089B}"/>
+                </a:ext>
+              </a:extLst>
+            </p:cNvPr>
+            <p:cNvSpPr txBox="1"/>
+            <p:nvPr/>
+          </p:nvSpPr>
+          <p:spPr>
+            <a:xfrm>
+              <a:off x="6216645" y="3141512"/>
+              <a:ext cx="354584" cy="276999"/>
+            </a:xfrm>
+            <a:prstGeom prst="rect">
+              <a:avLst/>
+            </a:prstGeom>
+            <a:noFill/>
+          </p:spPr>
+          <p:txBody>
+            <a:bodyPr wrap="none" rtlCol="0">
+              <a:spAutoFit/>
+            </a:bodyPr>
+            <a:lstStyle/>
+            <a:p>
+              <a:r>
+                <a:rPr lang="en-US" sz="1200" dirty="0" err="1">
+                  <a:latin typeface="Consolas" panose="020B0609020204030204" pitchFamily="49" charset="0"/>
+                </a:rPr>
+                <a:t>dy</a:t>
+              </a:r>
+              <a:endParaRPr lang="en-US" sz="1200" dirty="0">
+                <a:latin typeface="Consolas" panose="020B0609020204030204" pitchFamily="49" charset="0"/>
+              </a:endParaRPr>
+            </a:p>
+          </p:txBody>
+        </p:sp>
+      </p:grpSp>
+    </p:spTree>
+    <p:extLst>
+      <p:ext uri="{BB962C8B-B14F-4D97-AF65-F5344CB8AC3E}">
+        <p14:creationId xmlns:p14="http://schemas.microsoft.com/office/powerpoint/2010/main" val="1642093445"/>
       </p:ext>
     </p:extLst>
   </p:cSld>

</xml_diff>

<commit_message>
updates to pong simlation to add QUIT and paddle strike
</commit_message>
<xml_diff>
--- a/images/pygame_rect_window.pptx
+++ b/images/pygame_rect_window.pptx
@@ -259,7 +259,7 @@
           <a:p>
             <a:fld id="{856FFBE8-0159-4FDA-8D70-04C5D85E84A4}" type="datetimeFigureOut">
               <a:rPr lang="en-US" smtClean="0"/>
-              <a:t>7/12/2017</a:t>
+              <a:t>7/13/2017</a:t>
             </a:fld>
             <a:endParaRPr lang="en-US"/>
           </a:p>
@@ -427,7 +427,7 @@
           <a:p>
             <a:fld id="{856FFBE8-0159-4FDA-8D70-04C5D85E84A4}" type="datetimeFigureOut">
               <a:rPr lang="en-US" smtClean="0"/>
-              <a:t>7/12/2017</a:t>
+              <a:t>7/13/2017</a:t>
             </a:fld>
             <a:endParaRPr lang="en-US"/>
           </a:p>
@@ -605,7 +605,7 @@
           <a:p>
             <a:fld id="{856FFBE8-0159-4FDA-8D70-04C5D85E84A4}" type="datetimeFigureOut">
               <a:rPr lang="en-US" smtClean="0"/>
-              <a:t>7/12/2017</a:t>
+              <a:t>7/13/2017</a:t>
             </a:fld>
             <a:endParaRPr lang="en-US"/>
           </a:p>
@@ -773,7 +773,7 @@
           <a:p>
             <a:fld id="{856FFBE8-0159-4FDA-8D70-04C5D85E84A4}" type="datetimeFigureOut">
               <a:rPr lang="en-US" smtClean="0"/>
-              <a:t>7/12/2017</a:t>
+              <a:t>7/13/2017</a:t>
             </a:fld>
             <a:endParaRPr lang="en-US"/>
           </a:p>
@@ -1018,7 +1018,7 @@
           <a:p>
             <a:fld id="{856FFBE8-0159-4FDA-8D70-04C5D85E84A4}" type="datetimeFigureOut">
               <a:rPr lang="en-US" smtClean="0"/>
-              <a:t>7/12/2017</a:t>
+              <a:t>7/13/2017</a:t>
             </a:fld>
             <a:endParaRPr lang="en-US"/>
           </a:p>
@@ -1247,7 +1247,7 @@
           <a:p>
             <a:fld id="{856FFBE8-0159-4FDA-8D70-04C5D85E84A4}" type="datetimeFigureOut">
               <a:rPr lang="en-US" smtClean="0"/>
-              <a:t>7/12/2017</a:t>
+              <a:t>7/13/2017</a:t>
             </a:fld>
             <a:endParaRPr lang="en-US"/>
           </a:p>
@@ -1611,7 +1611,7 @@
           <a:p>
             <a:fld id="{856FFBE8-0159-4FDA-8D70-04C5D85E84A4}" type="datetimeFigureOut">
               <a:rPr lang="en-US" smtClean="0"/>
-              <a:t>7/12/2017</a:t>
+              <a:t>7/13/2017</a:t>
             </a:fld>
             <a:endParaRPr lang="en-US"/>
           </a:p>
@@ -1728,7 +1728,7 @@
           <a:p>
             <a:fld id="{856FFBE8-0159-4FDA-8D70-04C5D85E84A4}" type="datetimeFigureOut">
               <a:rPr lang="en-US" smtClean="0"/>
-              <a:t>7/12/2017</a:t>
+              <a:t>7/13/2017</a:t>
             </a:fld>
             <a:endParaRPr lang="en-US"/>
           </a:p>
@@ -1823,7 +1823,7 @@
           <a:p>
             <a:fld id="{856FFBE8-0159-4FDA-8D70-04C5D85E84A4}" type="datetimeFigureOut">
               <a:rPr lang="en-US" smtClean="0"/>
-              <a:t>7/12/2017</a:t>
+              <a:t>7/13/2017</a:t>
             </a:fld>
             <a:endParaRPr lang="en-US"/>
           </a:p>
@@ -2098,7 +2098,7 @@
           <a:p>
             <a:fld id="{856FFBE8-0159-4FDA-8D70-04C5D85E84A4}" type="datetimeFigureOut">
               <a:rPr lang="en-US" smtClean="0"/>
-              <a:t>7/12/2017</a:t>
+              <a:t>7/13/2017</a:t>
             </a:fld>
             <a:endParaRPr lang="en-US"/>
           </a:p>
@@ -2350,7 +2350,7 @@
           <a:p>
             <a:fld id="{856FFBE8-0159-4FDA-8D70-04C5D85E84A4}" type="datetimeFigureOut">
               <a:rPr lang="en-US" smtClean="0"/>
-              <a:t>7/12/2017</a:t>
+              <a:t>7/13/2017</a:t>
             </a:fld>
             <a:endParaRPr lang="en-US"/>
           </a:p>
@@ -2561,7 +2561,7 @@
           <a:p>
             <a:fld id="{856FFBE8-0159-4FDA-8D70-04C5D85E84A4}" type="datetimeFigureOut">
               <a:rPr lang="en-US" smtClean="0"/>
-              <a:t>7/12/2017</a:t>
+              <a:t>7/13/2017</a:t>
             </a:fld>
             <a:endParaRPr lang="en-US"/>
           </a:p>
@@ -6090,6 +6090,786 @@
           <a:chExt cx="0" cy="0"/>
         </a:xfrm>
       </p:grpSpPr>
+      <p:pic>
+        <p:nvPicPr>
+          <p:cNvPr id="22" name="Picture 21" descr="A close up of a logo&#10;&#10;Description generated with high confidence">
+            <a:extLst>
+              <a:ext uri="{FF2B5EF4-FFF2-40B4-BE49-F238E27FC236}">
+                <a16:creationId xmlns:a16="http://schemas.microsoft.com/office/drawing/2014/main" id="{10C8D5CF-E347-4253-9BBD-1E6933F40EBA}"/>
+              </a:ext>
+            </a:extLst>
+          </p:cNvPr>
+          <p:cNvPicPr>
+            <a:picLocks noChangeAspect="1"/>
+          </p:cNvPicPr>
+          <p:nvPr/>
+        </p:nvPicPr>
+        <p:blipFill>
+          <a:blip r:embed="rId2">
+            <a:extLst>
+              <a:ext uri="{28A0092B-C50C-407E-A947-70E740481C1C}">
+                <a14:useLocalDpi xmlns:a14="http://schemas.microsoft.com/office/drawing/2010/main" val="0"/>
+              </a:ext>
+            </a:extLst>
+          </a:blip>
+          <a:stretch>
+            <a:fillRect/>
+          </a:stretch>
+        </p:blipFill>
+        <p:spPr>
+          <a:xfrm>
+            <a:off x="5705524" y="1448047"/>
+            <a:ext cx="780952" cy="3961905"/>
+          </a:xfrm>
+          <a:prstGeom prst="rect">
+            <a:avLst/>
+          </a:prstGeom>
+          <a:ln w="3175">
+            <a:solidFill>
+              <a:schemeClr val="tx1"/>
+            </a:solidFill>
+          </a:ln>
+        </p:spPr>
+      </p:pic>
+      <p:pic>
+        <p:nvPicPr>
+          <p:cNvPr id="7" name="Picture 6" descr="A picture containing dome&#10;&#10;Description generated with high confidence">
+            <a:extLst>
+              <a:ext uri="{FF2B5EF4-FFF2-40B4-BE49-F238E27FC236}">
+                <a16:creationId xmlns:a16="http://schemas.microsoft.com/office/drawing/2014/main" id="{FF47CB79-4A29-4F5D-B13B-9C346E666908}"/>
+              </a:ext>
+            </a:extLst>
+          </p:cNvPr>
+          <p:cNvPicPr>
+            <a:picLocks noChangeAspect="1"/>
+          </p:cNvPicPr>
+          <p:nvPr/>
+        </p:nvPicPr>
+        <p:blipFill>
+          <a:blip r:embed="rId3">
+            <a:extLst>
+              <a:ext uri="{28A0092B-C50C-407E-A947-70E740481C1C}">
+                <a14:useLocalDpi xmlns:a14="http://schemas.microsoft.com/office/drawing/2010/main" val="0"/>
+              </a:ext>
+            </a:extLst>
+          </a:blip>
+          <a:stretch>
+            <a:fillRect/>
+          </a:stretch>
+        </p:blipFill>
+        <p:spPr>
+          <a:xfrm rot="7457934">
+            <a:off x="6401931" y="2458179"/>
+            <a:ext cx="1495949" cy="1466030"/>
+          </a:xfrm>
+          <a:prstGeom prst="rect">
+            <a:avLst/>
+          </a:prstGeom>
+          <a:ln>
+            <a:noFill/>
+          </a:ln>
+        </p:spPr>
+      </p:pic>
+      <p:sp>
+        <p:nvSpPr>
+          <p:cNvPr id="16" name="TextBox 15">
+            <a:extLst>
+              <a:ext uri="{FF2B5EF4-FFF2-40B4-BE49-F238E27FC236}">
+                <a16:creationId xmlns:a16="http://schemas.microsoft.com/office/drawing/2014/main" id="{F6ED1E9F-D4AD-4C1D-9BED-1A2C3061042F}"/>
+              </a:ext>
+            </a:extLst>
+          </p:cNvPr>
+          <p:cNvSpPr txBox="1"/>
+          <p:nvPr/>
+        </p:nvSpPr>
+        <p:spPr>
+          <a:xfrm>
+            <a:off x="5663830" y="5365599"/>
+            <a:ext cx="864339" cy="276999"/>
+          </a:xfrm>
+          <a:prstGeom prst="rect">
+            <a:avLst/>
+          </a:prstGeom>
+          <a:noFill/>
+        </p:spPr>
+        <p:txBody>
+          <a:bodyPr wrap="none" rtlCol="0">
+            <a:spAutoFit/>
+          </a:bodyPr>
+          <a:lstStyle/>
+          <a:p>
+            <a:r>
+              <a:rPr lang="en-US" sz="1200" dirty="0" err="1">
+                <a:latin typeface="Consolas" panose="020B0609020204030204" pitchFamily="49" charset="0"/>
+              </a:rPr>
+              <a:t>paddle_w</a:t>
+            </a:r>
+            <a:endParaRPr lang="en-US" sz="1200" dirty="0">
+              <a:latin typeface="Consolas" panose="020B0609020204030204" pitchFamily="49" charset="0"/>
+            </a:endParaRPr>
+          </a:p>
+        </p:txBody>
+      </p:sp>
+      <p:sp>
+        <p:nvSpPr>
+          <p:cNvPr id="17" name="TextBox 16">
+            <a:extLst>
+              <a:ext uri="{FF2B5EF4-FFF2-40B4-BE49-F238E27FC236}">
+                <a16:creationId xmlns:a16="http://schemas.microsoft.com/office/drawing/2014/main" id="{B0B2154D-F646-4640-A675-DF101D90EA42}"/>
+              </a:ext>
+            </a:extLst>
+          </p:cNvPr>
+          <p:cNvSpPr txBox="1"/>
+          <p:nvPr/>
+        </p:nvSpPr>
+        <p:spPr>
+          <a:xfrm rot="16200000">
+            <a:off x="5007272" y="3290499"/>
+            <a:ext cx="864339" cy="276999"/>
+          </a:xfrm>
+          <a:prstGeom prst="rect">
+            <a:avLst/>
+          </a:prstGeom>
+          <a:noFill/>
+        </p:spPr>
+        <p:txBody>
+          <a:bodyPr wrap="none" rtlCol="0">
+            <a:spAutoFit/>
+          </a:bodyPr>
+          <a:lstStyle/>
+          <a:p>
+            <a:r>
+              <a:rPr lang="en-US" sz="1200" dirty="0" err="1">
+                <a:latin typeface="Consolas" panose="020B0609020204030204" pitchFamily="49" charset="0"/>
+              </a:rPr>
+              <a:t>paddle_h</a:t>
+            </a:r>
+            <a:endParaRPr lang="en-US" sz="1200" dirty="0">
+              <a:latin typeface="Consolas" panose="020B0609020204030204" pitchFamily="49" charset="0"/>
+            </a:endParaRPr>
+          </a:p>
+        </p:txBody>
+      </p:sp>
+      <p:sp>
+        <p:nvSpPr>
+          <p:cNvPr id="18" name="TextBox 17">
+            <a:extLst>
+              <a:ext uri="{FF2B5EF4-FFF2-40B4-BE49-F238E27FC236}">
+                <a16:creationId xmlns:a16="http://schemas.microsoft.com/office/drawing/2014/main" id="{5BEF4DED-E7A0-4BC9-9C7C-7C5582E5F322}"/>
+              </a:ext>
+            </a:extLst>
+          </p:cNvPr>
+          <p:cNvSpPr txBox="1"/>
+          <p:nvPr/>
+        </p:nvSpPr>
+        <p:spPr>
+          <a:xfrm>
+            <a:off x="2813526" y="1170524"/>
+            <a:ext cx="1883849" cy="276999"/>
+          </a:xfrm>
+          <a:prstGeom prst="rect">
+            <a:avLst/>
+          </a:prstGeom>
+          <a:noFill/>
+        </p:spPr>
+        <p:txBody>
+          <a:bodyPr wrap="none" rtlCol="0">
+            <a:spAutoFit/>
+          </a:bodyPr>
+          <a:lstStyle/>
+          <a:p>
+            <a:r>
+              <a:rPr lang="en-US" sz="1200" dirty="0">
+                <a:latin typeface="Consolas" panose="020B0609020204030204" pitchFamily="49" charset="0"/>
+              </a:rPr>
+              <a:t>(</a:t>
+            </a:r>
+            <a:r>
+              <a:rPr lang="en-US" sz="1200" dirty="0" err="1">
+                <a:latin typeface="Consolas" panose="020B0609020204030204" pitchFamily="49" charset="0"/>
+              </a:rPr>
+              <a:t>paddle_x</a:t>
+            </a:r>
+            <a:r>
+              <a:rPr lang="en-US" sz="1200" dirty="0">
+                <a:latin typeface="Consolas" panose="020B0609020204030204" pitchFamily="49" charset="0"/>
+              </a:rPr>
+              <a:t>, </a:t>
+            </a:r>
+            <a:r>
+              <a:rPr lang="en-US" sz="1200" dirty="0" err="1">
+                <a:latin typeface="Consolas" panose="020B0609020204030204" pitchFamily="49" charset="0"/>
+              </a:rPr>
+              <a:t>paddle_y</a:t>
+            </a:r>
+            <a:r>
+              <a:rPr lang="en-US" sz="1200" dirty="0">
+                <a:latin typeface="Consolas" panose="020B0609020204030204" pitchFamily="49" charset="0"/>
+              </a:rPr>
+              <a:t>)</a:t>
+            </a:r>
+          </a:p>
+        </p:txBody>
+      </p:sp>
+      <p:sp>
+        <p:nvSpPr>
+          <p:cNvPr id="19" name="Freeform: Shape 18">
+            <a:extLst>
+              <a:ext uri="{FF2B5EF4-FFF2-40B4-BE49-F238E27FC236}">
+                <a16:creationId xmlns:a16="http://schemas.microsoft.com/office/drawing/2014/main" id="{F686832D-B4C7-4E63-B598-EE4CD703B02F}"/>
+              </a:ext>
+            </a:extLst>
+          </p:cNvPr>
+          <p:cNvSpPr/>
+          <p:nvPr/>
+        </p:nvSpPr>
+        <p:spPr>
+          <a:xfrm>
+            <a:off x="3753134" y="1313426"/>
+            <a:ext cx="1937982" cy="425350"/>
+          </a:xfrm>
+          <a:custGeom>
+            <a:avLst/>
+            <a:gdLst>
+              <a:gd name="connsiteX0" fmla="*/ 0 w 1937982"/>
+              <a:gd name="connsiteY0" fmla="*/ 105941 h 425350"/>
+              <a:gd name="connsiteX1" fmla="*/ 1032681 w 1937982"/>
+              <a:gd name="connsiteY1" fmla="*/ 424389 h 425350"/>
+              <a:gd name="connsiteX2" fmla="*/ 1442114 w 1937982"/>
+              <a:gd name="connsiteY2" fmla="*/ 14956 h 425350"/>
+              <a:gd name="connsiteX3" fmla="*/ 1937982 w 1937982"/>
+              <a:gd name="connsiteY3" fmla="*/ 128687 h 425350"/>
+            </a:gdLst>
+            <a:ahLst/>
+            <a:cxnLst>
+              <a:cxn ang="0">
+                <a:pos x="connsiteX0" y="connsiteY0"/>
+              </a:cxn>
+              <a:cxn ang="0">
+                <a:pos x="connsiteX1" y="connsiteY1"/>
+              </a:cxn>
+              <a:cxn ang="0">
+                <a:pos x="connsiteX2" y="connsiteY2"/>
+              </a:cxn>
+              <a:cxn ang="0">
+                <a:pos x="connsiteX3" y="connsiteY3"/>
+              </a:cxn>
+            </a:cxnLst>
+            <a:rect l="l" t="t" r="r" b="b"/>
+            <a:pathLst>
+              <a:path w="1937982" h="425350">
+                <a:moveTo>
+                  <a:pt x="0" y="105941"/>
+                </a:moveTo>
+                <a:cubicBezTo>
+                  <a:pt x="396164" y="272747"/>
+                  <a:pt x="792329" y="439553"/>
+                  <a:pt x="1032681" y="424389"/>
+                </a:cubicBezTo>
+                <a:cubicBezTo>
+                  <a:pt x="1273033" y="409225"/>
+                  <a:pt x="1291231" y="64240"/>
+                  <a:pt x="1442114" y="14956"/>
+                </a:cubicBezTo>
+                <a:cubicBezTo>
+                  <a:pt x="1592997" y="-34328"/>
+                  <a:pt x="1765489" y="47179"/>
+                  <a:pt x="1937982" y="128687"/>
+                </a:cubicBezTo>
+              </a:path>
+            </a:pathLst>
+          </a:custGeom>
+          <a:ln w="9525" cap="flat" cmpd="sng" algn="ctr">
+            <a:solidFill>
+              <a:schemeClr val="dk1"/>
+            </a:solidFill>
+            <a:prstDash val="solid"/>
+            <a:round/>
+            <a:headEnd type="none" w="med" len="med"/>
+            <a:tailEnd type="arrow" w="med" len="med"/>
+          </a:ln>
+        </p:spPr>
+        <p:style>
+          <a:lnRef idx="0">
+            <a:scrgbClr r="0" g="0" b="0"/>
+          </a:lnRef>
+          <a:fillRef idx="0">
+            <a:scrgbClr r="0" g="0" b="0"/>
+          </a:fillRef>
+          <a:effectRef idx="0">
+            <a:scrgbClr r="0" g="0" b="0"/>
+          </a:effectRef>
+          <a:fontRef idx="minor">
+            <a:schemeClr val="tx1"/>
+          </a:fontRef>
+        </p:style>
+        <p:txBody>
+          <a:bodyPr rtlCol="0" anchor="ctr"/>
+          <a:lstStyle/>
+          <a:p>
+            <a:pPr algn="ctr"/>
+            <a:endParaRPr lang="en-US"/>
+          </a:p>
+        </p:txBody>
+      </p:sp>
+      <p:cxnSp>
+        <p:nvCxnSpPr>
+          <p:cNvPr id="24" name="Straight Connector 23">
+            <a:extLst>
+              <a:ext uri="{FF2B5EF4-FFF2-40B4-BE49-F238E27FC236}">
+                <a16:creationId xmlns:a16="http://schemas.microsoft.com/office/drawing/2014/main" id="{3FBD36A3-E046-4530-99FF-6205D1C90F13}"/>
+              </a:ext>
+            </a:extLst>
+          </p:cNvPr>
+          <p:cNvCxnSpPr/>
+          <p:nvPr/>
+        </p:nvCxnSpPr>
+        <p:spPr>
+          <a:xfrm>
+            <a:off x="6486476" y="1447523"/>
+            <a:ext cx="1614098" cy="0"/>
+          </a:xfrm>
+          <a:prstGeom prst="line">
+            <a:avLst/>
+          </a:prstGeom>
+          <a:ln w="9525">
+            <a:prstDash val="sysDash"/>
+          </a:ln>
+        </p:spPr>
+        <p:style>
+          <a:lnRef idx="1">
+            <a:schemeClr val="accent1"/>
+          </a:lnRef>
+          <a:fillRef idx="0">
+            <a:schemeClr val="accent1"/>
+          </a:fillRef>
+          <a:effectRef idx="0">
+            <a:schemeClr val="accent1"/>
+          </a:effectRef>
+          <a:fontRef idx="minor">
+            <a:schemeClr val="tx1"/>
+          </a:fontRef>
+        </p:style>
+      </p:cxnSp>
+      <p:cxnSp>
+        <p:nvCxnSpPr>
+          <p:cNvPr id="25" name="Straight Connector 24">
+            <a:extLst>
+              <a:ext uri="{FF2B5EF4-FFF2-40B4-BE49-F238E27FC236}">
+                <a16:creationId xmlns:a16="http://schemas.microsoft.com/office/drawing/2014/main" id="{8E55D030-39CA-4A12-8DE5-24E489EFC733}"/>
+              </a:ext>
+            </a:extLst>
+          </p:cNvPr>
+          <p:cNvCxnSpPr/>
+          <p:nvPr/>
+        </p:nvCxnSpPr>
+        <p:spPr>
+          <a:xfrm>
+            <a:off x="6493019" y="5408981"/>
+            <a:ext cx="1614098" cy="0"/>
+          </a:xfrm>
+          <a:prstGeom prst="line">
+            <a:avLst/>
+          </a:prstGeom>
+          <a:ln w="9525">
+            <a:prstDash val="sysDash"/>
+          </a:ln>
+        </p:spPr>
+        <p:style>
+          <a:lnRef idx="1">
+            <a:schemeClr val="accent1"/>
+          </a:lnRef>
+          <a:fillRef idx="0">
+            <a:schemeClr val="accent1"/>
+          </a:fillRef>
+          <a:effectRef idx="0">
+            <a:schemeClr val="accent1"/>
+          </a:effectRef>
+          <a:fontRef idx="minor">
+            <a:schemeClr val="tx1"/>
+          </a:fontRef>
+        </p:style>
+      </p:cxnSp>
+      <p:sp>
+        <p:nvSpPr>
+          <p:cNvPr id="26" name="TextBox 25">
+            <a:extLst>
+              <a:ext uri="{FF2B5EF4-FFF2-40B4-BE49-F238E27FC236}">
+                <a16:creationId xmlns:a16="http://schemas.microsoft.com/office/drawing/2014/main" id="{DB3289FC-6569-4E7C-BBAB-78C5FED68ABC}"/>
+              </a:ext>
+            </a:extLst>
+          </p:cNvPr>
+          <p:cNvSpPr txBox="1"/>
+          <p:nvPr/>
+        </p:nvSpPr>
+        <p:spPr>
+          <a:xfrm>
+            <a:off x="8257649" y="1275406"/>
+            <a:ext cx="864339" cy="276999"/>
+          </a:xfrm>
+          <a:prstGeom prst="rect">
+            <a:avLst/>
+          </a:prstGeom>
+          <a:noFill/>
+        </p:spPr>
+        <p:txBody>
+          <a:bodyPr wrap="none" rtlCol="0">
+            <a:spAutoFit/>
+          </a:bodyPr>
+          <a:lstStyle/>
+          <a:p>
+            <a:r>
+              <a:rPr lang="en-US" sz="1200" dirty="0" err="1">
+                <a:latin typeface="Consolas" panose="020B0609020204030204" pitchFamily="49" charset="0"/>
+              </a:rPr>
+              <a:t>paddle_y</a:t>
+            </a:r>
+            <a:endParaRPr lang="en-US" sz="1200" dirty="0">
+              <a:latin typeface="Consolas" panose="020B0609020204030204" pitchFamily="49" charset="0"/>
+            </a:endParaRPr>
+          </a:p>
+        </p:txBody>
+      </p:sp>
+      <p:sp>
+        <p:nvSpPr>
+          <p:cNvPr id="27" name="TextBox 26">
+            <a:extLst>
+              <a:ext uri="{FF2B5EF4-FFF2-40B4-BE49-F238E27FC236}">
+                <a16:creationId xmlns:a16="http://schemas.microsoft.com/office/drawing/2014/main" id="{58499B29-656B-4D2E-A0C5-1784D27D7B05}"/>
+              </a:ext>
+            </a:extLst>
+          </p:cNvPr>
+          <p:cNvSpPr txBox="1"/>
+          <p:nvPr/>
+        </p:nvSpPr>
+        <p:spPr>
+          <a:xfrm>
+            <a:off x="8176948" y="5227099"/>
+            <a:ext cx="1798890" cy="276999"/>
+          </a:xfrm>
+          <a:prstGeom prst="rect">
+            <a:avLst/>
+          </a:prstGeom>
+          <a:noFill/>
+        </p:spPr>
+        <p:txBody>
+          <a:bodyPr wrap="none" rtlCol="0">
+            <a:spAutoFit/>
+          </a:bodyPr>
+          <a:lstStyle/>
+          <a:p>
+            <a:r>
+              <a:rPr lang="en-US" sz="1200" dirty="0" err="1">
+                <a:latin typeface="Consolas" panose="020B0609020204030204" pitchFamily="49" charset="0"/>
+              </a:rPr>
+              <a:t>paddle_y</a:t>
+            </a:r>
+            <a:r>
+              <a:rPr lang="en-US" sz="1200" dirty="0">
+                <a:latin typeface="Consolas" panose="020B0609020204030204" pitchFamily="49" charset="0"/>
+              </a:rPr>
+              <a:t> + </a:t>
+            </a:r>
+            <a:r>
+              <a:rPr lang="en-US" sz="1200" dirty="0" err="1">
+                <a:latin typeface="Consolas" panose="020B0609020204030204" pitchFamily="49" charset="0"/>
+              </a:rPr>
+              <a:t>paddle_h</a:t>
+            </a:r>
+            <a:endParaRPr lang="en-US" sz="1200" dirty="0">
+              <a:latin typeface="Consolas" panose="020B0609020204030204" pitchFamily="49" charset="0"/>
+            </a:endParaRPr>
+          </a:p>
+        </p:txBody>
+      </p:sp>
+      <p:sp>
+        <p:nvSpPr>
+          <p:cNvPr id="28" name="Rectangle 27">
+            <a:extLst>
+              <a:ext uri="{FF2B5EF4-FFF2-40B4-BE49-F238E27FC236}">
+                <a16:creationId xmlns:a16="http://schemas.microsoft.com/office/drawing/2014/main" id="{79462848-6B3E-494A-BB88-CBA4BC05322C}"/>
+              </a:ext>
+            </a:extLst>
+          </p:cNvPr>
+          <p:cNvSpPr/>
+          <p:nvPr/>
+        </p:nvSpPr>
+        <p:spPr>
+          <a:xfrm>
+            <a:off x="6412019" y="2445880"/>
+            <a:ext cx="1477401" cy="1486601"/>
+          </a:xfrm>
+          <a:prstGeom prst="rect">
+            <a:avLst/>
+          </a:prstGeom>
+          <a:noFill/>
+          <a:ln w="3175"/>
+        </p:spPr>
+        <p:style>
+          <a:lnRef idx="2">
+            <a:schemeClr val="accent1">
+              <a:shade val="50000"/>
+            </a:schemeClr>
+          </a:lnRef>
+          <a:fillRef idx="1">
+            <a:schemeClr val="accent1"/>
+          </a:fillRef>
+          <a:effectRef idx="0">
+            <a:schemeClr val="accent1"/>
+          </a:effectRef>
+          <a:fontRef idx="minor">
+            <a:schemeClr val="lt1"/>
+          </a:fontRef>
+        </p:style>
+        <p:txBody>
+          <a:bodyPr rtlCol="0" anchor="ctr"/>
+          <a:lstStyle/>
+          <a:p>
+            <a:pPr algn="ctr"/>
+            <a:endParaRPr lang="en-US"/>
+          </a:p>
+        </p:txBody>
+      </p:sp>
+      <p:sp>
+        <p:nvSpPr>
+          <p:cNvPr id="29" name="TextBox 28">
+            <a:extLst>
+              <a:ext uri="{FF2B5EF4-FFF2-40B4-BE49-F238E27FC236}">
+                <a16:creationId xmlns:a16="http://schemas.microsoft.com/office/drawing/2014/main" id="{F96C460E-AB99-4136-BD51-BCC7B35A07D1}"/>
+              </a:ext>
+            </a:extLst>
+          </p:cNvPr>
+          <p:cNvSpPr txBox="1"/>
+          <p:nvPr/>
+        </p:nvSpPr>
+        <p:spPr>
+          <a:xfrm>
+            <a:off x="7495183" y="2008691"/>
+            <a:ext cx="1883849" cy="276999"/>
+          </a:xfrm>
+          <a:prstGeom prst="rect">
+            <a:avLst/>
+          </a:prstGeom>
+          <a:noFill/>
+        </p:spPr>
+        <p:txBody>
+          <a:bodyPr wrap="none" rtlCol="0">
+            <a:spAutoFit/>
+          </a:bodyPr>
+          <a:lstStyle/>
+          <a:p>
+            <a:r>
+              <a:rPr lang="en-US" sz="1200" dirty="0">
+                <a:latin typeface="Consolas" panose="020B0609020204030204" pitchFamily="49" charset="0"/>
+              </a:rPr>
+              <a:t>(</a:t>
+            </a:r>
+            <a:r>
+              <a:rPr lang="en-US" sz="1200" dirty="0" err="1">
+                <a:latin typeface="Consolas" panose="020B0609020204030204" pitchFamily="49" charset="0"/>
+              </a:rPr>
+              <a:t>paddle_x</a:t>
+            </a:r>
+            <a:r>
+              <a:rPr lang="en-US" sz="1200" dirty="0">
+                <a:latin typeface="Consolas" panose="020B0609020204030204" pitchFamily="49" charset="0"/>
+              </a:rPr>
+              <a:t>, </a:t>
+            </a:r>
+            <a:r>
+              <a:rPr lang="en-US" sz="1200" dirty="0" err="1">
+                <a:latin typeface="Consolas" panose="020B0609020204030204" pitchFamily="49" charset="0"/>
+              </a:rPr>
+              <a:t>paddle_y</a:t>
+            </a:r>
+            <a:r>
+              <a:rPr lang="en-US" sz="1200" dirty="0">
+                <a:latin typeface="Consolas" panose="020B0609020204030204" pitchFamily="49" charset="0"/>
+              </a:rPr>
+              <a:t>)</a:t>
+            </a:r>
+          </a:p>
+        </p:txBody>
+      </p:sp>
+      <p:sp>
+        <p:nvSpPr>
+          <p:cNvPr id="30" name="Freeform: Shape 29">
+            <a:extLst>
+              <a:ext uri="{FF2B5EF4-FFF2-40B4-BE49-F238E27FC236}">
+                <a16:creationId xmlns:a16="http://schemas.microsoft.com/office/drawing/2014/main" id="{F681CD50-4851-4745-A9E8-9A4AD2C90E48}"/>
+              </a:ext>
+            </a:extLst>
+          </p:cNvPr>
+          <p:cNvSpPr/>
+          <p:nvPr/>
+        </p:nvSpPr>
+        <p:spPr>
+          <a:xfrm>
+            <a:off x="6050455" y="2154154"/>
+            <a:ext cx="1469533" cy="298534"/>
+          </a:xfrm>
+          <a:custGeom>
+            <a:avLst/>
+            <a:gdLst>
+              <a:gd name="connsiteX0" fmla="*/ 1469533 w 1469533"/>
+              <a:gd name="connsiteY0" fmla="*/ 36596 h 298534"/>
+              <a:gd name="connsiteX1" fmla="*/ 40783 w 1469533"/>
+              <a:gd name="connsiteY1" fmla="*/ 22309 h 298534"/>
+              <a:gd name="connsiteX2" fmla="*/ 359870 w 1469533"/>
+              <a:gd name="connsiteY2" fmla="*/ 298534 h 298534"/>
+              <a:gd name="connsiteX3" fmla="*/ 359870 w 1469533"/>
+              <a:gd name="connsiteY3" fmla="*/ 298534 h 298534"/>
+            </a:gdLst>
+            <a:ahLst/>
+            <a:cxnLst>
+              <a:cxn ang="0">
+                <a:pos x="connsiteX0" y="connsiteY0"/>
+              </a:cxn>
+              <a:cxn ang="0">
+                <a:pos x="connsiteX1" y="connsiteY1"/>
+              </a:cxn>
+              <a:cxn ang="0">
+                <a:pos x="connsiteX2" y="connsiteY2"/>
+              </a:cxn>
+              <a:cxn ang="0">
+                <a:pos x="connsiteX3" y="connsiteY3"/>
+              </a:cxn>
+            </a:cxnLst>
+            <a:rect l="l" t="t" r="r" b="b"/>
+            <a:pathLst>
+              <a:path w="1469533" h="298534">
+                <a:moveTo>
+                  <a:pt x="1469533" y="36596"/>
+                </a:moveTo>
+                <a:cubicBezTo>
+                  <a:pt x="847630" y="7624"/>
+                  <a:pt x="225727" y="-21347"/>
+                  <a:pt x="40783" y="22309"/>
+                </a:cubicBezTo>
+                <a:cubicBezTo>
+                  <a:pt x="-144161" y="65965"/>
+                  <a:pt x="359870" y="298534"/>
+                  <a:pt x="359870" y="298534"/>
+                </a:cubicBezTo>
+                <a:lnTo>
+                  <a:pt x="359870" y="298534"/>
+                </a:lnTo>
+              </a:path>
+            </a:pathLst>
+          </a:custGeom>
+          <a:ln w="9525" cap="flat" cmpd="sng" algn="ctr">
+            <a:solidFill>
+              <a:schemeClr val="dk1"/>
+            </a:solidFill>
+            <a:prstDash val="solid"/>
+            <a:round/>
+            <a:headEnd type="none" w="med" len="med"/>
+            <a:tailEnd type="arrow" w="med" len="med"/>
+          </a:ln>
+        </p:spPr>
+        <p:style>
+          <a:lnRef idx="0">
+            <a:scrgbClr r="0" g="0" b="0"/>
+          </a:lnRef>
+          <a:fillRef idx="0">
+            <a:scrgbClr r="0" g="0" b="0"/>
+          </a:fillRef>
+          <a:effectRef idx="0">
+            <a:scrgbClr r="0" g="0" b="0"/>
+          </a:effectRef>
+          <a:fontRef idx="minor">
+            <a:schemeClr val="tx1"/>
+          </a:fontRef>
+        </p:style>
+        <p:txBody>
+          <a:bodyPr rtlCol="0" anchor="ctr"/>
+          <a:lstStyle/>
+          <a:p>
+            <a:pPr algn="ctr"/>
+            <a:endParaRPr lang="en-US"/>
+          </a:p>
+        </p:txBody>
+      </p:sp>
+      <p:sp>
+        <p:nvSpPr>
+          <p:cNvPr id="31" name="TextBox 30">
+            <a:extLst>
+              <a:ext uri="{FF2B5EF4-FFF2-40B4-BE49-F238E27FC236}">
+                <a16:creationId xmlns:a16="http://schemas.microsoft.com/office/drawing/2014/main" id="{414245F2-504A-4A00-89A1-2A8AF61958B1}"/>
+              </a:ext>
+            </a:extLst>
+          </p:cNvPr>
+          <p:cNvSpPr txBox="1"/>
+          <p:nvPr/>
+        </p:nvSpPr>
+        <p:spPr>
+          <a:xfrm>
+            <a:off x="6717735" y="3932481"/>
+            <a:ext cx="694421" cy="276999"/>
+          </a:xfrm>
+          <a:prstGeom prst="rect">
+            <a:avLst/>
+          </a:prstGeom>
+          <a:noFill/>
+        </p:spPr>
+        <p:txBody>
+          <a:bodyPr wrap="none" rtlCol="0">
+            <a:spAutoFit/>
+          </a:bodyPr>
+          <a:lstStyle/>
+          <a:p>
+            <a:r>
+              <a:rPr lang="en-US" sz="1200" dirty="0" err="1">
+                <a:latin typeface="Consolas" panose="020B0609020204030204" pitchFamily="49" charset="0"/>
+              </a:rPr>
+              <a:t>ball_w</a:t>
+            </a:r>
+            <a:endParaRPr lang="en-US" sz="1200" dirty="0">
+              <a:latin typeface="Consolas" panose="020B0609020204030204" pitchFamily="49" charset="0"/>
+            </a:endParaRPr>
+          </a:p>
+        </p:txBody>
+      </p:sp>
+      <p:sp>
+        <p:nvSpPr>
+          <p:cNvPr id="32" name="TextBox 31">
+            <a:extLst>
+              <a:ext uri="{FF2B5EF4-FFF2-40B4-BE49-F238E27FC236}">
+                <a16:creationId xmlns:a16="http://schemas.microsoft.com/office/drawing/2014/main" id="{1C0A43A6-1AE8-4F34-8928-C4034BF9BF68}"/>
+              </a:ext>
+            </a:extLst>
+          </p:cNvPr>
+          <p:cNvSpPr txBox="1"/>
+          <p:nvPr/>
+        </p:nvSpPr>
+        <p:spPr>
+          <a:xfrm rot="16200000">
+            <a:off x="7739250" y="3050680"/>
+            <a:ext cx="694421" cy="276999"/>
+          </a:xfrm>
+          <a:prstGeom prst="rect">
+            <a:avLst/>
+          </a:prstGeom>
+          <a:noFill/>
+        </p:spPr>
+        <p:txBody>
+          <a:bodyPr wrap="none" rtlCol="0">
+            <a:spAutoFit/>
+          </a:bodyPr>
+          <a:lstStyle/>
+          <a:p>
+            <a:r>
+              <a:rPr lang="en-US" sz="1200" dirty="0" err="1">
+                <a:latin typeface="Consolas" panose="020B0609020204030204" pitchFamily="49" charset="0"/>
+              </a:rPr>
+              <a:t>ball_h</a:t>
+            </a:r>
+            <a:endParaRPr lang="en-US" sz="1200" dirty="0">
+              <a:latin typeface="Consolas" panose="020B0609020204030204" pitchFamily="49" charset="0"/>
+            </a:endParaRPr>
+          </a:p>
+        </p:txBody>
+      </p:sp>
     </p:spTree>
     <p:extLst>
       <p:ext uri="{BB962C8B-B14F-4D97-AF65-F5344CB8AC3E}">

</xml_diff>

<commit_message>
add example of DNA sequence
</commit_message>
<xml_diff>
--- a/images/pygame_rect_window.pptx
+++ b/images/pygame_rect_window.pptx
@@ -5,7 +5,7 @@
     <p:sldMasterId id="2147483648" r:id="rId1"/>
   </p:sldMasterIdLst>
   <p:notesMasterIdLst>
-    <p:notesMasterId r:id="rId26"/>
+    <p:notesMasterId r:id="rId27"/>
   </p:notesMasterIdLst>
   <p:sldIdLst>
     <p:sldId id="257" r:id="rId2"/>
@@ -32,6 +32,7 @@
     <p:sldId id="280" r:id="rId23"/>
     <p:sldId id="281" r:id="rId24"/>
     <p:sldId id="282" r:id="rId25"/>
+    <p:sldId id="283" r:id="rId26"/>
   </p:sldIdLst>
   <p:sldSz cx="12192000" cy="6858000"/>
   <p:notesSz cx="6858000" cy="9144000"/>
@@ -224,7 +225,7 @@
           <a:p>
             <a:fld id="{A06AD928-664A-442C-B312-AFB4F7171F46}" type="datetimeFigureOut">
               <a:rPr lang="en-US" smtClean="0"/>
-              <a:t>8/5/2017</a:t>
+              <a:t>8/16/2017</a:t>
             </a:fld>
             <a:endParaRPr lang="en-US"/>
           </a:p>
@@ -620,7 +621,7 @@
           <a:p>
             <a:fld id="{856FFBE8-0159-4FDA-8D70-04C5D85E84A4}" type="datetimeFigureOut">
               <a:rPr lang="en-US" smtClean="0"/>
-              <a:t>8/5/2017</a:t>
+              <a:t>8/16/2017</a:t>
             </a:fld>
             <a:endParaRPr lang="en-US"/>
           </a:p>
@@ -788,7 +789,7 @@
           <a:p>
             <a:fld id="{856FFBE8-0159-4FDA-8D70-04C5D85E84A4}" type="datetimeFigureOut">
               <a:rPr lang="en-US" smtClean="0"/>
-              <a:t>8/5/2017</a:t>
+              <a:t>8/16/2017</a:t>
             </a:fld>
             <a:endParaRPr lang="en-US"/>
           </a:p>
@@ -966,7 +967,7 @@
           <a:p>
             <a:fld id="{856FFBE8-0159-4FDA-8D70-04C5D85E84A4}" type="datetimeFigureOut">
               <a:rPr lang="en-US" smtClean="0"/>
-              <a:t>8/5/2017</a:t>
+              <a:t>8/16/2017</a:t>
             </a:fld>
             <a:endParaRPr lang="en-US"/>
           </a:p>
@@ -1134,7 +1135,7 @@
           <a:p>
             <a:fld id="{856FFBE8-0159-4FDA-8D70-04C5D85E84A4}" type="datetimeFigureOut">
               <a:rPr lang="en-US" smtClean="0"/>
-              <a:t>8/5/2017</a:t>
+              <a:t>8/16/2017</a:t>
             </a:fld>
             <a:endParaRPr lang="en-US"/>
           </a:p>
@@ -1379,7 +1380,7 @@
           <a:p>
             <a:fld id="{856FFBE8-0159-4FDA-8D70-04C5D85E84A4}" type="datetimeFigureOut">
               <a:rPr lang="en-US" smtClean="0"/>
-              <a:t>8/5/2017</a:t>
+              <a:t>8/16/2017</a:t>
             </a:fld>
             <a:endParaRPr lang="en-US"/>
           </a:p>
@@ -1608,7 +1609,7 @@
           <a:p>
             <a:fld id="{856FFBE8-0159-4FDA-8D70-04C5D85E84A4}" type="datetimeFigureOut">
               <a:rPr lang="en-US" smtClean="0"/>
-              <a:t>8/5/2017</a:t>
+              <a:t>8/16/2017</a:t>
             </a:fld>
             <a:endParaRPr lang="en-US"/>
           </a:p>
@@ -1972,7 +1973,7 @@
           <a:p>
             <a:fld id="{856FFBE8-0159-4FDA-8D70-04C5D85E84A4}" type="datetimeFigureOut">
               <a:rPr lang="en-US" smtClean="0"/>
-              <a:t>8/5/2017</a:t>
+              <a:t>8/16/2017</a:t>
             </a:fld>
             <a:endParaRPr lang="en-US"/>
           </a:p>
@@ -2089,7 +2090,7 @@
           <a:p>
             <a:fld id="{856FFBE8-0159-4FDA-8D70-04C5D85E84A4}" type="datetimeFigureOut">
               <a:rPr lang="en-US" smtClean="0"/>
-              <a:t>8/5/2017</a:t>
+              <a:t>8/16/2017</a:t>
             </a:fld>
             <a:endParaRPr lang="en-US"/>
           </a:p>
@@ -2184,7 +2185,7 @@
           <a:p>
             <a:fld id="{856FFBE8-0159-4FDA-8D70-04C5D85E84A4}" type="datetimeFigureOut">
               <a:rPr lang="en-US" smtClean="0"/>
-              <a:t>8/5/2017</a:t>
+              <a:t>8/16/2017</a:t>
             </a:fld>
             <a:endParaRPr lang="en-US"/>
           </a:p>
@@ -2459,7 +2460,7 @@
           <a:p>
             <a:fld id="{856FFBE8-0159-4FDA-8D70-04C5D85E84A4}" type="datetimeFigureOut">
               <a:rPr lang="en-US" smtClean="0"/>
-              <a:t>8/5/2017</a:t>
+              <a:t>8/16/2017</a:t>
             </a:fld>
             <a:endParaRPr lang="en-US"/>
           </a:p>
@@ -2711,7 +2712,7 @@
           <a:p>
             <a:fld id="{856FFBE8-0159-4FDA-8D70-04C5D85E84A4}" type="datetimeFigureOut">
               <a:rPr lang="en-US" smtClean="0"/>
-              <a:t>8/5/2017</a:t>
+              <a:t>8/16/2017</a:t>
             </a:fld>
             <a:endParaRPr lang="en-US"/>
           </a:p>
@@ -2922,7 +2923,7 @@
           <a:p>
             <a:fld id="{856FFBE8-0159-4FDA-8D70-04C5D85E84A4}" type="datetimeFigureOut">
               <a:rPr lang="en-US" smtClean="0"/>
-              <a:t>8/5/2017</a:t>
+              <a:t>8/16/2017</a:t>
             </a:fld>
             <a:endParaRPr lang="en-US"/>
           </a:p>
@@ -15107,6 +15108,72 @@
 </p:sld>
 </file>
 
+<file path=ppt/slides/slide25.xml><?xml version="1.0" encoding="utf-8"?>
+<p:sld xmlns:a="http://schemas.openxmlformats.org/drawingml/2006/main" xmlns:r="http://schemas.openxmlformats.org/officeDocument/2006/relationships" xmlns:p="http://schemas.openxmlformats.org/presentationml/2006/main">
+  <p:cSld>
+    <p:spTree>
+      <p:nvGrpSpPr>
+        <p:cNvPr id="1" name=""/>
+        <p:cNvGrpSpPr/>
+        <p:nvPr/>
+      </p:nvGrpSpPr>
+      <p:grpSpPr>
+        <a:xfrm>
+          <a:off x="0" y="0"/>
+          <a:ext cx="0" cy="0"/>
+          <a:chOff x="0" y="0"/>
+          <a:chExt cx="0" cy="0"/>
+        </a:xfrm>
+      </p:grpSpPr>
+      <p:pic>
+        <p:nvPicPr>
+          <p:cNvPr id="5" name="Picture 4">
+            <a:extLst>
+              <a:ext uri="{FF2B5EF4-FFF2-40B4-BE49-F238E27FC236}">
+                <a16:creationId xmlns:a16="http://schemas.microsoft.com/office/drawing/2014/main" id="{18DE7879-2A45-4D6F-985C-08E886093E50}"/>
+              </a:ext>
+            </a:extLst>
+          </p:cNvPr>
+          <p:cNvPicPr>
+            <a:picLocks noChangeAspect="1"/>
+          </p:cNvPicPr>
+          <p:nvPr/>
+        </p:nvPicPr>
+        <p:blipFill>
+          <a:blip r:embed="rId2">
+            <a:extLst>
+              <a:ext uri="{28A0092B-C50C-407E-A947-70E740481C1C}">
+                <a14:useLocalDpi xmlns:a14="http://schemas.microsoft.com/office/drawing/2010/main" val="0"/>
+              </a:ext>
+            </a:extLst>
+          </a:blip>
+          <a:stretch>
+            <a:fillRect/>
+          </a:stretch>
+        </p:blipFill>
+        <p:spPr>
+          <a:xfrm>
+            <a:off x="4838452" y="1551709"/>
+            <a:ext cx="2079583" cy="4192440"/>
+          </a:xfrm>
+          <a:prstGeom prst="rect">
+            <a:avLst/>
+          </a:prstGeom>
+        </p:spPr>
+      </p:pic>
+    </p:spTree>
+    <p:extLst>
+      <p:ext uri="{BB962C8B-B14F-4D97-AF65-F5344CB8AC3E}">
+        <p14:creationId xmlns:p14="http://schemas.microsoft.com/office/powerpoint/2010/main" val="2505586535"/>
+      </p:ext>
+    </p:extLst>
+  </p:cSld>
+  <p:clrMapOvr>
+    <a:masterClrMapping/>
+  </p:clrMapOvr>
+</p:sld>
+</file>
+
 <file path=ppt/slides/slide3.xml><?xml version="1.0" encoding="utf-8"?>
 <p:sld xmlns:a="http://schemas.openxmlformats.org/drawingml/2006/main" xmlns:r="http://schemas.openxmlformats.org/officeDocument/2006/relationships" xmlns:p="http://schemas.openxmlformats.org/presentationml/2006/main">
   <p:cSld>

</xml_diff>

<commit_message>
new example of finding genes
</commit_message>
<xml_diff>
--- a/images/pygame_rect_window.pptx
+++ b/images/pygame_rect_window.pptx
@@ -5,7 +5,7 @@
     <p:sldMasterId id="2147483648" r:id="rId1"/>
   </p:sldMasterIdLst>
   <p:notesMasterIdLst>
-    <p:notesMasterId r:id="rId27"/>
+    <p:notesMasterId r:id="rId28"/>
   </p:notesMasterIdLst>
   <p:sldIdLst>
     <p:sldId id="257" r:id="rId2"/>
@@ -33,6 +33,7 @@
     <p:sldId id="281" r:id="rId24"/>
     <p:sldId id="282" r:id="rId25"/>
     <p:sldId id="283" r:id="rId26"/>
+    <p:sldId id="284" r:id="rId27"/>
   </p:sldIdLst>
   <p:sldSz cx="12192000" cy="6858000"/>
   <p:notesSz cx="6858000" cy="9144000"/>
@@ -139,10 +140,6 @@
 </p:presentation>
 </file>
 
-<file path=ppt/revisionInfo.xml><?xml version="1.0" encoding="utf-8"?>
-<p1510:revInfo xmlns:a="http://schemas.openxmlformats.org/drawingml/2006/main" xmlns:r="http://schemas.openxmlformats.org/officeDocument/2006/relationships" xmlns:p1510="http://schemas.microsoft.com/office/powerpoint/2015/10/main"/>
-</file>
-
 <file path=ppt/notesMasters/notesMaster1.xml><?xml version="1.0" encoding="utf-8"?>
 <p:notesMaster xmlns:a="http://schemas.openxmlformats.org/drawingml/2006/main" xmlns:r="http://schemas.openxmlformats.org/officeDocument/2006/relationships" xmlns:p="http://schemas.openxmlformats.org/presentationml/2006/main">
   <p:cSld>
@@ -225,7 +222,7 @@
           <a:p>
             <a:fld id="{A06AD928-664A-442C-B312-AFB4F7171F46}" type="datetimeFigureOut">
               <a:rPr lang="en-US" smtClean="0"/>
-              <a:t>8/16/2017</a:t>
+              <a:t>5/22/2018</a:t>
             </a:fld>
             <a:endParaRPr lang="en-US"/>
           </a:p>
@@ -621,7 +618,7 @@
           <a:p>
             <a:fld id="{856FFBE8-0159-4FDA-8D70-04C5D85E84A4}" type="datetimeFigureOut">
               <a:rPr lang="en-US" smtClean="0"/>
-              <a:t>8/16/2017</a:t>
+              <a:t>5/22/2018</a:t>
             </a:fld>
             <a:endParaRPr lang="en-US"/>
           </a:p>
@@ -789,7 +786,7 @@
           <a:p>
             <a:fld id="{856FFBE8-0159-4FDA-8D70-04C5D85E84A4}" type="datetimeFigureOut">
               <a:rPr lang="en-US" smtClean="0"/>
-              <a:t>8/16/2017</a:t>
+              <a:t>5/22/2018</a:t>
             </a:fld>
             <a:endParaRPr lang="en-US"/>
           </a:p>
@@ -967,7 +964,7 @@
           <a:p>
             <a:fld id="{856FFBE8-0159-4FDA-8D70-04C5D85E84A4}" type="datetimeFigureOut">
               <a:rPr lang="en-US" smtClean="0"/>
-              <a:t>8/16/2017</a:t>
+              <a:t>5/22/2018</a:t>
             </a:fld>
             <a:endParaRPr lang="en-US"/>
           </a:p>
@@ -1135,7 +1132,7 @@
           <a:p>
             <a:fld id="{856FFBE8-0159-4FDA-8D70-04C5D85E84A4}" type="datetimeFigureOut">
               <a:rPr lang="en-US" smtClean="0"/>
-              <a:t>8/16/2017</a:t>
+              <a:t>5/22/2018</a:t>
             </a:fld>
             <a:endParaRPr lang="en-US"/>
           </a:p>
@@ -1380,7 +1377,7 @@
           <a:p>
             <a:fld id="{856FFBE8-0159-4FDA-8D70-04C5D85E84A4}" type="datetimeFigureOut">
               <a:rPr lang="en-US" smtClean="0"/>
-              <a:t>8/16/2017</a:t>
+              <a:t>5/22/2018</a:t>
             </a:fld>
             <a:endParaRPr lang="en-US"/>
           </a:p>
@@ -1609,7 +1606,7 @@
           <a:p>
             <a:fld id="{856FFBE8-0159-4FDA-8D70-04C5D85E84A4}" type="datetimeFigureOut">
               <a:rPr lang="en-US" smtClean="0"/>
-              <a:t>8/16/2017</a:t>
+              <a:t>5/22/2018</a:t>
             </a:fld>
             <a:endParaRPr lang="en-US"/>
           </a:p>
@@ -1973,7 +1970,7 @@
           <a:p>
             <a:fld id="{856FFBE8-0159-4FDA-8D70-04C5D85E84A4}" type="datetimeFigureOut">
               <a:rPr lang="en-US" smtClean="0"/>
-              <a:t>8/16/2017</a:t>
+              <a:t>5/22/2018</a:t>
             </a:fld>
             <a:endParaRPr lang="en-US"/>
           </a:p>
@@ -2090,7 +2087,7 @@
           <a:p>
             <a:fld id="{856FFBE8-0159-4FDA-8D70-04C5D85E84A4}" type="datetimeFigureOut">
               <a:rPr lang="en-US" smtClean="0"/>
-              <a:t>8/16/2017</a:t>
+              <a:t>5/22/2018</a:t>
             </a:fld>
             <a:endParaRPr lang="en-US"/>
           </a:p>
@@ -2185,7 +2182,7 @@
           <a:p>
             <a:fld id="{856FFBE8-0159-4FDA-8D70-04C5D85E84A4}" type="datetimeFigureOut">
               <a:rPr lang="en-US" smtClean="0"/>
-              <a:t>8/16/2017</a:t>
+              <a:t>5/22/2018</a:t>
             </a:fld>
             <a:endParaRPr lang="en-US"/>
           </a:p>
@@ -2460,7 +2457,7 @@
           <a:p>
             <a:fld id="{856FFBE8-0159-4FDA-8D70-04C5D85E84A4}" type="datetimeFigureOut">
               <a:rPr lang="en-US" smtClean="0"/>
-              <a:t>8/16/2017</a:t>
+              <a:t>5/22/2018</a:t>
             </a:fld>
             <a:endParaRPr lang="en-US"/>
           </a:p>
@@ -2712,7 +2709,7 @@
           <a:p>
             <a:fld id="{856FFBE8-0159-4FDA-8D70-04C5D85E84A4}" type="datetimeFigureOut">
               <a:rPr lang="en-US" smtClean="0"/>
-              <a:t>8/16/2017</a:t>
+              <a:t>5/22/2018</a:t>
             </a:fld>
             <a:endParaRPr lang="en-US"/>
           </a:p>
@@ -2923,7 +2920,7 @@
           <a:p>
             <a:fld id="{856FFBE8-0159-4FDA-8D70-04C5D85E84A4}" type="datetimeFigureOut">
               <a:rPr lang="en-US" smtClean="0"/>
-              <a:t>8/16/2017</a:t>
+              <a:t>5/22/2018</a:t>
             </a:fld>
             <a:endParaRPr lang="en-US"/>
           </a:p>
@@ -15174,6 +15171,341 @@
 </p:sld>
 </file>
 
+<file path=ppt/slides/slide26.xml><?xml version="1.0" encoding="utf-8"?>
+<p:sld xmlns:a="http://schemas.openxmlformats.org/drawingml/2006/main" xmlns:r="http://schemas.openxmlformats.org/officeDocument/2006/relationships" xmlns:p="http://schemas.openxmlformats.org/presentationml/2006/main">
+  <p:cSld>
+    <p:spTree>
+      <p:nvGrpSpPr>
+        <p:cNvPr id="1" name=""/>
+        <p:cNvGrpSpPr/>
+        <p:nvPr/>
+      </p:nvGrpSpPr>
+      <p:grpSpPr>
+        <a:xfrm>
+          <a:off x="0" y="0"/>
+          <a:ext cx="0" cy="0"/>
+          <a:chOff x="0" y="0"/>
+          <a:chExt cx="0" cy="0"/>
+        </a:xfrm>
+      </p:grpSpPr>
+      <p:sp>
+        <p:nvSpPr>
+          <p:cNvPr id="2" name="Rectangle 1">
+            <a:extLst>
+              <a:ext uri="{FF2B5EF4-FFF2-40B4-BE49-F238E27FC236}">
+                <a16:creationId xmlns:a16="http://schemas.microsoft.com/office/drawing/2014/main" id="{C15213F0-4BE8-4FDB-B04F-07F64B28F7B5}"/>
+              </a:ext>
+            </a:extLst>
+          </p:cNvPr>
+          <p:cNvSpPr/>
+          <p:nvPr/>
+        </p:nvSpPr>
+        <p:spPr>
+          <a:xfrm>
+            <a:off x="559837" y="894481"/>
+            <a:ext cx="10347649" cy="307777"/>
+          </a:xfrm>
+          <a:prstGeom prst="rect">
+            <a:avLst/>
+          </a:prstGeom>
+        </p:spPr>
+        <p:txBody>
+          <a:bodyPr wrap="square">
+            <a:spAutoFit/>
+          </a:bodyPr>
+          <a:lstStyle/>
+          <a:p>
+            <a:r>
+              <a:rPr lang="en-US" sz="1400" b="1" dirty="0">
+                <a:latin typeface="Consolas" panose="020B0609020204030204" pitchFamily="49" charset="0"/>
+              </a:rPr>
+              <a:t>agcttttcattctgactgcaacgggcaat</a:t>
+            </a:r>
+            <a:r>
+              <a:rPr lang="en-US" sz="1400" b="1" dirty="0">
+                <a:highlight>
+                  <a:srgbClr val="FFFF00"/>
+                </a:highlight>
+                <a:latin typeface="Consolas" panose="020B0609020204030204" pitchFamily="49" charset="0"/>
+              </a:rPr>
+              <a:t>atg</a:t>
+            </a:r>
+            <a:r>
+              <a:rPr lang="en-US" sz="1400" b="1" dirty="0">
+                <a:highlight>
+                  <a:srgbClr val="00FF00"/>
+                </a:highlight>
+                <a:latin typeface="Consolas" panose="020B0609020204030204" pitchFamily="49" charset="0"/>
+              </a:rPr>
+              <a:t>tctctgtgtggattaaaaaaagagtgtctgatagcagcttctgaactggttacctgccgtgag</a:t>
+            </a:r>
+            <a:r>
+              <a:rPr lang="en-US" sz="1400" b="1" dirty="0">
+                <a:highlight>
+                  <a:srgbClr val="FFFF00"/>
+                </a:highlight>
+                <a:latin typeface="Consolas" panose="020B0609020204030204" pitchFamily="49" charset="0"/>
+              </a:rPr>
+              <a:t>taa</a:t>
+            </a:r>
+            <a:r>
+              <a:rPr lang="en-US" sz="1400" b="1" dirty="0">
+                <a:latin typeface="Consolas" panose="020B0609020204030204" pitchFamily="49" charset="0"/>
+              </a:rPr>
+              <a:t>at</a:t>
+            </a:r>
+          </a:p>
+        </p:txBody>
+      </p:sp>
+      <p:sp>
+        <p:nvSpPr>
+          <p:cNvPr id="3" name="TextBox 2">
+            <a:extLst>
+              <a:ext uri="{FF2B5EF4-FFF2-40B4-BE49-F238E27FC236}">
+                <a16:creationId xmlns:a16="http://schemas.microsoft.com/office/drawing/2014/main" id="{42920D39-D977-497A-8645-A471A272B5B8}"/>
+              </a:ext>
+            </a:extLst>
+          </p:cNvPr>
+          <p:cNvSpPr txBox="1"/>
+          <p:nvPr/>
+        </p:nvSpPr>
+        <p:spPr>
+          <a:xfrm>
+            <a:off x="2982433" y="1648047"/>
+            <a:ext cx="681597" cy="307777"/>
+          </a:xfrm>
+          <a:prstGeom prst="rect">
+            <a:avLst/>
+          </a:prstGeom>
+          <a:noFill/>
+        </p:spPr>
+        <p:txBody>
+          <a:bodyPr wrap="none" rtlCol="0">
+            <a:spAutoFit/>
+          </a:bodyPr>
+          <a:lstStyle/>
+          <a:p>
+            <a:r>
+              <a:rPr lang="en-US" sz="1400" b="1" dirty="0">
+                <a:latin typeface="Consolas" panose="020B0609020204030204" pitchFamily="49" charset="0"/>
+              </a:rPr>
+              <a:t>start</a:t>
+            </a:r>
+          </a:p>
+        </p:txBody>
+      </p:sp>
+      <p:cxnSp>
+        <p:nvCxnSpPr>
+          <p:cNvPr id="6" name="Straight Arrow Connector 5">
+            <a:extLst>
+              <a:ext uri="{FF2B5EF4-FFF2-40B4-BE49-F238E27FC236}">
+                <a16:creationId xmlns:a16="http://schemas.microsoft.com/office/drawing/2014/main" id="{8E0A8973-1BC2-40EE-A20B-0A46EA0E01EC}"/>
+              </a:ext>
+            </a:extLst>
+          </p:cNvPr>
+          <p:cNvCxnSpPr>
+            <a:cxnSpLocks/>
+            <a:stCxn id="3" idx="0"/>
+          </p:cNvCxnSpPr>
+          <p:nvPr/>
+        </p:nvCxnSpPr>
+        <p:spPr>
+          <a:xfrm flipV="1">
+            <a:off x="3323232" y="1132369"/>
+            <a:ext cx="190828" cy="515678"/>
+          </a:xfrm>
+          <a:prstGeom prst="straightConnector1">
+            <a:avLst/>
+          </a:prstGeom>
+          <a:ln w="28575">
+            <a:tailEnd type="triangle"/>
+          </a:ln>
+        </p:spPr>
+        <p:style>
+          <a:lnRef idx="1">
+            <a:schemeClr val="accent1"/>
+          </a:lnRef>
+          <a:fillRef idx="0">
+            <a:schemeClr val="accent1"/>
+          </a:fillRef>
+          <a:effectRef idx="0">
+            <a:schemeClr val="accent1"/>
+          </a:effectRef>
+          <a:fontRef idx="minor">
+            <a:schemeClr val="tx1"/>
+          </a:fontRef>
+        </p:style>
+      </p:cxnSp>
+      <p:sp>
+        <p:nvSpPr>
+          <p:cNvPr id="8" name="TextBox 7">
+            <a:extLst>
+              <a:ext uri="{FF2B5EF4-FFF2-40B4-BE49-F238E27FC236}">
+                <a16:creationId xmlns:a16="http://schemas.microsoft.com/office/drawing/2014/main" id="{53DCA268-1B12-4520-800D-6A28F5882F2D}"/>
+              </a:ext>
+            </a:extLst>
+          </p:cNvPr>
+          <p:cNvSpPr txBox="1"/>
+          <p:nvPr/>
+        </p:nvSpPr>
+        <p:spPr>
+          <a:xfrm>
+            <a:off x="3664030" y="1648046"/>
+            <a:ext cx="880369" cy="307777"/>
+          </a:xfrm>
+          <a:prstGeom prst="rect">
+            <a:avLst/>
+          </a:prstGeom>
+          <a:noFill/>
+        </p:spPr>
+        <p:txBody>
+          <a:bodyPr wrap="none" rtlCol="0">
+            <a:spAutoFit/>
+          </a:bodyPr>
+          <a:lstStyle/>
+          <a:p>
+            <a:r>
+              <a:rPr lang="en-US" sz="1400" b="1" dirty="0">
+                <a:latin typeface="Consolas" panose="020B0609020204030204" pitchFamily="49" charset="0"/>
+              </a:rPr>
+              <a:t>start+3</a:t>
+            </a:r>
+          </a:p>
+        </p:txBody>
+      </p:sp>
+      <p:cxnSp>
+        <p:nvCxnSpPr>
+          <p:cNvPr id="9" name="Straight Arrow Connector 8">
+            <a:extLst>
+              <a:ext uri="{FF2B5EF4-FFF2-40B4-BE49-F238E27FC236}">
+                <a16:creationId xmlns:a16="http://schemas.microsoft.com/office/drawing/2014/main" id="{B72DFF9A-D434-4085-BD5A-9362E28B88F8}"/>
+              </a:ext>
+            </a:extLst>
+          </p:cNvPr>
+          <p:cNvCxnSpPr>
+            <a:cxnSpLocks/>
+            <a:stCxn id="8" idx="0"/>
+          </p:cNvCxnSpPr>
+          <p:nvPr/>
+        </p:nvCxnSpPr>
+        <p:spPr>
+          <a:xfrm flipH="1" flipV="1">
+            <a:off x="3854859" y="1132369"/>
+            <a:ext cx="249356" cy="515677"/>
+          </a:xfrm>
+          <a:prstGeom prst="straightConnector1">
+            <a:avLst/>
+          </a:prstGeom>
+          <a:ln w="28575">
+            <a:tailEnd type="triangle"/>
+          </a:ln>
+        </p:spPr>
+        <p:style>
+          <a:lnRef idx="1">
+            <a:schemeClr val="accent1"/>
+          </a:lnRef>
+          <a:fillRef idx="0">
+            <a:schemeClr val="accent1"/>
+          </a:fillRef>
+          <a:effectRef idx="0">
+            <a:schemeClr val="accent1"/>
+          </a:effectRef>
+          <a:fontRef idx="minor">
+            <a:schemeClr val="tx1"/>
+          </a:fontRef>
+        </p:style>
+      </p:cxnSp>
+      <p:sp>
+        <p:nvSpPr>
+          <p:cNvPr id="13" name="TextBox 12">
+            <a:extLst>
+              <a:ext uri="{FF2B5EF4-FFF2-40B4-BE49-F238E27FC236}">
+                <a16:creationId xmlns:a16="http://schemas.microsoft.com/office/drawing/2014/main" id="{4BE7664A-CD00-481B-A8EC-274E17971B3E}"/>
+              </a:ext>
+            </a:extLst>
+          </p:cNvPr>
+          <p:cNvSpPr txBox="1"/>
+          <p:nvPr/>
+        </p:nvSpPr>
+        <p:spPr>
+          <a:xfrm>
+            <a:off x="9640135" y="1648045"/>
+            <a:ext cx="482824" cy="307777"/>
+          </a:xfrm>
+          <a:prstGeom prst="rect">
+            <a:avLst/>
+          </a:prstGeom>
+          <a:noFill/>
+        </p:spPr>
+        <p:txBody>
+          <a:bodyPr wrap="none" rtlCol="0">
+            <a:spAutoFit/>
+          </a:bodyPr>
+          <a:lstStyle/>
+          <a:p>
+            <a:r>
+              <a:rPr lang="en-US" sz="1400" b="1" dirty="0">
+                <a:latin typeface="Consolas" panose="020B0609020204030204" pitchFamily="49" charset="0"/>
+              </a:rPr>
+              <a:t>end</a:t>
+            </a:r>
+          </a:p>
+        </p:txBody>
+      </p:sp>
+      <p:cxnSp>
+        <p:nvCxnSpPr>
+          <p:cNvPr id="14" name="Straight Arrow Connector 13">
+            <a:extLst>
+              <a:ext uri="{FF2B5EF4-FFF2-40B4-BE49-F238E27FC236}">
+                <a16:creationId xmlns:a16="http://schemas.microsoft.com/office/drawing/2014/main" id="{EC17A483-9EE0-4EC4-A19E-4EEB53C1A9CC}"/>
+              </a:ext>
+            </a:extLst>
+          </p:cNvPr>
+          <p:cNvCxnSpPr>
+            <a:cxnSpLocks/>
+          </p:cNvCxnSpPr>
+          <p:nvPr/>
+        </p:nvCxnSpPr>
+        <p:spPr>
+          <a:xfrm flipV="1">
+            <a:off x="9881547" y="1132369"/>
+            <a:ext cx="133310" cy="515677"/>
+          </a:xfrm>
+          <a:prstGeom prst="straightConnector1">
+            <a:avLst/>
+          </a:prstGeom>
+          <a:ln w="28575">
+            <a:tailEnd type="triangle"/>
+          </a:ln>
+        </p:spPr>
+        <p:style>
+          <a:lnRef idx="1">
+            <a:schemeClr val="accent1"/>
+          </a:lnRef>
+          <a:fillRef idx="0">
+            <a:schemeClr val="accent1"/>
+          </a:fillRef>
+          <a:effectRef idx="0">
+            <a:schemeClr val="accent1"/>
+          </a:effectRef>
+          <a:fontRef idx="minor">
+            <a:schemeClr val="tx1"/>
+          </a:fontRef>
+        </p:style>
+      </p:cxnSp>
+    </p:spTree>
+    <p:extLst>
+      <p:ext uri="{BB962C8B-B14F-4D97-AF65-F5344CB8AC3E}">
+        <p14:creationId xmlns:p14="http://schemas.microsoft.com/office/powerpoint/2010/main" val="288026643"/>
+      </p:ext>
+    </p:extLst>
+  </p:cSld>
+  <p:clrMapOvr>
+    <a:masterClrMapping/>
+  </p:clrMapOvr>
+</p:sld>
+</file>
+
 <file path=ppt/slides/slide3.xml><?xml version="1.0" encoding="utf-8"?>
 <p:sld xmlns:a="http://schemas.openxmlformats.org/drawingml/2006/main" xmlns:r="http://schemas.openxmlformats.org/officeDocument/2006/relationships" xmlns:p="http://schemas.openxmlformats.org/presentationml/2006/main">
   <p:cSld>

</xml_diff>

<commit_message>
finish up caesar cipher
</commit_message>
<xml_diff>
--- a/images/pygame_rect_window.pptx
+++ b/images/pygame_rect_window.pptx
@@ -5,7 +5,7 @@
     <p:sldMasterId id="2147483648" r:id="rId1"/>
   </p:sldMasterIdLst>
   <p:notesMasterIdLst>
-    <p:notesMasterId r:id="rId29"/>
+    <p:notesMasterId r:id="rId30"/>
   </p:notesMasterIdLst>
   <p:sldIdLst>
     <p:sldId id="257" r:id="rId2"/>
@@ -35,6 +35,7 @@
     <p:sldId id="283" r:id="rId26"/>
     <p:sldId id="284" r:id="rId27"/>
     <p:sldId id="285" r:id="rId28"/>
+    <p:sldId id="286" r:id="rId29"/>
   </p:sldIdLst>
   <p:sldSz cx="12192000" cy="6858000"/>
   <p:notesSz cx="6858000" cy="9144000"/>
@@ -223,7 +224,7 @@
           <a:p>
             <a:fld id="{A06AD928-664A-442C-B312-AFB4F7171F46}" type="datetimeFigureOut">
               <a:rPr lang="en-US" smtClean="0"/>
-              <a:t>5/25/2018</a:t>
+              <a:t>5/28/2018</a:t>
             </a:fld>
             <a:endParaRPr lang="en-US"/>
           </a:p>
@@ -619,7 +620,7 @@
           <a:p>
             <a:fld id="{856FFBE8-0159-4FDA-8D70-04C5D85E84A4}" type="datetimeFigureOut">
               <a:rPr lang="en-US" smtClean="0"/>
-              <a:t>5/25/2018</a:t>
+              <a:t>5/28/2018</a:t>
             </a:fld>
             <a:endParaRPr lang="en-US"/>
           </a:p>
@@ -787,7 +788,7 @@
           <a:p>
             <a:fld id="{856FFBE8-0159-4FDA-8D70-04C5D85E84A4}" type="datetimeFigureOut">
               <a:rPr lang="en-US" smtClean="0"/>
-              <a:t>5/25/2018</a:t>
+              <a:t>5/28/2018</a:t>
             </a:fld>
             <a:endParaRPr lang="en-US"/>
           </a:p>
@@ -965,7 +966,7 @@
           <a:p>
             <a:fld id="{856FFBE8-0159-4FDA-8D70-04C5D85E84A4}" type="datetimeFigureOut">
               <a:rPr lang="en-US" smtClean="0"/>
-              <a:t>5/25/2018</a:t>
+              <a:t>5/28/2018</a:t>
             </a:fld>
             <a:endParaRPr lang="en-US"/>
           </a:p>
@@ -1133,7 +1134,7 @@
           <a:p>
             <a:fld id="{856FFBE8-0159-4FDA-8D70-04C5D85E84A4}" type="datetimeFigureOut">
               <a:rPr lang="en-US" smtClean="0"/>
-              <a:t>5/25/2018</a:t>
+              <a:t>5/28/2018</a:t>
             </a:fld>
             <a:endParaRPr lang="en-US"/>
           </a:p>
@@ -1378,7 +1379,7 @@
           <a:p>
             <a:fld id="{856FFBE8-0159-4FDA-8D70-04C5D85E84A4}" type="datetimeFigureOut">
               <a:rPr lang="en-US" smtClean="0"/>
-              <a:t>5/25/2018</a:t>
+              <a:t>5/28/2018</a:t>
             </a:fld>
             <a:endParaRPr lang="en-US"/>
           </a:p>
@@ -1607,7 +1608,7 @@
           <a:p>
             <a:fld id="{856FFBE8-0159-4FDA-8D70-04C5D85E84A4}" type="datetimeFigureOut">
               <a:rPr lang="en-US" smtClean="0"/>
-              <a:t>5/25/2018</a:t>
+              <a:t>5/28/2018</a:t>
             </a:fld>
             <a:endParaRPr lang="en-US"/>
           </a:p>
@@ -1971,7 +1972,7 @@
           <a:p>
             <a:fld id="{856FFBE8-0159-4FDA-8D70-04C5D85E84A4}" type="datetimeFigureOut">
               <a:rPr lang="en-US" smtClean="0"/>
-              <a:t>5/25/2018</a:t>
+              <a:t>5/28/2018</a:t>
             </a:fld>
             <a:endParaRPr lang="en-US"/>
           </a:p>
@@ -2088,7 +2089,7 @@
           <a:p>
             <a:fld id="{856FFBE8-0159-4FDA-8D70-04C5D85E84A4}" type="datetimeFigureOut">
               <a:rPr lang="en-US" smtClean="0"/>
-              <a:t>5/25/2018</a:t>
+              <a:t>5/28/2018</a:t>
             </a:fld>
             <a:endParaRPr lang="en-US"/>
           </a:p>
@@ -2183,7 +2184,7 @@
           <a:p>
             <a:fld id="{856FFBE8-0159-4FDA-8D70-04C5D85E84A4}" type="datetimeFigureOut">
               <a:rPr lang="en-US" smtClean="0"/>
-              <a:t>5/25/2018</a:t>
+              <a:t>5/28/2018</a:t>
             </a:fld>
             <a:endParaRPr lang="en-US"/>
           </a:p>
@@ -2458,7 +2459,7 @@
           <a:p>
             <a:fld id="{856FFBE8-0159-4FDA-8D70-04C5D85E84A4}" type="datetimeFigureOut">
               <a:rPr lang="en-US" smtClean="0"/>
-              <a:t>5/25/2018</a:t>
+              <a:t>5/28/2018</a:t>
             </a:fld>
             <a:endParaRPr lang="en-US"/>
           </a:p>
@@ -2710,7 +2711,7 @@
           <a:p>
             <a:fld id="{856FFBE8-0159-4FDA-8D70-04C5D85E84A4}" type="datetimeFigureOut">
               <a:rPr lang="en-US" smtClean="0"/>
-              <a:t>5/25/2018</a:t>
+              <a:t>5/28/2018</a:t>
             </a:fld>
             <a:endParaRPr lang="en-US"/>
           </a:p>
@@ -2921,7 +2922,7 @@
           <a:p>
             <a:fld id="{856FFBE8-0159-4FDA-8D70-04C5D85E84A4}" type="datetimeFigureOut">
               <a:rPr lang="en-US" smtClean="0"/>
-              <a:t>5/25/2018</a:t>
+              <a:t>5/28/2018</a:t>
             </a:fld>
             <a:endParaRPr lang="en-US"/>
           </a:p>
@@ -13615,7 +13616,7 @@
                   <a14:useLocalDpi xmlns:a14="http://schemas.microsoft.com/office/drawing/2010/main" val="0"/>
                 </a:ext>
                 <a:ext uri="{96DAC541-7B7A-43D3-8B79-37D633B846F1}">
-                  <asvg:svgBlip xmlns:asvg="http://schemas.microsoft.com/office/drawing/2016/SVG/main" xmlns="" r:embed="rId3"/>
+                  <asvg:svgBlip xmlns:asvg="http://schemas.microsoft.com/office/drawing/2016/SVG/main" r:embed="rId3"/>
                 </a:ext>
               </a:extLst>
             </a:blip>
@@ -13654,7 +13655,7 @@
                   <a14:useLocalDpi xmlns:a14="http://schemas.microsoft.com/office/drawing/2010/main" val="0"/>
                 </a:ext>
                 <a:ext uri="{96DAC541-7B7A-43D3-8B79-37D633B846F1}">
-                  <asvg:svgBlip xmlns:asvg="http://schemas.microsoft.com/office/drawing/2016/SVG/main" xmlns="" r:embed="rId5"/>
+                  <asvg:svgBlip xmlns:asvg="http://schemas.microsoft.com/office/drawing/2016/SVG/main" r:embed="rId5"/>
                 </a:ext>
               </a:extLst>
             </a:blip>
@@ -13693,7 +13694,7 @@
                   <a14:useLocalDpi xmlns:a14="http://schemas.microsoft.com/office/drawing/2010/main" val="0"/>
                 </a:ext>
                 <a:ext uri="{96DAC541-7B7A-43D3-8B79-37D633B846F1}">
-                  <asvg:svgBlip xmlns:asvg="http://schemas.microsoft.com/office/drawing/2016/SVG/main" xmlns="" r:embed="rId7"/>
+                  <asvg:svgBlip xmlns:asvg="http://schemas.microsoft.com/office/drawing/2016/SVG/main" r:embed="rId7"/>
                 </a:ext>
               </a:extLst>
             </a:blip>
@@ -14183,7 +14184,7 @@
                   <a14:useLocalDpi xmlns:a14="http://schemas.microsoft.com/office/drawing/2010/main" val="0"/>
                 </a:ext>
                 <a:ext uri="{96DAC541-7B7A-43D3-8B79-37D633B846F1}">
-                  <asvg:svgBlip xmlns:asvg="http://schemas.microsoft.com/office/drawing/2016/SVG/main" xmlns="" r:embed="rId9"/>
+                  <asvg:svgBlip xmlns:asvg="http://schemas.microsoft.com/office/drawing/2016/SVG/main" r:embed="rId9"/>
                 </a:ext>
               </a:extLst>
             </a:blip>
@@ -15075,7 +15076,7 @@
                 <a14:useLocalDpi xmlns:a14="http://schemas.microsoft.com/office/drawing/2010/main" val="0"/>
               </a:ext>
               <a:ext uri="{96DAC541-7B7A-43D3-8B79-37D633B846F1}">
-                <asvg:svgBlip xmlns:asvg="http://schemas.microsoft.com/office/drawing/2016/SVG/main" xmlns="" r:embed="rId3"/>
+                <asvg:svgBlip xmlns:asvg="http://schemas.microsoft.com/office/drawing/2016/SVG/main" r:embed="rId3"/>
               </a:ext>
             </a:extLst>
           </a:blip>
@@ -15546,7 +15547,7 @@
         </p:blipFill>
         <p:spPr>
           <a:xfrm>
-            <a:off x="1518838" y="2706360"/>
+            <a:off x="1684747" y="2641151"/>
             <a:ext cx="576548" cy="928044"/>
           </a:xfrm>
           <a:prstGeom prst="rect">
@@ -15576,7 +15577,7 @@
         </p:blipFill>
         <p:spPr>
           <a:xfrm>
-            <a:off x="5712463" y="3287425"/>
+            <a:off x="5696888" y="3195091"/>
             <a:ext cx="576548" cy="928044"/>
           </a:xfrm>
           <a:prstGeom prst="rect">
@@ -15606,7 +15607,7 @@
         </p:blipFill>
         <p:spPr>
           <a:xfrm>
-            <a:off x="10205479" y="2706360"/>
+            <a:off x="9784814" y="2641151"/>
             <a:ext cx="576548" cy="928044"/>
           </a:xfrm>
           <a:prstGeom prst="rect">
@@ -15617,13 +15618,15 @@
       <p:cxnSp>
         <p:nvCxnSpPr>
           <p:cNvPr id="7" name="Straight Connector 6"/>
-          <p:cNvCxnSpPr/>
+          <p:cNvCxnSpPr>
+            <a:cxnSpLocks/>
+          </p:cNvCxnSpPr>
           <p:nvPr/>
         </p:nvCxnSpPr>
         <p:spPr>
-          <a:xfrm>
-            <a:off x="2416712" y="2946402"/>
-            <a:ext cx="922391" cy="12555"/>
+          <a:xfrm flipV="1">
+            <a:off x="2343067" y="2980884"/>
+            <a:ext cx="1678923" cy="6278"/>
           </a:xfrm>
           <a:prstGeom prst="line">
             <a:avLst/>
@@ -15661,7 +15664,7 @@
         </p:nvSpPr>
         <p:spPr>
           <a:xfrm>
-            <a:off x="1527409" y="3751447"/>
+            <a:off x="1684747" y="3701823"/>
             <a:ext cx="636713" cy="369332"/>
           </a:xfrm>
           <a:prstGeom prst="rect">
@@ -15676,10 +15679,9 @@
           <a:lstStyle/>
           <a:p>
             <a:r>
-              <a:rPr lang="en-US" dirty="0" smtClean="0"/>
+              <a:rPr lang="en-US" dirty="0"/>
               <a:t>Alice</a:t>
             </a:r>
-            <a:endParaRPr lang="en-US" dirty="0"/>
           </a:p>
         </p:txBody>
       </p:sp>
@@ -15691,7 +15693,7 @@
         </p:nvSpPr>
         <p:spPr>
           <a:xfrm>
-            <a:off x="3456967" y="2501757"/>
+            <a:off x="4035465" y="2501757"/>
             <a:ext cx="914400" cy="914400"/>
           </a:xfrm>
           <a:prstGeom prst="rect">
@@ -15720,10 +15722,9 @@
           <a:p>
             <a:pPr algn="ctr"/>
             <a:r>
-              <a:rPr lang="en-US" dirty="0" smtClean="0"/>
+              <a:rPr lang="en-US" dirty="0"/>
               <a:t>Encrypt</a:t>
             </a:r>
-            <a:endParaRPr lang="en-US" dirty="0"/>
           </a:p>
         </p:txBody>
       </p:sp>
@@ -15735,7 +15736,7 @@
         </p:nvSpPr>
         <p:spPr>
           <a:xfrm>
-            <a:off x="7988444" y="2514312"/>
+            <a:off x="6980735" y="2514312"/>
             <a:ext cx="1061483" cy="914400"/>
           </a:xfrm>
           <a:prstGeom prst="rect">
@@ -15764,23 +15765,24 @@
           <a:p>
             <a:pPr algn="ctr"/>
             <a:r>
-              <a:rPr lang="en-US" dirty="0" smtClean="0"/>
+              <a:rPr lang="en-US" dirty="0"/>
               <a:t>Decrypt</a:t>
             </a:r>
-            <a:endParaRPr lang="en-US" dirty="0"/>
           </a:p>
         </p:txBody>
       </p:sp>
       <p:cxnSp>
         <p:nvCxnSpPr>
           <p:cNvPr id="19" name="Straight Connector 18"/>
-          <p:cNvCxnSpPr/>
+          <p:cNvCxnSpPr>
+            <a:cxnSpLocks/>
+          </p:cNvCxnSpPr>
           <p:nvPr/>
         </p:nvCxnSpPr>
         <p:spPr>
           <a:xfrm>
-            <a:off x="9158231" y="2958957"/>
-            <a:ext cx="922391" cy="12555"/>
+            <a:off x="8042218" y="2980884"/>
+            <a:ext cx="1652288" cy="0"/>
           </a:xfrm>
           <a:prstGeom prst="line">
             <a:avLst/>
@@ -15813,13 +15815,15 @@
       <p:cxnSp>
         <p:nvCxnSpPr>
           <p:cNvPr id="20" name="Straight Connector 19"/>
-          <p:cNvCxnSpPr/>
+          <p:cNvCxnSpPr>
+            <a:cxnSpLocks/>
+          </p:cNvCxnSpPr>
           <p:nvPr/>
         </p:nvCxnSpPr>
         <p:spPr>
           <a:xfrm flipV="1">
-            <a:off x="4604528" y="2958957"/>
-            <a:ext cx="3275612" cy="21928"/>
+            <a:off x="5116426" y="2971513"/>
+            <a:ext cx="1747659" cy="9371"/>
           </a:xfrm>
           <a:prstGeom prst="line">
             <a:avLst/>
@@ -15857,7 +15861,7 @@
         </p:nvSpPr>
         <p:spPr>
           <a:xfrm>
-            <a:off x="10199043" y="3751447"/>
+            <a:off x="9813319" y="3701823"/>
             <a:ext cx="553357" cy="369332"/>
           </a:xfrm>
           <a:prstGeom prst="rect">
@@ -15872,10 +15876,9 @@
           <a:lstStyle/>
           <a:p>
             <a:r>
-              <a:rPr lang="en-US" dirty="0" smtClean="0"/>
+              <a:rPr lang="en-US" dirty="0"/>
               <a:t>Bob</a:t>
             </a:r>
-            <a:endParaRPr lang="en-US" dirty="0"/>
           </a:p>
         </p:txBody>
       </p:sp>
@@ -15887,8 +15890,8 @@
         </p:nvSpPr>
         <p:spPr>
           <a:xfrm>
-            <a:off x="2354805" y="2414161"/>
-            <a:ext cx="1028487" cy="369332"/>
+            <a:off x="2243298" y="2602180"/>
+            <a:ext cx="1778692" cy="369332"/>
           </a:xfrm>
           <a:prstGeom prst="rect">
             <a:avLst/>
@@ -15902,23 +15905,22 @@
           <a:lstStyle/>
           <a:p>
             <a:r>
-              <a:rPr lang="en-US" i="1" dirty="0" smtClean="0"/>
-              <a:t>“attack!”</a:t>
+              <a:rPr lang="en-US" i="1" dirty="0"/>
+              <a:t>“attack at dawn”</a:t>
             </a:r>
-            <a:endParaRPr lang="en-US" i="1" dirty="0"/>
           </a:p>
         </p:txBody>
       </p:sp>
       <p:sp>
         <p:nvSpPr>
-          <p:cNvPr id="25" name="TextBox 24"/>
+          <p:cNvPr id="26" name="TextBox 25"/>
           <p:cNvSpPr txBox="1"/>
           <p:nvPr/>
         </p:nvSpPr>
         <p:spPr>
           <a:xfrm>
-            <a:off x="9052135" y="2501757"/>
-            <a:ext cx="1028487" cy="369332"/>
+            <a:off x="4957350" y="2436355"/>
+            <a:ext cx="1843325" cy="369332"/>
           </a:xfrm>
           <a:prstGeom prst="rect">
             <a:avLst/>
@@ -15932,48 +15934,9 @@
           <a:lstStyle/>
           <a:p>
             <a:r>
-              <a:rPr lang="en-US" i="1" dirty="0" smtClean="0"/>
-              <a:t>“attack!”</a:t>
+              <a:rPr lang="en-US" i="1" dirty="0"/>
+              <a:t>“skfntuqwgrfbgx”</a:t>
             </a:r>
-            <a:endParaRPr lang="en-US" i="1" dirty="0"/>
-          </a:p>
-        </p:txBody>
-      </p:sp>
-      <p:sp>
-        <p:nvSpPr>
-          <p:cNvPr id="26" name="TextBox 25"/>
-          <p:cNvSpPr txBox="1"/>
-          <p:nvPr/>
-        </p:nvSpPr>
-        <p:spPr>
-          <a:xfrm>
-            <a:off x="4957350" y="2436355"/>
-            <a:ext cx="2238883" cy="369332"/>
-          </a:xfrm>
-          <a:prstGeom prst="rect">
-            <a:avLst/>
-          </a:prstGeom>
-          <a:noFill/>
-        </p:spPr>
-        <p:txBody>
-          <a:bodyPr wrap="none" rtlCol="0">
-            <a:spAutoFit/>
-          </a:bodyPr>
-          <a:lstStyle/>
-          <a:p>
-            <a:r>
-              <a:rPr lang="en-US" i="1" dirty="0" smtClean="0"/>
-              <a:t>“</a:t>
-            </a:r>
-            <a:r>
-              <a:rPr lang="en-US" i="1" dirty="0" err="1" smtClean="0"/>
-              <a:t>skfntuqwgrfbgxpwp</a:t>
-            </a:r>
-            <a:r>
-              <a:rPr lang="en-US" i="1" dirty="0" smtClean="0"/>
-              <a:t>”</a:t>
-            </a:r>
-            <a:endParaRPr lang="en-US" i="1" dirty="0"/>
           </a:p>
         </p:txBody>
       </p:sp>
@@ -15985,7 +15948,7 @@
         </p:nvSpPr>
         <p:spPr>
           <a:xfrm>
-            <a:off x="5733477" y="4337343"/>
+            <a:off x="5730733" y="4152676"/>
             <a:ext cx="508857" cy="369332"/>
           </a:xfrm>
           <a:prstGeom prst="rect">
@@ -16000,10 +15963,208 @@
           <a:lstStyle/>
           <a:p>
             <a:r>
-              <a:rPr lang="en-US" dirty="0" smtClean="0"/>
+              <a:rPr lang="en-US" dirty="0"/>
               <a:t>Eve</a:t>
             </a:r>
-            <a:endParaRPr lang="en-US" dirty="0"/>
+          </a:p>
+        </p:txBody>
+      </p:sp>
+      <p:sp>
+        <p:nvSpPr>
+          <p:cNvPr id="16" name="TextBox 15">
+            <a:extLst>
+              <a:ext uri="{FF2B5EF4-FFF2-40B4-BE49-F238E27FC236}">
+                <a16:creationId xmlns:a16="http://schemas.microsoft.com/office/drawing/2014/main" id="{2550A700-4ABE-47E2-92C8-A055F75320D4}"/>
+              </a:ext>
+            </a:extLst>
+          </p:cNvPr>
+          <p:cNvSpPr txBox="1"/>
+          <p:nvPr/>
+        </p:nvSpPr>
+        <p:spPr>
+          <a:xfrm>
+            <a:off x="8034627" y="2591448"/>
+            <a:ext cx="1778692" cy="369332"/>
+          </a:xfrm>
+          <a:prstGeom prst="rect">
+            <a:avLst/>
+          </a:prstGeom>
+          <a:noFill/>
+        </p:spPr>
+        <p:txBody>
+          <a:bodyPr wrap="none" rtlCol="0">
+            <a:spAutoFit/>
+          </a:bodyPr>
+          <a:lstStyle/>
+          <a:p>
+            <a:r>
+              <a:rPr lang="en-US" i="1" dirty="0"/>
+              <a:t>“attack at dawn”</a:t>
+            </a:r>
+          </a:p>
+        </p:txBody>
+      </p:sp>
+      <p:cxnSp>
+        <p:nvCxnSpPr>
+          <p:cNvPr id="21" name="Connector: Elbow 20">
+            <a:extLst>
+              <a:ext uri="{FF2B5EF4-FFF2-40B4-BE49-F238E27FC236}">
+                <a16:creationId xmlns:a16="http://schemas.microsoft.com/office/drawing/2014/main" id="{54FA5074-82B5-4F66-A673-2E2C7BD4D50B}"/>
+              </a:ext>
+            </a:extLst>
+          </p:cNvPr>
+          <p:cNvCxnSpPr>
+            <a:cxnSpLocks/>
+          </p:cNvCxnSpPr>
+          <p:nvPr/>
+        </p:nvCxnSpPr>
+        <p:spPr>
+          <a:xfrm flipV="1">
+            <a:off x="3288442" y="3195091"/>
+            <a:ext cx="733548" cy="464022"/>
+          </a:xfrm>
+          <a:prstGeom prst="bentConnector3">
+            <a:avLst/>
+          </a:prstGeom>
+          <a:ln w="19050" cap="flat" cmpd="sng" algn="ctr">
+            <a:solidFill>
+              <a:schemeClr val="dk1"/>
+            </a:solidFill>
+            <a:prstDash val="sysDot"/>
+            <a:round/>
+            <a:headEnd type="none" w="med" len="med"/>
+            <a:tailEnd type="arrow" w="med" len="med"/>
+          </a:ln>
+        </p:spPr>
+        <p:style>
+          <a:lnRef idx="0">
+            <a:scrgbClr r="0" g="0" b="0"/>
+          </a:lnRef>
+          <a:fillRef idx="0">
+            <a:scrgbClr r="0" g="0" b="0"/>
+          </a:fillRef>
+          <a:effectRef idx="0">
+            <a:scrgbClr r="0" g="0" b="0"/>
+          </a:effectRef>
+          <a:fontRef idx="minor">
+            <a:schemeClr val="tx1"/>
+          </a:fontRef>
+        </p:style>
+      </p:cxnSp>
+      <p:sp>
+        <p:nvSpPr>
+          <p:cNvPr id="30" name="TextBox 29">
+            <a:extLst>
+              <a:ext uri="{FF2B5EF4-FFF2-40B4-BE49-F238E27FC236}">
+                <a16:creationId xmlns:a16="http://schemas.microsoft.com/office/drawing/2014/main" id="{743747AF-3A87-4BD5-8095-84F270DAA112}"/>
+              </a:ext>
+            </a:extLst>
+          </p:cNvPr>
+          <p:cNvSpPr txBox="1"/>
+          <p:nvPr/>
+        </p:nvSpPr>
+        <p:spPr>
+          <a:xfrm>
+            <a:off x="2809053" y="3474447"/>
+            <a:ext cx="518860" cy="369332"/>
+          </a:xfrm>
+          <a:prstGeom prst="rect">
+            <a:avLst/>
+          </a:prstGeom>
+          <a:noFill/>
+        </p:spPr>
+        <p:txBody>
+          <a:bodyPr wrap="none" rtlCol="0">
+            <a:spAutoFit/>
+          </a:bodyPr>
+          <a:lstStyle/>
+          <a:p>
+            <a:r>
+              <a:rPr lang="en-US" dirty="0"/>
+              <a:t>Key</a:t>
+            </a:r>
+          </a:p>
+        </p:txBody>
+      </p:sp>
+      <p:cxnSp>
+        <p:nvCxnSpPr>
+          <p:cNvPr id="31" name="Connector: Elbow 30">
+            <a:extLst>
+              <a:ext uri="{FF2B5EF4-FFF2-40B4-BE49-F238E27FC236}">
+                <a16:creationId xmlns:a16="http://schemas.microsoft.com/office/drawing/2014/main" id="{BAA8C408-CB85-4C1E-A612-BCE9CA68F262}"/>
+              </a:ext>
+            </a:extLst>
+          </p:cNvPr>
+          <p:cNvCxnSpPr>
+            <a:cxnSpLocks/>
+          </p:cNvCxnSpPr>
+          <p:nvPr/>
+        </p:nvCxnSpPr>
+        <p:spPr>
+          <a:xfrm rot="10800000">
+            <a:off x="8016033" y="3195091"/>
+            <a:ext cx="733485" cy="648688"/>
+          </a:xfrm>
+          <a:prstGeom prst="bentConnector3">
+            <a:avLst/>
+          </a:prstGeom>
+          <a:ln w="19050" cap="flat" cmpd="sng" algn="ctr">
+            <a:solidFill>
+              <a:schemeClr val="dk1"/>
+            </a:solidFill>
+            <a:prstDash val="sysDot"/>
+            <a:round/>
+            <a:headEnd type="none" w="med" len="med"/>
+            <a:tailEnd type="arrow" w="med" len="med"/>
+          </a:ln>
+        </p:spPr>
+        <p:style>
+          <a:lnRef idx="0">
+            <a:scrgbClr r="0" g="0" b="0"/>
+          </a:lnRef>
+          <a:fillRef idx="0">
+            <a:scrgbClr r="0" g="0" b="0"/>
+          </a:fillRef>
+          <a:effectRef idx="0">
+            <a:scrgbClr r="0" g="0" b="0"/>
+          </a:effectRef>
+          <a:fontRef idx="minor">
+            <a:schemeClr val="tx1"/>
+          </a:fontRef>
+        </p:style>
+      </p:cxnSp>
+      <p:sp>
+        <p:nvSpPr>
+          <p:cNvPr id="32" name="TextBox 31">
+            <a:extLst>
+              <a:ext uri="{FF2B5EF4-FFF2-40B4-BE49-F238E27FC236}">
+                <a16:creationId xmlns:a16="http://schemas.microsoft.com/office/drawing/2014/main" id="{D799377B-C11B-4BBC-ABE4-A5A2F6DD34B1}"/>
+              </a:ext>
+            </a:extLst>
+          </p:cNvPr>
+          <p:cNvSpPr txBox="1"/>
+          <p:nvPr/>
+        </p:nvSpPr>
+        <p:spPr>
+          <a:xfrm>
+            <a:off x="8762558" y="3654277"/>
+            <a:ext cx="518860" cy="369332"/>
+          </a:xfrm>
+          <a:prstGeom prst="rect">
+            <a:avLst/>
+          </a:prstGeom>
+          <a:noFill/>
+        </p:spPr>
+        <p:txBody>
+          <a:bodyPr wrap="square" rtlCol="0">
+            <a:spAutoFit/>
+          </a:bodyPr>
+          <a:lstStyle/>
+          <a:p>
+            <a:r>
+              <a:rPr lang="en-US" dirty="0"/>
+              <a:t>Key</a:t>
+            </a:r>
           </a:p>
         </p:txBody>
       </p:sp>
@@ -16011,6 +16172,326 @@
     <p:extLst>
       <p:ext uri="{BB962C8B-B14F-4D97-AF65-F5344CB8AC3E}">
         <p14:creationId xmlns:p14="http://schemas.microsoft.com/office/powerpoint/2010/main" val="428910257"/>
+      </p:ext>
+    </p:extLst>
+  </p:cSld>
+  <p:clrMapOvr>
+    <a:masterClrMapping/>
+  </p:clrMapOvr>
+</p:sld>
+</file>
+
+<file path=ppt/slides/slide28.xml><?xml version="1.0" encoding="utf-8"?>
+<p:sld xmlns:a="http://schemas.openxmlformats.org/drawingml/2006/main" xmlns:r="http://schemas.openxmlformats.org/officeDocument/2006/relationships" xmlns:p="http://schemas.openxmlformats.org/presentationml/2006/main">
+  <p:cSld>
+    <p:spTree>
+      <p:nvGrpSpPr>
+        <p:cNvPr id="1" name=""/>
+        <p:cNvGrpSpPr/>
+        <p:nvPr/>
+      </p:nvGrpSpPr>
+      <p:grpSpPr>
+        <a:xfrm>
+          <a:off x="0" y="0"/>
+          <a:ext cx="0" cy="0"/>
+          <a:chOff x="0" y="0"/>
+          <a:chExt cx="0" cy="0"/>
+        </a:xfrm>
+      </p:grpSpPr>
+      <p:sp>
+        <p:nvSpPr>
+          <p:cNvPr id="4" name="Rectangle 3"/>
+          <p:cNvSpPr/>
+          <p:nvPr/>
+        </p:nvSpPr>
+        <p:spPr>
+          <a:xfrm>
+            <a:off x="4089748" y="1684751"/>
+            <a:ext cx="1221288" cy="620038"/>
+          </a:xfrm>
+          <a:prstGeom prst="rect">
+            <a:avLst/>
+          </a:prstGeom>
+          <a:solidFill>
+            <a:schemeClr val="accent1">
+              <a:lumMod val="60000"/>
+              <a:lumOff val="40000"/>
+            </a:schemeClr>
+          </a:solidFill>
+          <a:ln>
+            <a:solidFill>
+              <a:schemeClr val="accent1">
+                <a:lumMod val="60000"/>
+                <a:lumOff val="40000"/>
+              </a:schemeClr>
+            </a:solidFill>
+          </a:ln>
+        </p:spPr>
+        <p:style>
+          <a:lnRef idx="2">
+            <a:schemeClr val="accent1">
+              <a:shade val="50000"/>
+            </a:schemeClr>
+          </a:lnRef>
+          <a:fillRef idx="1">
+            <a:schemeClr val="accent1"/>
+          </a:fillRef>
+          <a:effectRef idx="0">
+            <a:schemeClr val="accent1"/>
+          </a:effectRef>
+          <a:fontRef idx="minor">
+            <a:schemeClr val="lt1"/>
+          </a:fontRef>
+        </p:style>
+        <p:txBody>
+          <a:bodyPr rtlCol="0" anchor="ctr"/>
+          <a:lstStyle/>
+          <a:p>
+            <a:pPr algn="ctr"/>
+            <a:r>
+              <a:rPr lang="en-US" dirty="0">
+                <a:solidFill>
+                  <a:schemeClr val="tx1">
+                    <a:lumMod val="95000"/>
+                    <a:lumOff val="5000"/>
+                  </a:schemeClr>
+                </a:solidFill>
+              </a:rPr>
+              <a:t>encrypt</a:t>
+            </a:r>
+          </a:p>
+        </p:txBody>
+      </p:sp>
+      <p:cxnSp>
+        <p:nvCxnSpPr>
+          <p:cNvPr id="6" name="Straight Arrow Connector 5"/>
+          <p:cNvCxnSpPr>
+            <a:cxnSpLocks/>
+          </p:cNvCxnSpPr>
+          <p:nvPr/>
+        </p:nvCxnSpPr>
+        <p:spPr>
+          <a:xfrm>
+            <a:off x="3569918" y="1892133"/>
+            <a:ext cx="519830" cy="0"/>
+          </a:xfrm>
+          <a:prstGeom prst="straightConnector1">
+            <a:avLst/>
+          </a:prstGeom>
+          <a:ln w="28575">
+            <a:solidFill>
+              <a:schemeClr val="tx1"/>
+            </a:solidFill>
+            <a:tailEnd type="triangle"/>
+          </a:ln>
+        </p:spPr>
+        <p:style>
+          <a:lnRef idx="1">
+            <a:schemeClr val="accent1"/>
+          </a:lnRef>
+          <a:fillRef idx="0">
+            <a:schemeClr val="accent1"/>
+          </a:fillRef>
+          <a:effectRef idx="0">
+            <a:schemeClr val="accent1"/>
+          </a:effectRef>
+          <a:fontRef idx="minor">
+            <a:schemeClr val="tx1"/>
+          </a:fontRef>
+        </p:style>
+      </p:cxnSp>
+      <p:cxnSp>
+        <p:nvCxnSpPr>
+          <p:cNvPr id="8" name="Straight Arrow Connector 7"/>
+          <p:cNvCxnSpPr>
+            <a:cxnSpLocks/>
+            <a:stCxn id="4" idx="3"/>
+          </p:cNvCxnSpPr>
+          <p:nvPr/>
+        </p:nvCxnSpPr>
+        <p:spPr>
+          <a:xfrm>
+            <a:off x="5311036" y="1994770"/>
+            <a:ext cx="519830" cy="0"/>
+          </a:xfrm>
+          <a:prstGeom prst="straightConnector1">
+            <a:avLst/>
+          </a:prstGeom>
+          <a:ln w="28575">
+            <a:solidFill>
+              <a:schemeClr val="tx1"/>
+            </a:solidFill>
+            <a:tailEnd type="triangle"/>
+          </a:ln>
+        </p:spPr>
+        <p:style>
+          <a:lnRef idx="1">
+            <a:schemeClr val="accent1"/>
+          </a:lnRef>
+          <a:fillRef idx="0">
+            <a:schemeClr val="accent1"/>
+          </a:fillRef>
+          <a:effectRef idx="0">
+            <a:schemeClr val="accent1"/>
+          </a:effectRef>
+          <a:fontRef idx="minor">
+            <a:schemeClr val="tx1"/>
+          </a:fontRef>
+        </p:style>
+      </p:cxnSp>
+      <p:cxnSp>
+        <p:nvCxnSpPr>
+          <p:cNvPr id="5" name="Straight Arrow Connector 4">
+            <a:extLst>
+              <a:ext uri="{FF2B5EF4-FFF2-40B4-BE49-F238E27FC236}">
+                <a16:creationId xmlns:a16="http://schemas.microsoft.com/office/drawing/2014/main" id="{4FBFC9C6-F09C-4ECD-BC41-EF5A62F881C1}"/>
+              </a:ext>
+            </a:extLst>
+          </p:cNvPr>
+          <p:cNvCxnSpPr>
+            <a:cxnSpLocks/>
+          </p:cNvCxnSpPr>
+          <p:nvPr/>
+        </p:nvCxnSpPr>
+        <p:spPr>
+          <a:xfrm>
+            <a:off x="3582363" y="2184494"/>
+            <a:ext cx="519830" cy="0"/>
+          </a:xfrm>
+          <a:prstGeom prst="straightConnector1">
+            <a:avLst/>
+          </a:prstGeom>
+          <a:ln w="28575">
+            <a:solidFill>
+              <a:schemeClr val="tx1"/>
+            </a:solidFill>
+            <a:tailEnd type="triangle"/>
+          </a:ln>
+        </p:spPr>
+        <p:style>
+          <a:lnRef idx="1">
+            <a:schemeClr val="accent1"/>
+          </a:lnRef>
+          <a:fillRef idx="0">
+            <a:schemeClr val="accent1"/>
+          </a:fillRef>
+          <a:effectRef idx="0">
+            <a:schemeClr val="accent1"/>
+          </a:effectRef>
+          <a:fontRef idx="minor">
+            <a:schemeClr val="tx1"/>
+          </a:fontRef>
+        </p:style>
+      </p:cxnSp>
+      <p:sp>
+        <p:nvSpPr>
+          <p:cNvPr id="2" name="TextBox 1">
+            <a:extLst>
+              <a:ext uri="{FF2B5EF4-FFF2-40B4-BE49-F238E27FC236}">
+                <a16:creationId xmlns:a16="http://schemas.microsoft.com/office/drawing/2014/main" id="{172E604C-5CF3-419E-A7E4-00BC05E1E7B8}"/>
+              </a:ext>
+            </a:extLst>
+          </p:cNvPr>
+          <p:cNvSpPr txBox="1"/>
+          <p:nvPr/>
+        </p:nvSpPr>
+        <p:spPr>
+          <a:xfrm>
+            <a:off x="2577408" y="1684751"/>
+            <a:ext cx="1004955" cy="369332"/>
+          </a:xfrm>
+          <a:prstGeom prst="rect">
+            <a:avLst/>
+          </a:prstGeom>
+          <a:noFill/>
+        </p:spPr>
+        <p:txBody>
+          <a:bodyPr wrap="none" rtlCol="0">
+            <a:spAutoFit/>
+          </a:bodyPr>
+          <a:lstStyle/>
+          <a:p>
+            <a:r>
+              <a:rPr lang="en-US" dirty="0"/>
+              <a:t>cleartext</a:t>
+            </a:r>
+          </a:p>
+        </p:txBody>
+      </p:sp>
+      <p:sp>
+        <p:nvSpPr>
+          <p:cNvPr id="7" name="TextBox 6">
+            <a:extLst>
+              <a:ext uri="{FF2B5EF4-FFF2-40B4-BE49-F238E27FC236}">
+                <a16:creationId xmlns:a16="http://schemas.microsoft.com/office/drawing/2014/main" id="{9363AAD9-142A-4362-ACC1-3F9E4FF5D3F5}"/>
+              </a:ext>
+            </a:extLst>
+          </p:cNvPr>
+          <p:cNvSpPr txBox="1"/>
+          <p:nvPr/>
+        </p:nvSpPr>
+        <p:spPr>
+          <a:xfrm>
+            <a:off x="2973280" y="1994770"/>
+            <a:ext cx="596638" cy="369332"/>
+          </a:xfrm>
+          <a:prstGeom prst="rect">
+            <a:avLst/>
+          </a:prstGeom>
+          <a:noFill/>
+        </p:spPr>
+        <p:txBody>
+          <a:bodyPr wrap="none" rtlCol="0">
+            <a:spAutoFit/>
+          </a:bodyPr>
+          <a:lstStyle/>
+          <a:p>
+            <a:r>
+              <a:rPr lang="en-US" dirty="0"/>
+              <a:t>shift</a:t>
+            </a:r>
+          </a:p>
+        </p:txBody>
+      </p:sp>
+      <p:sp>
+        <p:nvSpPr>
+          <p:cNvPr id="9" name="TextBox 8">
+            <a:extLst>
+              <a:ext uri="{FF2B5EF4-FFF2-40B4-BE49-F238E27FC236}">
+                <a16:creationId xmlns:a16="http://schemas.microsoft.com/office/drawing/2014/main" id="{823638F1-EDA5-4F0A-8359-5AA9D00EED61}"/>
+              </a:ext>
+            </a:extLst>
+          </p:cNvPr>
+          <p:cNvSpPr txBox="1"/>
+          <p:nvPr/>
+        </p:nvSpPr>
+        <p:spPr>
+          <a:xfrm>
+            <a:off x="5792134" y="1810104"/>
+            <a:ext cx="1138004" cy="369332"/>
+          </a:xfrm>
+          <a:prstGeom prst="rect">
+            <a:avLst/>
+          </a:prstGeom>
+          <a:noFill/>
+        </p:spPr>
+        <p:txBody>
+          <a:bodyPr wrap="none" rtlCol="0">
+            <a:spAutoFit/>
+          </a:bodyPr>
+          <a:lstStyle/>
+          <a:p>
+            <a:r>
+              <a:rPr lang="en-US" dirty="0"/>
+              <a:t>ciphertext</a:t>
+            </a:r>
+          </a:p>
+        </p:txBody>
+      </p:sp>
+    </p:spTree>
+    <p:extLst>
+      <p:ext uri="{BB962C8B-B14F-4D97-AF65-F5344CB8AC3E}">
+        <p14:creationId xmlns:p14="http://schemas.microsoft.com/office/powerpoint/2010/main" val="1293351701"/>
       </p:ext>
     </p:extLst>
   </p:cSld>
@@ -17150,7 +17631,7 @@
                   <a14:useLocalDpi xmlns:a14="http://schemas.microsoft.com/office/drawing/2010/main" val="0"/>
                 </a:ext>
                 <a:ext uri="{96DAC541-7B7A-43D3-8B79-37D633B846F1}">
-                  <asvg:svgBlip xmlns:asvg="http://schemas.microsoft.com/office/drawing/2016/SVG/main" xmlns="" r:embed="rId3"/>
+                  <asvg:svgBlip xmlns:asvg="http://schemas.microsoft.com/office/drawing/2016/SVG/main" r:embed="rId3"/>
                 </a:ext>
               </a:extLst>
             </a:blip>
@@ -18689,7 +19170,7 @@
                 <a14:useLocalDpi xmlns:a14="http://schemas.microsoft.com/office/drawing/2010/main" val="0"/>
               </a:ext>
               <a:ext uri="{96DAC541-7B7A-43D3-8B79-37D633B846F1}">
-                <asvg:svgBlip xmlns:asvg="http://schemas.microsoft.com/office/drawing/2016/SVG/main" xmlns="" r:embed="rId3"/>
+                <asvg:svgBlip xmlns:asvg="http://schemas.microsoft.com/office/drawing/2016/SVG/main" r:embed="rId3"/>
               </a:ext>
             </a:extLst>
           </a:blip>
@@ -18728,7 +19209,7 @@
                 <a14:useLocalDpi xmlns:a14="http://schemas.microsoft.com/office/drawing/2010/main" val="0"/>
               </a:ext>
               <a:ext uri="{96DAC541-7B7A-43D3-8B79-37D633B846F1}">
-                <asvg:svgBlip xmlns:asvg="http://schemas.microsoft.com/office/drawing/2016/SVG/main" xmlns="" r:embed="rId5"/>
+                <asvg:svgBlip xmlns:asvg="http://schemas.microsoft.com/office/drawing/2016/SVG/main" r:embed="rId5"/>
               </a:ext>
             </a:extLst>
           </a:blip>
@@ -19119,7 +19600,7 @@
                 <a14:useLocalDpi xmlns:a14="http://schemas.microsoft.com/office/drawing/2010/main" val="0"/>
               </a:ext>
               <a:ext uri="{96DAC541-7B7A-43D3-8B79-37D633B846F1}">
-                <asvg:svgBlip xmlns:asvg="http://schemas.microsoft.com/office/drawing/2016/SVG/main" xmlns="" r:embed="rId5"/>
+                <asvg:svgBlip xmlns:asvg="http://schemas.microsoft.com/office/drawing/2016/SVG/main" r:embed="rId5"/>
               </a:ext>
             </a:extLst>
           </a:blip>
@@ -19267,7 +19748,7 @@
                 <a14:useLocalDpi xmlns:a14="http://schemas.microsoft.com/office/drawing/2010/main" val="0"/>
               </a:ext>
               <a:ext uri="{96DAC541-7B7A-43D3-8B79-37D633B846F1}">
-                <asvg:svgBlip xmlns:asvg="http://schemas.microsoft.com/office/drawing/2016/SVG/main" xmlns="" r:embed="rId3"/>
+                <asvg:svgBlip xmlns:asvg="http://schemas.microsoft.com/office/drawing/2016/SVG/main" r:embed="rId3"/>
               </a:ext>
             </a:extLst>
           </a:blip>
@@ -19306,7 +19787,7 @@
                 <a14:useLocalDpi xmlns:a14="http://schemas.microsoft.com/office/drawing/2010/main" val="0"/>
               </a:ext>
               <a:ext uri="{96DAC541-7B7A-43D3-8B79-37D633B846F1}">
-                <asvg:svgBlip xmlns:asvg="http://schemas.microsoft.com/office/drawing/2016/SVG/main" xmlns="" r:embed="rId5"/>
+                <asvg:svgBlip xmlns:asvg="http://schemas.microsoft.com/office/drawing/2016/SVG/main" r:embed="rId5"/>
               </a:ext>
             </a:extLst>
           </a:blip>

</xml_diff>

<commit_message>
One time pad stuff
</commit_message>
<xml_diff>
--- a/images/pygame_rect_window.pptx
+++ b/images/pygame_rect_window.pptx
@@ -5,7 +5,7 @@
     <p:sldMasterId id="2147483648" r:id="rId1"/>
   </p:sldMasterIdLst>
   <p:notesMasterIdLst>
-    <p:notesMasterId r:id="rId30"/>
+    <p:notesMasterId r:id="rId31"/>
   </p:notesMasterIdLst>
   <p:sldIdLst>
     <p:sldId id="257" r:id="rId2"/>
@@ -36,6 +36,7 @@
     <p:sldId id="284" r:id="rId27"/>
     <p:sldId id="285" r:id="rId28"/>
     <p:sldId id="286" r:id="rId29"/>
+    <p:sldId id="287" r:id="rId30"/>
   </p:sldIdLst>
   <p:sldSz cx="12192000" cy="6858000"/>
   <p:notesSz cx="6858000" cy="9144000"/>
@@ -142,6 +143,18 @@
 </p:presentation>
 </file>
 
+<file path=ppt/commentAuthors.xml><?xml version="1.0" encoding="utf-8"?>
+<p:cmAuthorLst xmlns:a="http://schemas.openxmlformats.org/drawingml/2006/main" xmlns:r="http://schemas.openxmlformats.org/officeDocument/2006/relationships" xmlns:p="http://schemas.openxmlformats.org/presentationml/2006/main">
+  <p:cmAuthor id="1" name="Ed Harcourt" initials="EH" lastIdx="1" clrIdx="0">
+    <p:extLst>
+      <p:ext uri="{19B8F6BF-5375-455C-9EA6-DF929625EA0E}">
+        <p15:presenceInfo xmlns:p15="http://schemas.microsoft.com/office/powerpoint/2012/main" userId="S-1-5-21-484763869-412668190-725345543-6509" providerId="AD"/>
+      </p:ext>
+    </p:extLst>
+  </p:cmAuthor>
+</p:cmAuthorLst>
+</file>
+
 <file path=ppt/notesMasters/notesMaster1.xml><?xml version="1.0" encoding="utf-8"?>
 <p:notesMaster xmlns:a="http://schemas.openxmlformats.org/drawingml/2006/main" xmlns:r="http://schemas.openxmlformats.org/officeDocument/2006/relationships" xmlns:p="http://schemas.openxmlformats.org/presentationml/2006/main">
   <p:cSld>
@@ -224,7 +237,7 @@
           <a:p>
             <a:fld id="{A06AD928-664A-442C-B312-AFB4F7171F46}" type="datetimeFigureOut">
               <a:rPr lang="en-US" smtClean="0"/>
-              <a:t>5/28/2018</a:t>
+              <a:t>5/31/2018</a:t>
             </a:fld>
             <a:endParaRPr lang="en-US"/>
           </a:p>
@@ -620,7 +633,7 @@
           <a:p>
             <a:fld id="{856FFBE8-0159-4FDA-8D70-04C5D85E84A4}" type="datetimeFigureOut">
               <a:rPr lang="en-US" smtClean="0"/>
-              <a:t>5/28/2018</a:t>
+              <a:t>5/31/2018</a:t>
             </a:fld>
             <a:endParaRPr lang="en-US"/>
           </a:p>
@@ -788,7 +801,7 @@
           <a:p>
             <a:fld id="{856FFBE8-0159-4FDA-8D70-04C5D85E84A4}" type="datetimeFigureOut">
               <a:rPr lang="en-US" smtClean="0"/>
-              <a:t>5/28/2018</a:t>
+              <a:t>5/31/2018</a:t>
             </a:fld>
             <a:endParaRPr lang="en-US"/>
           </a:p>
@@ -966,7 +979,7 @@
           <a:p>
             <a:fld id="{856FFBE8-0159-4FDA-8D70-04C5D85E84A4}" type="datetimeFigureOut">
               <a:rPr lang="en-US" smtClean="0"/>
-              <a:t>5/28/2018</a:t>
+              <a:t>5/31/2018</a:t>
             </a:fld>
             <a:endParaRPr lang="en-US"/>
           </a:p>
@@ -1134,7 +1147,7 @@
           <a:p>
             <a:fld id="{856FFBE8-0159-4FDA-8D70-04C5D85E84A4}" type="datetimeFigureOut">
               <a:rPr lang="en-US" smtClean="0"/>
-              <a:t>5/28/2018</a:t>
+              <a:t>5/31/2018</a:t>
             </a:fld>
             <a:endParaRPr lang="en-US"/>
           </a:p>
@@ -1379,7 +1392,7 @@
           <a:p>
             <a:fld id="{856FFBE8-0159-4FDA-8D70-04C5D85E84A4}" type="datetimeFigureOut">
               <a:rPr lang="en-US" smtClean="0"/>
-              <a:t>5/28/2018</a:t>
+              <a:t>5/31/2018</a:t>
             </a:fld>
             <a:endParaRPr lang="en-US"/>
           </a:p>
@@ -1608,7 +1621,7 @@
           <a:p>
             <a:fld id="{856FFBE8-0159-4FDA-8D70-04C5D85E84A4}" type="datetimeFigureOut">
               <a:rPr lang="en-US" smtClean="0"/>
-              <a:t>5/28/2018</a:t>
+              <a:t>5/31/2018</a:t>
             </a:fld>
             <a:endParaRPr lang="en-US"/>
           </a:p>
@@ -1972,7 +1985,7 @@
           <a:p>
             <a:fld id="{856FFBE8-0159-4FDA-8D70-04C5D85E84A4}" type="datetimeFigureOut">
               <a:rPr lang="en-US" smtClean="0"/>
-              <a:t>5/28/2018</a:t>
+              <a:t>5/31/2018</a:t>
             </a:fld>
             <a:endParaRPr lang="en-US"/>
           </a:p>
@@ -2089,7 +2102,7 @@
           <a:p>
             <a:fld id="{856FFBE8-0159-4FDA-8D70-04C5D85E84A4}" type="datetimeFigureOut">
               <a:rPr lang="en-US" smtClean="0"/>
-              <a:t>5/28/2018</a:t>
+              <a:t>5/31/2018</a:t>
             </a:fld>
             <a:endParaRPr lang="en-US"/>
           </a:p>
@@ -2184,7 +2197,7 @@
           <a:p>
             <a:fld id="{856FFBE8-0159-4FDA-8D70-04C5D85E84A4}" type="datetimeFigureOut">
               <a:rPr lang="en-US" smtClean="0"/>
-              <a:t>5/28/2018</a:t>
+              <a:t>5/31/2018</a:t>
             </a:fld>
             <a:endParaRPr lang="en-US"/>
           </a:p>
@@ -2459,7 +2472,7 @@
           <a:p>
             <a:fld id="{856FFBE8-0159-4FDA-8D70-04C5D85E84A4}" type="datetimeFigureOut">
               <a:rPr lang="en-US" smtClean="0"/>
-              <a:t>5/28/2018</a:t>
+              <a:t>5/31/2018</a:t>
             </a:fld>
             <a:endParaRPr lang="en-US"/>
           </a:p>
@@ -2711,7 +2724,7 @@
           <a:p>
             <a:fld id="{856FFBE8-0159-4FDA-8D70-04C5D85E84A4}" type="datetimeFigureOut">
               <a:rPr lang="en-US" smtClean="0"/>
-              <a:t>5/28/2018</a:t>
+              <a:t>5/31/2018</a:t>
             </a:fld>
             <a:endParaRPr lang="en-US"/>
           </a:p>
@@ -2922,7 +2935,7 @@
           <a:p>
             <a:fld id="{856FFBE8-0159-4FDA-8D70-04C5D85E84A4}" type="datetimeFigureOut">
               <a:rPr lang="en-US" smtClean="0"/>
-              <a:t>5/28/2018</a:t>
+              <a:t>5/31/2018</a:t>
             </a:fld>
             <a:endParaRPr lang="en-US"/>
           </a:p>
@@ -13616,7 +13629,7 @@
                   <a14:useLocalDpi xmlns:a14="http://schemas.microsoft.com/office/drawing/2010/main" val="0"/>
                 </a:ext>
                 <a:ext uri="{96DAC541-7B7A-43D3-8B79-37D633B846F1}">
-                  <asvg:svgBlip xmlns:asvg="http://schemas.microsoft.com/office/drawing/2016/SVG/main" r:embed="rId3"/>
+                  <asvg:svgBlip xmlns:asvg="http://schemas.microsoft.com/office/drawing/2016/SVG/main" xmlns="" r:embed="rId3"/>
                 </a:ext>
               </a:extLst>
             </a:blip>
@@ -13655,7 +13668,7 @@
                   <a14:useLocalDpi xmlns:a14="http://schemas.microsoft.com/office/drawing/2010/main" val="0"/>
                 </a:ext>
                 <a:ext uri="{96DAC541-7B7A-43D3-8B79-37D633B846F1}">
-                  <asvg:svgBlip xmlns:asvg="http://schemas.microsoft.com/office/drawing/2016/SVG/main" r:embed="rId5"/>
+                  <asvg:svgBlip xmlns:asvg="http://schemas.microsoft.com/office/drawing/2016/SVG/main" xmlns="" r:embed="rId5"/>
                 </a:ext>
               </a:extLst>
             </a:blip>
@@ -13694,7 +13707,7 @@
                   <a14:useLocalDpi xmlns:a14="http://schemas.microsoft.com/office/drawing/2010/main" val="0"/>
                 </a:ext>
                 <a:ext uri="{96DAC541-7B7A-43D3-8B79-37D633B846F1}">
-                  <asvg:svgBlip xmlns:asvg="http://schemas.microsoft.com/office/drawing/2016/SVG/main" r:embed="rId7"/>
+                  <asvg:svgBlip xmlns:asvg="http://schemas.microsoft.com/office/drawing/2016/SVG/main" xmlns="" r:embed="rId7"/>
                 </a:ext>
               </a:extLst>
             </a:blip>
@@ -14184,7 +14197,7 @@
                   <a14:useLocalDpi xmlns:a14="http://schemas.microsoft.com/office/drawing/2010/main" val="0"/>
                 </a:ext>
                 <a:ext uri="{96DAC541-7B7A-43D3-8B79-37D633B846F1}">
-                  <asvg:svgBlip xmlns:asvg="http://schemas.microsoft.com/office/drawing/2016/SVG/main" r:embed="rId9"/>
+                  <asvg:svgBlip xmlns:asvg="http://schemas.microsoft.com/office/drawing/2016/SVG/main" xmlns="" r:embed="rId9"/>
                 </a:ext>
               </a:extLst>
             </a:blip>
@@ -15076,7 +15089,7 @@
                 <a14:useLocalDpi xmlns:a14="http://schemas.microsoft.com/office/drawing/2010/main" val="0"/>
               </a:ext>
               <a:ext uri="{96DAC541-7B7A-43D3-8B79-37D633B846F1}">
-                <asvg:svgBlip xmlns:asvg="http://schemas.microsoft.com/office/drawing/2016/SVG/main" r:embed="rId3"/>
+                <asvg:svgBlip xmlns:asvg="http://schemas.microsoft.com/office/drawing/2016/SVG/main" xmlns="" r:embed="rId3"/>
               </a:ext>
             </a:extLst>
           </a:blip>
@@ -16501,6 +16514,992 @@
 </p:sld>
 </file>
 
+<file path=ppt/slides/slide29.xml><?xml version="1.0" encoding="utf-8"?>
+<p:sld xmlns:a="http://schemas.openxmlformats.org/drawingml/2006/main" xmlns:r="http://schemas.openxmlformats.org/officeDocument/2006/relationships" xmlns:p="http://schemas.openxmlformats.org/presentationml/2006/main">
+  <p:cSld>
+    <p:spTree>
+      <p:nvGrpSpPr>
+        <p:cNvPr id="1" name=""/>
+        <p:cNvGrpSpPr/>
+        <p:nvPr/>
+      </p:nvGrpSpPr>
+      <p:grpSpPr>
+        <a:xfrm>
+          <a:off x="0" y="0"/>
+          <a:ext cx="0" cy="0"/>
+          <a:chOff x="0" y="0"/>
+          <a:chExt cx="0" cy="0"/>
+        </a:xfrm>
+      </p:grpSpPr>
+      <p:graphicFrame>
+        <p:nvGraphicFramePr>
+          <p:cNvPr id="16" name="Table 15"/>
+          <p:cNvGraphicFramePr>
+            <a:graphicFrameLocks noGrp="1"/>
+          </p:cNvGraphicFramePr>
+          <p:nvPr>
+            <p:extLst>
+              <p:ext uri="{D42A27DB-BD31-4B8C-83A1-F6EECF244321}">
+                <p14:modId xmlns:p14="http://schemas.microsoft.com/office/powerpoint/2010/main" val="554466070"/>
+              </p:ext>
+            </p:extLst>
+          </p:nvPr>
+        </p:nvGraphicFramePr>
+        <p:xfrm>
+          <a:off x="785091" y="1002485"/>
+          <a:ext cx="1865746" cy="1112520"/>
+        </p:xfrm>
+        <a:graphic>
+          <a:graphicData uri="http://schemas.openxmlformats.org/drawingml/2006/table">
+            <a:tbl>
+              <a:tblPr>
+                <a:tableStyleId>{5C22544A-7EE6-4342-B048-85BDC9FD1C3A}</a:tableStyleId>
+              </a:tblPr>
+              <a:tblGrid>
+                <a:gridCol w="326351">
+                  <a:extLst>
+                    <a:ext uri="{9D8B030D-6E8A-4147-A177-3AD203B41FA5}">
+                      <a16:colId xmlns:a16="http://schemas.microsoft.com/office/drawing/2014/main" val="1649486342"/>
+                    </a:ext>
+                  </a:extLst>
+                </a:gridCol>
+                <a:gridCol w="307879">
+                  <a:extLst>
+                    <a:ext uri="{9D8B030D-6E8A-4147-A177-3AD203B41FA5}">
+                      <a16:colId xmlns:a16="http://schemas.microsoft.com/office/drawing/2014/main" val="2534806080"/>
+                    </a:ext>
+                  </a:extLst>
+                </a:gridCol>
+                <a:gridCol w="307879">
+                  <a:extLst>
+                    <a:ext uri="{9D8B030D-6E8A-4147-A177-3AD203B41FA5}">
+                      <a16:colId xmlns:a16="http://schemas.microsoft.com/office/drawing/2014/main" val="2814142418"/>
+                    </a:ext>
+                  </a:extLst>
+                </a:gridCol>
+                <a:gridCol w="307879">
+                  <a:extLst>
+                    <a:ext uri="{9D8B030D-6E8A-4147-A177-3AD203B41FA5}">
+                      <a16:colId xmlns:a16="http://schemas.microsoft.com/office/drawing/2014/main" val="3306853379"/>
+                    </a:ext>
+                  </a:extLst>
+                </a:gridCol>
+                <a:gridCol w="307879">
+                  <a:extLst>
+                    <a:ext uri="{9D8B030D-6E8A-4147-A177-3AD203B41FA5}">
+                      <a16:colId xmlns:a16="http://schemas.microsoft.com/office/drawing/2014/main" val="1260118234"/>
+                    </a:ext>
+                  </a:extLst>
+                </a:gridCol>
+                <a:gridCol w="307879">
+                  <a:extLst>
+                    <a:ext uri="{9D8B030D-6E8A-4147-A177-3AD203B41FA5}">
+                      <a16:colId xmlns:a16="http://schemas.microsoft.com/office/drawing/2014/main" val="2430874503"/>
+                    </a:ext>
+                  </a:extLst>
+                </a:gridCol>
+              </a:tblGrid>
+              <a:tr h="370840">
+                <a:tc>
+                  <a:txBody>
+                    <a:bodyPr/>
+                    <a:lstStyle/>
+                    <a:p>
+                      <a:endParaRPr lang="en-US" dirty="0"/>
+                    </a:p>
+                  </a:txBody>
+                  <a:tcPr/>
+                </a:tc>
+                <a:tc>
+                  <a:txBody>
+                    <a:bodyPr/>
+                    <a:lstStyle/>
+                    <a:p>
+                      <a:r>
+                        <a:rPr lang="en-US" b="1" dirty="0" smtClean="0">
+                          <a:latin typeface="Consolas" panose="020B0609020204030204" pitchFamily="49" charset="0"/>
+                        </a:rPr>
+                        <a:t>a</a:t>
+                      </a:r>
+                      <a:endParaRPr lang="en-US" b="1" dirty="0">
+                        <a:latin typeface="Consolas" panose="020B0609020204030204" pitchFamily="49" charset="0"/>
+                      </a:endParaRPr>
+                    </a:p>
+                  </a:txBody>
+                  <a:tcPr/>
+                </a:tc>
+                <a:tc>
+                  <a:txBody>
+                    <a:bodyPr/>
+                    <a:lstStyle/>
+                    <a:p>
+                      <a:r>
+                        <a:rPr lang="en-US" b="1" dirty="0" smtClean="0">
+                          <a:latin typeface="Consolas" panose="020B0609020204030204" pitchFamily="49" charset="0"/>
+                        </a:rPr>
+                        <a:t>p</a:t>
+                      </a:r>
+                      <a:endParaRPr lang="en-US" b="1" dirty="0">
+                        <a:latin typeface="Consolas" panose="020B0609020204030204" pitchFamily="49" charset="0"/>
+                      </a:endParaRPr>
+                    </a:p>
+                  </a:txBody>
+                  <a:tcPr/>
+                </a:tc>
+                <a:tc>
+                  <a:txBody>
+                    <a:bodyPr/>
+                    <a:lstStyle/>
+                    <a:p>
+                      <a:r>
+                        <a:rPr lang="en-US" b="1" dirty="0" smtClean="0">
+                          <a:latin typeface="Consolas" panose="020B0609020204030204" pitchFamily="49" charset="0"/>
+                        </a:rPr>
+                        <a:t>p</a:t>
+                      </a:r>
+                      <a:endParaRPr lang="en-US" b="1" dirty="0">
+                        <a:latin typeface="Consolas" panose="020B0609020204030204" pitchFamily="49" charset="0"/>
+                      </a:endParaRPr>
+                    </a:p>
+                  </a:txBody>
+                  <a:tcPr/>
+                </a:tc>
+                <a:tc>
+                  <a:txBody>
+                    <a:bodyPr/>
+                    <a:lstStyle/>
+                    <a:p>
+                      <a:r>
+                        <a:rPr lang="en-US" b="1" dirty="0" smtClean="0">
+                          <a:latin typeface="Consolas" panose="020B0609020204030204" pitchFamily="49" charset="0"/>
+                        </a:rPr>
+                        <a:t>l</a:t>
+                      </a:r>
+                      <a:endParaRPr lang="en-US" b="1" dirty="0">
+                        <a:latin typeface="Consolas" panose="020B0609020204030204" pitchFamily="49" charset="0"/>
+                      </a:endParaRPr>
+                    </a:p>
+                  </a:txBody>
+                  <a:tcPr/>
+                </a:tc>
+                <a:tc>
+                  <a:txBody>
+                    <a:bodyPr/>
+                    <a:lstStyle/>
+                    <a:p>
+                      <a:r>
+                        <a:rPr lang="en-US" b="1" dirty="0" smtClean="0">
+                          <a:latin typeface="Consolas" panose="020B0609020204030204" pitchFamily="49" charset="0"/>
+                        </a:rPr>
+                        <a:t>e</a:t>
+                      </a:r>
+                      <a:endParaRPr lang="en-US" b="1" dirty="0">
+                        <a:latin typeface="Consolas" panose="020B0609020204030204" pitchFamily="49" charset="0"/>
+                      </a:endParaRPr>
+                    </a:p>
+                  </a:txBody>
+                  <a:tcPr/>
+                </a:tc>
+                <a:extLst>
+                  <a:ext uri="{0D108BD9-81ED-4DB2-BD59-A6C34878D82A}">
+                    <a16:rowId xmlns:a16="http://schemas.microsoft.com/office/drawing/2014/main" val="4082026428"/>
+                  </a:ext>
+                </a:extLst>
+              </a:tr>
+              <a:tr h="370840">
+                <a:tc>
+                  <a:txBody>
+                    <a:bodyPr/>
+                    <a:lstStyle/>
+                    <a:p>
+                      <a:endParaRPr lang="en-US" dirty="0"/>
+                    </a:p>
+                  </a:txBody>
+                  <a:tcPr/>
+                </a:tc>
+                <a:tc>
+                  <a:txBody>
+                    <a:bodyPr/>
+                    <a:lstStyle/>
+                    <a:p>
+                      <a:r>
+                        <a:rPr lang="en-US" b="1" dirty="0" smtClean="0">
+                          <a:latin typeface="Consolas" panose="020B0609020204030204" pitchFamily="49" charset="0"/>
+                        </a:rPr>
+                        <a:t>l</a:t>
+                      </a:r>
+                      <a:endParaRPr lang="en-US" b="1" dirty="0">
+                        <a:latin typeface="Consolas" panose="020B0609020204030204" pitchFamily="49" charset="0"/>
+                      </a:endParaRPr>
+                    </a:p>
+                  </a:txBody>
+                  <a:tcPr/>
+                </a:tc>
+                <a:tc>
+                  <a:txBody>
+                    <a:bodyPr/>
+                    <a:lstStyle/>
+                    <a:p>
+                      <a:r>
+                        <a:rPr lang="en-US" b="1" dirty="0" smtClean="0">
+                          <a:latin typeface="Consolas" panose="020B0609020204030204" pitchFamily="49" charset="0"/>
+                        </a:rPr>
+                        <a:t>z</a:t>
+                      </a:r>
+                      <a:endParaRPr lang="en-US" b="1" dirty="0">
+                        <a:latin typeface="Consolas" panose="020B0609020204030204" pitchFamily="49" charset="0"/>
+                      </a:endParaRPr>
+                    </a:p>
+                  </a:txBody>
+                  <a:tcPr/>
+                </a:tc>
+                <a:tc>
+                  <a:txBody>
+                    <a:bodyPr/>
+                    <a:lstStyle/>
+                    <a:p>
+                      <a:r>
+                        <a:rPr lang="en-US" b="1" dirty="0" smtClean="0">
+                          <a:latin typeface="Consolas" panose="020B0609020204030204" pitchFamily="49" charset="0"/>
+                        </a:rPr>
+                        <a:t>k</a:t>
+                      </a:r>
+                      <a:endParaRPr lang="en-US" b="1" dirty="0">
+                        <a:latin typeface="Consolas" panose="020B0609020204030204" pitchFamily="49" charset="0"/>
+                      </a:endParaRPr>
+                    </a:p>
+                  </a:txBody>
+                  <a:tcPr/>
+                </a:tc>
+                <a:tc>
+                  <a:txBody>
+                    <a:bodyPr/>
+                    <a:lstStyle/>
+                    <a:p>
+                      <a:r>
+                        <a:rPr lang="en-US" b="1" dirty="0" smtClean="0">
+                          <a:latin typeface="Consolas" panose="020B0609020204030204" pitchFamily="49" charset="0"/>
+                        </a:rPr>
+                        <a:t>s</a:t>
+                      </a:r>
+                      <a:endParaRPr lang="en-US" b="1" dirty="0">
+                        <a:latin typeface="Consolas" panose="020B0609020204030204" pitchFamily="49" charset="0"/>
+                      </a:endParaRPr>
+                    </a:p>
+                  </a:txBody>
+                  <a:tcPr/>
+                </a:tc>
+                <a:tc>
+                  <a:txBody>
+                    <a:bodyPr/>
+                    <a:lstStyle/>
+                    <a:p>
+                      <a:r>
+                        <a:rPr lang="en-US" b="1" dirty="0" smtClean="0">
+                          <a:latin typeface="Consolas" panose="020B0609020204030204" pitchFamily="49" charset="0"/>
+                        </a:rPr>
+                        <a:t>j</a:t>
+                      </a:r>
+                      <a:endParaRPr lang="en-US" b="1" dirty="0">
+                        <a:latin typeface="Consolas" panose="020B0609020204030204" pitchFamily="49" charset="0"/>
+                      </a:endParaRPr>
+                    </a:p>
+                  </a:txBody>
+                  <a:tcPr/>
+                </a:tc>
+                <a:extLst>
+                  <a:ext uri="{0D108BD9-81ED-4DB2-BD59-A6C34878D82A}">
+                    <a16:rowId xmlns:a16="http://schemas.microsoft.com/office/drawing/2014/main" val="4087756528"/>
+                  </a:ext>
+                </a:extLst>
+              </a:tr>
+              <a:tr h="370840">
+                <a:tc>
+                  <a:txBody>
+                    <a:bodyPr/>
+                    <a:lstStyle/>
+                    <a:p>
+                      <a:r>
+                        <a:rPr lang="en-US" dirty="0" smtClean="0"/>
+                        <a:t>+</a:t>
+                      </a:r>
+                      <a:endParaRPr lang="en-US" dirty="0"/>
+                    </a:p>
+                  </a:txBody>
+                  <a:tcPr/>
+                </a:tc>
+                <a:tc>
+                  <a:txBody>
+                    <a:bodyPr/>
+                    <a:lstStyle/>
+                    <a:p>
+                      <a:r>
+                        <a:rPr lang="en-US" b="1" dirty="0" smtClean="0">
+                          <a:solidFill>
+                            <a:srgbClr val="002060"/>
+                          </a:solidFill>
+                          <a:latin typeface="Consolas" panose="020B0609020204030204" pitchFamily="49" charset="0"/>
+                        </a:rPr>
+                        <a:t>l</a:t>
+                      </a:r>
+                      <a:endParaRPr lang="en-US" b="1" dirty="0">
+                        <a:solidFill>
+                          <a:srgbClr val="002060"/>
+                        </a:solidFill>
+                        <a:latin typeface="Consolas" panose="020B0609020204030204" pitchFamily="49" charset="0"/>
+                      </a:endParaRPr>
+                    </a:p>
+                  </a:txBody>
+                  <a:tcPr/>
+                </a:tc>
+                <a:tc>
+                  <a:txBody>
+                    <a:bodyPr/>
+                    <a:lstStyle/>
+                    <a:p>
+                      <a:r>
+                        <a:rPr lang="en-US" b="1" dirty="0" smtClean="0">
+                          <a:solidFill>
+                            <a:srgbClr val="002060"/>
+                          </a:solidFill>
+                          <a:latin typeface="Consolas" panose="020B0609020204030204" pitchFamily="49" charset="0"/>
+                        </a:rPr>
+                        <a:t>o</a:t>
+                      </a:r>
+                      <a:endParaRPr lang="en-US" b="1" dirty="0">
+                        <a:solidFill>
+                          <a:srgbClr val="002060"/>
+                        </a:solidFill>
+                        <a:latin typeface="Consolas" panose="020B0609020204030204" pitchFamily="49" charset="0"/>
+                      </a:endParaRPr>
+                    </a:p>
+                  </a:txBody>
+                  <a:tcPr/>
+                </a:tc>
+                <a:tc>
+                  <a:txBody>
+                    <a:bodyPr/>
+                    <a:lstStyle/>
+                    <a:p>
+                      <a:r>
+                        <a:rPr lang="en-US" b="1" dirty="0" smtClean="0">
+                          <a:solidFill>
+                            <a:srgbClr val="002060"/>
+                          </a:solidFill>
+                          <a:latin typeface="Consolas" panose="020B0609020204030204" pitchFamily="49" charset="0"/>
+                        </a:rPr>
+                        <a:t>z</a:t>
+                      </a:r>
+                      <a:endParaRPr lang="en-US" b="1" dirty="0">
+                        <a:solidFill>
+                          <a:srgbClr val="002060"/>
+                        </a:solidFill>
+                        <a:latin typeface="Consolas" panose="020B0609020204030204" pitchFamily="49" charset="0"/>
+                      </a:endParaRPr>
+                    </a:p>
+                  </a:txBody>
+                  <a:tcPr/>
+                </a:tc>
+                <a:tc>
+                  <a:txBody>
+                    <a:bodyPr/>
+                    <a:lstStyle/>
+                    <a:p>
+                      <a:r>
+                        <a:rPr lang="en-US" b="1" dirty="0" smtClean="0">
+                          <a:solidFill>
+                            <a:srgbClr val="002060"/>
+                          </a:solidFill>
+                          <a:latin typeface="Consolas" panose="020B0609020204030204" pitchFamily="49" charset="0"/>
+                        </a:rPr>
+                        <a:t>d</a:t>
+                      </a:r>
+                      <a:endParaRPr lang="en-US" b="1" dirty="0">
+                        <a:solidFill>
+                          <a:srgbClr val="002060"/>
+                        </a:solidFill>
+                        <a:latin typeface="Consolas" panose="020B0609020204030204" pitchFamily="49" charset="0"/>
+                      </a:endParaRPr>
+                    </a:p>
+                  </a:txBody>
+                  <a:tcPr/>
+                </a:tc>
+                <a:tc>
+                  <a:txBody>
+                    <a:bodyPr/>
+                    <a:lstStyle/>
+                    <a:p>
+                      <a:r>
+                        <a:rPr lang="en-US" b="1" dirty="0" smtClean="0">
+                          <a:solidFill>
+                            <a:srgbClr val="002060"/>
+                          </a:solidFill>
+                          <a:latin typeface="Consolas" panose="020B0609020204030204" pitchFamily="49" charset="0"/>
+                        </a:rPr>
+                        <a:t>n</a:t>
+                      </a:r>
+                      <a:endParaRPr lang="en-US" b="1" dirty="0">
+                        <a:solidFill>
+                          <a:srgbClr val="002060"/>
+                        </a:solidFill>
+                        <a:latin typeface="Consolas" panose="020B0609020204030204" pitchFamily="49" charset="0"/>
+                      </a:endParaRPr>
+                    </a:p>
+                  </a:txBody>
+                  <a:tcPr/>
+                </a:tc>
+                <a:extLst>
+                  <a:ext uri="{0D108BD9-81ED-4DB2-BD59-A6C34878D82A}">
+                    <a16:rowId xmlns:a16="http://schemas.microsoft.com/office/drawing/2014/main" val="3333305330"/>
+                  </a:ext>
+                </a:extLst>
+              </a:tr>
+            </a:tbl>
+          </a:graphicData>
+        </a:graphic>
+      </p:graphicFrame>
+      <p:graphicFrame>
+        <p:nvGraphicFramePr>
+          <p:cNvPr id="17" name="Table 16"/>
+          <p:cNvGraphicFramePr>
+            <a:graphicFrameLocks noGrp="1"/>
+          </p:cNvGraphicFramePr>
+          <p:nvPr>
+            <p:extLst>
+              <p:ext uri="{D42A27DB-BD31-4B8C-83A1-F6EECF244321}">
+                <p14:modId xmlns:p14="http://schemas.microsoft.com/office/powerpoint/2010/main" val="280448446"/>
+              </p:ext>
+            </p:extLst>
+          </p:nvPr>
+        </p:nvGraphicFramePr>
+        <p:xfrm>
+          <a:off x="4059381" y="1002485"/>
+          <a:ext cx="3163457" cy="1112520"/>
+        </p:xfrm>
+        <a:graphic>
+          <a:graphicData uri="http://schemas.openxmlformats.org/drawingml/2006/table">
+            <a:tbl>
+              <a:tblPr>
+                <a:tableStyleId>{5C22544A-7EE6-4342-B048-85BDC9FD1C3A}</a:tableStyleId>
+              </a:tblPr>
+              <a:tblGrid>
+                <a:gridCol w="553342">
+                  <a:extLst>
+                    <a:ext uri="{9D8B030D-6E8A-4147-A177-3AD203B41FA5}">
+                      <a16:colId xmlns:a16="http://schemas.microsoft.com/office/drawing/2014/main" val="1649486342"/>
+                    </a:ext>
+                  </a:extLst>
+                </a:gridCol>
+                <a:gridCol w="522023">
+                  <a:extLst>
+                    <a:ext uri="{9D8B030D-6E8A-4147-A177-3AD203B41FA5}">
+                      <a16:colId xmlns:a16="http://schemas.microsoft.com/office/drawing/2014/main" val="2534806080"/>
+                    </a:ext>
+                  </a:extLst>
+                </a:gridCol>
+                <a:gridCol w="522023">
+                  <a:extLst>
+                    <a:ext uri="{9D8B030D-6E8A-4147-A177-3AD203B41FA5}">
+                      <a16:colId xmlns:a16="http://schemas.microsoft.com/office/drawing/2014/main" val="2814142418"/>
+                    </a:ext>
+                  </a:extLst>
+                </a:gridCol>
+                <a:gridCol w="522023">
+                  <a:extLst>
+                    <a:ext uri="{9D8B030D-6E8A-4147-A177-3AD203B41FA5}">
+                      <a16:colId xmlns:a16="http://schemas.microsoft.com/office/drawing/2014/main" val="3306853379"/>
+                    </a:ext>
+                  </a:extLst>
+                </a:gridCol>
+                <a:gridCol w="522023">
+                  <a:extLst>
+                    <a:ext uri="{9D8B030D-6E8A-4147-A177-3AD203B41FA5}">
+                      <a16:colId xmlns:a16="http://schemas.microsoft.com/office/drawing/2014/main" val="1260118234"/>
+                    </a:ext>
+                  </a:extLst>
+                </a:gridCol>
+                <a:gridCol w="522023">
+                  <a:extLst>
+                    <a:ext uri="{9D8B030D-6E8A-4147-A177-3AD203B41FA5}">
+                      <a16:colId xmlns:a16="http://schemas.microsoft.com/office/drawing/2014/main" val="2430874503"/>
+                    </a:ext>
+                  </a:extLst>
+                </a:gridCol>
+              </a:tblGrid>
+              <a:tr h="370840">
+                <a:tc>
+                  <a:txBody>
+                    <a:bodyPr/>
+                    <a:lstStyle/>
+                    <a:p>
+                      <a:endParaRPr lang="en-US" dirty="0"/>
+                    </a:p>
+                  </a:txBody>
+                  <a:tcPr/>
+                </a:tc>
+                <a:tc>
+                  <a:txBody>
+                    <a:bodyPr/>
+                    <a:lstStyle/>
+                    <a:p>
+                      <a:r>
+                        <a:rPr lang="en-US" b="1" dirty="0" smtClean="0">
+                          <a:latin typeface="Consolas" panose="020B0609020204030204" pitchFamily="49" charset="0"/>
+                        </a:rPr>
+                        <a:t>0</a:t>
+                      </a:r>
+                      <a:endParaRPr lang="en-US" b="1" dirty="0">
+                        <a:latin typeface="Consolas" panose="020B0609020204030204" pitchFamily="49" charset="0"/>
+                      </a:endParaRPr>
+                    </a:p>
+                  </a:txBody>
+                  <a:tcPr/>
+                </a:tc>
+                <a:tc>
+                  <a:txBody>
+                    <a:bodyPr/>
+                    <a:lstStyle/>
+                    <a:p>
+                      <a:r>
+                        <a:rPr lang="en-US" b="1" dirty="0" smtClean="0">
+                          <a:latin typeface="Consolas" panose="020B0609020204030204" pitchFamily="49" charset="0"/>
+                        </a:rPr>
+                        <a:t>15</a:t>
+                      </a:r>
+                      <a:endParaRPr lang="en-US" b="1" dirty="0">
+                        <a:latin typeface="Consolas" panose="020B0609020204030204" pitchFamily="49" charset="0"/>
+                      </a:endParaRPr>
+                    </a:p>
+                  </a:txBody>
+                  <a:tcPr/>
+                </a:tc>
+                <a:tc>
+                  <a:txBody>
+                    <a:bodyPr/>
+                    <a:lstStyle/>
+                    <a:p>
+                      <a:r>
+                        <a:rPr lang="en-US" b="1" dirty="0" smtClean="0">
+                          <a:latin typeface="Consolas" panose="020B0609020204030204" pitchFamily="49" charset="0"/>
+                        </a:rPr>
+                        <a:t>15</a:t>
+                      </a:r>
+                      <a:endParaRPr lang="en-US" b="1" dirty="0">
+                        <a:latin typeface="Consolas" panose="020B0609020204030204" pitchFamily="49" charset="0"/>
+                      </a:endParaRPr>
+                    </a:p>
+                  </a:txBody>
+                  <a:tcPr/>
+                </a:tc>
+                <a:tc>
+                  <a:txBody>
+                    <a:bodyPr/>
+                    <a:lstStyle/>
+                    <a:p>
+                      <a:r>
+                        <a:rPr lang="en-US" b="1" dirty="0" smtClean="0">
+                          <a:latin typeface="Consolas" panose="020B0609020204030204" pitchFamily="49" charset="0"/>
+                        </a:rPr>
+                        <a:t>11</a:t>
+                      </a:r>
+                      <a:endParaRPr lang="en-US" b="1" dirty="0">
+                        <a:latin typeface="Consolas" panose="020B0609020204030204" pitchFamily="49" charset="0"/>
+                      </a:endParaRPr>
+                    </a:p>
+                  </a:txBody>
+                  <a:tcPr/>
+                </a:tc>
+                <a:tc>
+                  <a:txBody>
+                    <a:bodyPr/>
+                    <a:lstStyle/>
+                    <a:p>
+                      <a:r>
+                        <a:rPr lang="en-US" b="1" dirty="0" smtClean="0">
+                          <a:latin typeface="Consolas" panose="020B0609020204030204" pitchFamily="49" charset="0"/>
+                        </a:rPr>
+                        <a:t>4</a:t>
+                      </a:r>
+                      <a:endParaRPr lang="en-US" b="1" dirty="0">
+                        <a:latin typeface="Consolas" panose="020B0609020204030204" pitchFamily="49" charset="0"/>
+                      </a:endParaRPr>
+                    </a:p>
+                  </a:txBody>
+                  <a:tcPr/>
+                </a:tc>
+                <a:extLst>
+                  <a:ext uri="{0D108BD9-81ED-4DB2-BD59-A6C34878D82A}">
+                    <a16:rowId xmlns:a16="http://schemas.microsoft.com/office/drawing/2014/main" val="4082026428"/>
+                  </a:ext>
+                </a:extLst>
+              </a:tr>
+              <a:tr h="370840">
+                <a:tc>
+                  <a:txBody>
+                    <a:bodyPr/>
+                    <a:lstStyle/>
+                    <a:p>
+                      <a:endParaRPr lang="en-US" dirty="0"/>
+                    </a:p>
+                  </a:txBody>
+                  <a:tcPr/>
+                </a:tc>
+                <a:tc>
+                  <a:txBody>
+                    <a:bodyPr/>
+                    <a:lstStyle/>
+                    <a:p>
+                      <a:r>
+                        <a:rPr lang="en-US" b="1" dirty="0" smtClean="0">
+                          <a:latin typeface="Consolas" panose="020B0609020204030204" pitchFamily="49" charset="0"/>
+                        </a:rPr>
+                        <a:t>11</a:t>
+                      </a:r>
+                      <a:endParaRPr lang="en-US" b="1" dirty="0">
+                        <a:latin typeface="Consolas" panose="020B0609020204030204" pitchFamily="49" charset="0"/>
+                      </a:endParaRPr>
+                    </a:p>
+                  </a:txBody>
+                  <a:tcPr/>
+                </a:tc>
+                <a:tc>
+                  <a:txBody>
+                    <a:bodyPr/>
+                    <a:lstStyle/>
+                    <a:p>
+                      <a:r>
+                        <a:rPr lang="en-US" b="1" dirty="0" smtClean="0">
+                          <a:latin typeface="Consolas" panose="020B0609020204030204" pitchFamily="49" charset="0"/>
+                        </a:rPr>
+                        <a:t>25</a:t>
+                      </a:r>
+                      <a:endParaRPr lang="en-US" b="1" dirty="0">
+                        <a:latin typeface="Consolas" panose="020B0609020204030204" pitchFamily="49" charset="0"/>
+                      </a:endParaRPr>
+                    </a:p>
+                  </a:txBody>
+                  <a:tcPr/>
+                </a:tc>
+                <a:tc>
+                  <a:txBody>
+                    <a:bodyPr/>
+                    <a:lstStyle/>
+                    <a:p>
+                      <a:r>
+                        <a:rPr lang="en-US" b="1" dirty="0" smtClean="0">
+                          <a:latin typeface="Consolas" panose="020B0609020204030204" pitchFamily="49" charset="0"/>
+                        </a:rPr>
+                        <a:t>10</a:t>
+                      </a:r>
+                      <a:endParaRPr lang="en-US" b="1" dirty="0">
+                        <a:latin typeface="Consolas" panose="020B0609020204030204" pitchFamily="49" charset="0"/>
+                      </a:endParaRPr>
+                    </a:p>
+                  </a:txBody>
+                  <a:tcPr/>
+                </a:tc>
+                <a:tc>
+                  <a:txBody>
+                    <a:bodyPr/>
+                    <a:lstStyle/>
+                    <a:p>
+                      <a:r>
+                        <a:rPr lang="en-US" b="1" dirty="0" smtClean="0">
+                          <a:latin typeface="Consolas" panose="020B0609020204030204" pitchFamily="49" charset="0"/>
+                        </a:rPr>
+                        <a:t>18</a:t>
+                      </a:r>
+                      <a:endParaRPr lang="en-US" b="1" dirty="0">
+                        <a:latin typeface="Consolas" panose="020B0609020204030204" pitchFamily="49" charset="0"/>
+                      </a:endParaRPr>
+                    </a:p>
+                  </a:txBody>
+                  <a:tcPr/>
+                </a:tc>
+                <a:tc>
+                  <a:txBody>
+                    <a:bodyPr/>
+                    <a:lstStyle/>
+                    <a:p>
+                      <a:r>
+                        <a:rPr lang="en-US" b="1" dirty="0" smtClean="0">
+                          <a:latin typeface="Consolas" panose="020B0609020204030204" pitchFamily="49" charset="0"/>
+                        </a:rPr>
+                        <a:t>9</a:t>
+                      </a:r>
+                      <a:endParaRPr lang="en-US" b="1" dirty="0">
+                        <a:latin typeface="Consolas" panose="020B0609020204030204" pitchFamily="49" charset="0"/>
+                      </a:endParaRPr>
+                    </a:p>
+                  </a:txBody>
+                  <a:tcPr/>
+                </a:tc>
+                <a:extLst>
+                  <a:ext uri="{0D108BD9-81ED-4DB2-BD59-A6C34878D82A}">
+                    <a16:rowId xmlns:a16="http://schemas.microsoft.com/office/drawing/2014/main" val="4087756528"/>
+                  </a:ext>
+                </a:extLst>
+              </a:tr>
+              <a:tr h="370840">
+                <a:tc>
+                  <a:txBody>
+                    <a:bodyPr/>
+                    <a:lstStyle/>
+                    <a:p>
+                      <a:r>
+                        <a:rPr lang="en-US" dirty="0" smtClean="0"/>
+                        <a:t>+</a:t>
+                      </a:r>
+                      <a:endParaRPr lang="en-US" dirty="0"/>
+                    </a:p>
+                  </a:txBody>
+                  <a:tcPr/>
+                </a:tc>
+                <a:tc>
+                  <a:txBody>
+                    <a:bodyPr/>
+                    <a:lstStyle/>
+                    <a:p>
+                      <a:r>
+                        <a:rPr lang="en-US" b="1" dirty="0" smtClean="0">
+                          <a:solidFill>
+                            <a:srgbClr val="002060"/>
+                          </a:solidFill>
+                          <a:latin typeface="Consolas" panose="020B0609020204030204" pitchFamily="49" charset="0"/>
+                        </a:rPr>
+                        <a:t>11</a:t>
+                      </a:r>
+                      <a:endParaRPr lang="en-US" b="1" dirty="0">
+                        <a:solidFill>
+                          <a:srgbClr val="002060"/>
+                        </a:solidFill>
+                        <a:latin typeface="Consolas" panose="020B0609020204030204" pitchFamily="49" charset="0"/>
+                      </a:endParaRPr>
+                    </a:p>
+                  </a:txBody>
+                  <a:tcPr/>
+                </a:tc>
+                <a:tc>
+                  <a:txBody>
+                    <a:bodyPr/>
+                    <a:lstStyle/>
+                    <a:p>
+                      <a:r>
+                        <a:rPr lang="en-US" b="1" dirty="0" smtClean="0">
+                          <a:solidFill>
+                            <a:srgbClr val="002060"/>
+                          </a:solidFill>
+                          <a:latin typeface="Consolas" panose="020B0609020204030204" pitchFamily="49" charset="0"/>
+                        </a:rPr>
+                        <a:t>14</a:t>
+                      </a:r>
+                      <a:endParaRPr lang="en-US" b="1" dirty="0">
+                        <a:solidFill>
+                          <a:srgbClr val="002060"/>
+                        </a:solidFill>
+                        <a:latin typeface="Consolas" panose="020B0609020204030204" pitchFamily="49" charset="0"/>
+                      </a:endParaRPr>
+                    </a:p>
+                  </a:txBody>
+                  <a:tcPr/>
+                </a:tc>
+                <a:tc>
+                  <a:txBody>
+                    <a:bodyPr/>
+                    <a:lstStyle/>
+                    <a:p>
+                      <a:r>
+                        <a:rPr lang="en-US" b="1" dirty="0" smtClean="0">
+                          <a:solidFill>
+                            <a:srgbClr val="002060"/>
+                          </a:solidFill>
+                          <a:latin typeface="Consolas" panose="020B0609020204030204" pitchFamily="49" charset="0"/>
+                        </a:rPr>
+                        <a:t>25</a:t>
+                      </a:r>
+                      <a:endParaRPr lang="en-US" b="1" dirty="0">
+                        <a:solidFill>
+                          <a:srgbClr val="002060"/>
+                        </a:solidFill>
+                        <a:latin typeface="Consolas" panose="020B0609020204030204" pitchFamily="49" charset="0"/>
+                      </a:endParaRPr>
+                    </a:p>
+                  </a:txBody>
+                  <a:tcPr/>
+                </a:tc>
+                <a:tc>
+                  <a:txBody>
+                    <a:bodyPr/>
+                    <a:lstStyle/>
+                    <a:p>
+                      <a:r>
+                        <a:rPr lang="en-US" b="1" dirty="0" smtClean="0">
+                          <a:solidFill>
+                            <a:srgbClr val="002060"/>
+                          </a:solidFill>
+                          <a:latin typeface="Consolas" panose="020B0609020204030204" pitchFamily="49" charset="0"/>
+                        </a:rPr>
+                        <a:t>3</a:t>
+                      </a:r>
+                      <a:endParaRPr lang="en-US" b="1" dirty="0">
+                        <a:solidFill>
+                          <a:srgbClr val="002060"/>
+                        </a:solidFill>
+                        <a:latin typeface="Consolas" panose="020B0609020204030204" pitchFamily="49" charset="0"/>
+                      </a:endParaRPr>
+                    </a:p>
+                  </a:txBody>
+                  <a:tcPr/>
+                </a:tc>
+                <a:tc>
+                  <a:txBody>
+                    <a:bodyPr/>
+                    <a:lstStyle/>
+                    <a:p>
+                      <a:r>
+                        <a:rPr lang="en-US" b="1" dirty="0" smtClean="0">
+                          <a:solidFill>
+                            <a:srgbClr val="002060"/>
+                          </a:solidFill>
+                          <a:latin typeface="Consolas" panose="020B0609020204030204" pitchFamily="49" charset="0"/>
+                        </a:rPr>
+                        <a:t>13</a:t>
+                      </a:r>
+                      <a:endParaRPr lang="en-US" b="1" dirty="0">
+                        <a:solidFill>
+                          <a:srgbClr val="002060"/>
+                        </a:solidFill>
+                        <a:latin typeface="Consolas" panose="020B0609020204030204" pitchFamily="49" charset="0"/>
+                      </a:endParaRPr>
+                    </a:p>
+                  </a:txBody>
+                  <a:tcPr/>
+                </a:tc>
+                <a:extLst>
+                  <a:ext uri="{0D108BD9-81ED-4DB2-BD59-A6C34878D82A}">
+                    <a16:rowId xmlns:a16="http://schemas.microsoft.com/office/drawing/2014/main" val="3333305330"/>
+                  </a:ext>
+                </a:extLst>
+              </a:tr>
+            </a:tbl>
+          </a:graphicData>
+        </a:graphic>
+      </p:graphicFrame>
+      <p:cxnSp>
+        <p:nvCxnSpPr>
+          <p:cNvPr id="19" name="Straight Arrow Connector 18"/>
+          <p:cNvCxnSpPr/>
+          <p:nvPr/>
+        </p:nvCxnSpPr>
+        <p:spPr>
+          <a:xfrm>
+            <a:off x="2650837" y="1200727"/>
+            <a:ext cx="1339272" cy="0"/>
+          </a:xfrm>
+          <a:prstGeom prst="straightConnector1">
+            <a:avLst/>
+          </a:prstGeom>
+          <a:ln w="28575">
+            <a:headEnd type="none" w="med" len="med"/>
+            <a:tailEnd type="arrow" w="med" len="med"/>
+          </a:ln>
+        </p:spPr>
+        <p:style>
+          <a:lnRef idx="1">
+            <a:schemeClr val="accent1"/>
+          </a:lnRef>
+          <a:fillRef idx="0">
+            <a:schemeClr val="accent1"/>
+          </a:fillRef>
+          <a:effectRef idx="0">
+            <a:schemeClr val="accent1"/>
+          </a:effectRef>
+          <a:fontRef idx="minor">
+            <a:schemeClr val="tx1"/>
+          </a:fontRef>
+        </p:style>
+      </p:cxnSp>
+      <p:cxnSp>
+        <p:nvCxnSpPr>
+          <p:cNvPr id="20" name="Straight Arrow Connector 19"/>
+          <p:cNvCxnSpPr/>
+          <p:nvPr/>
+        </p:nvCxnSpPr>
+        <p:spPr>
+          <a:xfrm>
+            <a:off x="2650837" y="1574797"/>
+            <a:ext cx="1339272" cy="0"/>
+          </a:xfrm>
+          <a:prstGeom prst="straightConnector1">
+            <a:avLst/>
+          </a:prstGeom>
+          <a:ln w="28575">
+            <a:headEnd type="none" w="med" len="med"/>
+            <a:tailEnd type="arrow" w="med" len="med"/>
+          </a:ln>
+        </p:spPr>
+        <p:style>
+          <a:lnRef idx="1">
+            <a:schemeClr val="accent1"/>
+          </a:lnRef>
+          <a:fillRef idx="0">
+            <a:schemeClr val="accent1"/>
+          </a:fillRef>
+          <a:effectRef idx="0">
+            <a:schemeClr val="accent1"/>
+          </a:effectRef>
+          <a:fontRef idx="minor">
+            <a:schemeClr val="tx1"/>
+          </a:fontRef>
+        </p:style>
+      </p:cxnSp>
+      <p:cxnSp>
+        <p:nvCxnSpPr>
+          <p:cNvPr id="21" name="Straight Arrow Connector 20"/>
+          <p:cNvCxnSpPr/>
+          <p:nvPr/>
+        </p:nvCxnSpPr>
+        <p:spPr>
+          <a:xfrm>
+            <a:off x="2650837" y="1930397"/>
+            <a:ext cx="1339272" cy="0"/>
+          </a:xfrm>
+          <a:prstGeom prst="straightConnector1">
+            <a:avLst/>
+          </a:prstGeom>
+          <a:ln w="28575">
+            <a:headEnd type="arrow" w="med" len="med"/>
+            <a:tailEnd type="none" w="med" len="med"/>
+          </a:ln>
+        </p:spPr>
+        <p:style>
+          <a:lnRef idx="1">
+            <a:schemeClr val="accent1"/>
+          </a:lnRef>
+          <a:fillRef idx="0">
+            <a:schemeClr val="accent1"/>
+          </a:fillRef>
+          <a:effectRef idx="0">
+            <a:schemeClr val="accent1"/>
+          </a:effectRef>
+          <a:fontRef idx="minor">
+            <a:schemeClr val="tx1"/>
+          </a:fontRef>
+        </p:style>
+      </p:cxnSp>
+    </p:spTree>
+    <p:extLst>
+      <p:ext uri="{BB962C8B-B14F-4D97-AF65-F5344CB8AC3E}">
+        <p14:creationId xmlns:p14="http://schemas.microsoft.com/office/powerpoint/2010/main" val="297781780"/>
+      </p:ext>
+    </p:extLst>
+  </p:cSld>
+  <p:clrMapOvr>
+    <a:masterClrMapping/>
+  </p:clrMapOvr>
+</p:sld>
+</file>
+
 <file path=ppt/slides/slide3.xml><?xml version="1.0" encoding="utf-8"?>
 <p:sld xmlns:a="http://schemas.openxmlformats.org/drawingml/2006/main" xmlns:r="http://schemas.openxmlformats.org/officeDocument/2006/relationships" xmlns:p="http://schemas.openxmlformats.org/presentationml/2006/main">
   <p:cSld>
@@ -17631,7 +18630,7 @@
                   <a14:useLocalDpi xmlns:a14="http://schemas.microsoft.com/office/drawing/2010/main" val="0"/>
                 </a:ext>
                 <a:ext uri="{96DAC541-7B7A-43D3-8B79-37D633B846F1}">
-                  <asvg:svgBlip xmlns:asvg="http://schemas.microsoft.com/office/drawing/2016/SVG/main" r:embed="rId3"/>
+                  <asvg:svgBlip xmlns:asvg="http://schemas.microsoft.com/office/drawing/2016/SVG/main" xmlns="" r:embed="rId3"/>
                 </a:ext>
               </a:extLst>
             </a:blip>
@@ -19170,7 +20169,7 @@
                 <a14:useLocalDpi xmlns:a14="http://schemas.microsoft.com/office/drawing/2010/main" val="0"/>
               </a:ext>
               <a:ext uri="{96DAC541-7B7A-43D3-8B79-37D633B846F1}">
-                <asvg:svgBlip xmlns:asvg="http://schemas.microsoft.com/office/drawing/2016/SVG/main" r:embed="rId3"/>
+                <asvg:svgBlip xmlns:asvg="http://schemas.microsoft.com/office/drawing/2016/SVG/main" xmlns="" r:embed="rId3"/>
               </a:ext>
             </a:extLst>
           </a:blip>
@@ -19209,7 +20208,7 @@
                 <a14:useLocalDpi xmlns:a14="http://schemas.microsoft.com/office/drawing/2010/main" val="0"/>
               </a:ext>
               <a:ext uri="{96DAC541-7B7A-43D3-8B79-37D633B846F1}">
-                <asvg:svgBlip xmlns:asvg="http://schemas.microsoft.com/office/drawing/2016/SVG/main" r:embed="rId5"/>
+                <asvg:svgBlip xmlns:asvg="http://schemas.microsoft.com/office/drawing/2016/SVG/main" xmlns="" r:embed="rId5"/>
               </a:ext>
             </a:extLst>
           </a:blip>
@@ -19600,7 +20599,7 @@
                 <a14:useLocalDpi xmlns:a14="http://schemas.microsoft.com/office/drawing/2010/main" val="0"/>
               </a:ext>
               <a:ext uri="{96DAC541-7B7A-43D3-8B79-37D633B846F1}">
-                <asvg:svgBlip xmlns:asvg="http://schemas.microsoft.com/office/drawing/2016/SVG/main" r:embed="rId5"/>
+                <asvg:svgBlip xmlns:asvg="http://schemas.microsoft.com/office/drawing/2016/SVG/main" xmlns="" r:embed="rId5"/>
               </a:ext>
             </a:extLst>
           </a:blip>
@@ -19748,7 +20747,7 @@
                 <a14:useLocalDpi xmlns:a14="http://schemas.microsoft.com/office/drawing/2010/main" val="0"/>
               </a:ext>
               <a:ext uri="{96DAC541-7B7A-43D3-8B79-37D633B846F1}">
-                <asvg:svgBlip xmlns:asvg="http://schemas.microsoft.com/office/drawing/2016/SVG/main" r:embed="rId3"/>
+                <asvg:svgBlip xmlns:asvg="http://schemas.microsoft.com/office/drawing/2016/SVG/main" xmlns="" r:embed="rId3"/>
               </a:ext>
             </a:extLst>
           </a:blip>
@@ -19787,7 +20786,7 @@
                 <a14:useLocalDpi xmlns:a14="http://schemas.microsoft.com/office/drawing/2010/main" val="0"/>
               </a:ext>
               <a:ext uri="{96DAC541-7B7A-43D3-8B79-37D633B846F1}">
-                <asvg:svgBlip xmlns:asvg="http://schemas.microsoft.com/office/drawing/2016/SVG/main" r:embed="rId5"/>
+                <asvg:svgBlip xmlns:asvg="http://schemas.microsoft.com/office/drawing/2016/SVG/main" xmlns="" r:embed="rId5"/>
               </a:ext>
             </a:extLst>
           </a:blip>

</xml_diff>